<commit_message>
Styles from Campus Curriculum
</commit_message>
<xml_diff>
--- a/CYBER360-1.1-1.2-Intro-Toolsets.pptx
+++ b/CYBER360-1.1-1.2-Intro-Toolsets.pptx
@@ -2,14 +2,14 @@
 <file path=ppt/presentation.xml><?xml version="1.0" encoding="utf-8"?>
 <p:presentation xmlns:a="http://schemas.openxmlformats.org/drawingml/2006/main" xmlns:r="http://schemas.openxmlformats.org/officeDocument/2006/relationships" xmlns:p="http://schemas.openxmlformats.org/presentationml/2006/main" saveSubsetFonts="1">
   <p:sldMasterIdLst>
-    <p:sldMasterId id="2147483712" r:id="rId1"/>
+    <p:sldMasterId id="2147483648" r:id="rId1"/>
   </p:sldMasterIdLst>
   <p:sldIdLst>
-    <p:sldId id="256" r:id="rId2"/>
-    <p:sldId id="261" r:id="rId3"/>
-    <p:sldId id="270" r:id="rId4"/>
+    <p:sldId id="257" r:id="rId2"/>
+    <p:sldId id="258" r:id="rId3"/>
+    <p:sldId id="259" r:id="rId4"/>
     <p:sldId id="260" r:id="rId5"/>
-    <p:sldId id="277" r:id="rId6"/>
+    <p:sldId id="261" r:id="rId6"/>
   </p:sldIdLst>
   <p:sldSz cx="12192000" cy="6858000"/>
   <p:notesSz cx="6858000" cy="9144000"/>
@@ -116,104 +116,50 @@
 </p:presentation>
 </file>
 
-<file path=ppt/revisionInfo.xml><?xml version="1.0" encoding="utf-8"?>
-<p1510:revInfo xmlns:a="http://schemas.openxmlformats.org/drawingml/2006/main" xmlns:r="http://schemas.openxmlformats.org/officeDocument/2006/relationships" xmlns:p1510="http://schemas.microsoft.com/office/powerpoint/2015/10/main">
-  <p1510:revLst>
-    <p1510:client id="{C1E6ABF6-BAED-4B26-97DB-20A1E8B7A1A4}" v="2" dt="2023-11-21T05:49:34.465"/>
-  </p1510:revLst>
-</p1510:revInfo>
-</file>
-
 <file path=ppt/changesInfos/changesInfo1.xml><?xml version="1.0" encoding="utf-8"?>
 <pc:chgInfo xmlns:a="http://schemas.openxmlformats.org/drawingml/2006/main" xmlns:r="http://schemas.openxmlformats.org/officeDocument/2006/relationships" xmlns:ac="http://schemas.microsoft.com/office/drawing/2013/main/command" xmlns:pc="http://schemas.microsoft.com/office/powerpoint/2013/main/command">
   <pc:docChgLst>
-    <pc:chgData name="Gibbons, Carl" userId="d2b037bc-8fb4-4222-845c-61440543a456" providerId="ADAL" clId="{C1E6ABF6-BAED-4B26-97DB-20A1E8B7A1A4}"/>
-    <pc:docChg chg="custSel modSld">
-      <pc:chgData name="Gibbons, Carl" userId="d2b037bc-8fb4-4222-845c-61440543a456" providerId="ADAL" clId="{C1E6ABF6-BAED-4B26-97DB-20A1E8B7A1A4}" dt="2023-12-06T02:23:48.337" v="274" actId="20577"/>
+    <pc:chgData name="Talbert, Matthew" userId="877a4118-3f16-4ac9-a72c-5dd2c7b28c85" providerId="ADAL" clId="{23D766D9-1C7C-4251-B893-31D4A40AE7AD}"/>
+    <pc:docChg chg="modSld">
+      <pc:chgData name="Talbert, Matthew" userId="877a4118-3f16-4ac9-a72c-5dd2c7b28c85" providerId="ADAL" clId="{23D766D9-1C7C-4251-B893-31D4A40AE7AD}" dt="2024-11-22T22:54:14.933" v="25" actId="1035"/>
       <pc:docMkLst>
         <pc:docMk/>
       </pc:docMkLst>
       <pc:sldChg chg="modSp mod">
-        <pc:chgData name="Gibbons, Carl" userId="d2b037bc-8fb4-4222-845c-61440543a456" providerId="ADAL" clId="{C1E6ABF6-BAED-4B26-97DB-20A1E8B7A1A4}" dt="2023-11-21T16:22:17.597" v="97" actId="20577"/>
+        <pc:chgData name="Talbert, Matthew" userId="877a4118-3f16-4ac9-a72c-5dd2c7b28c85" providerId="ADAL" clId="{23D766D9-1C7C-4251-B893-31D4A40AE7AD}" dt="2024-11-22T22:54:14.933" v="25" actId="1035"/>
         <pc:sldMkLst>
           <pc:docMk/>
-          <pc:sldMk cId="3308175748" sldId="256"/>
+          <pc:sldMk cId="2312486803" sldId="258"/>
         </pc:sldMkLst>
         <pc:spChg chg="mod">
-          <ac:chgData name="Gibbons, Carl" userId="d2b037bc-8fb4-4222-845c-61440543a456" providerId="ADAL" clId="{C1E6ABF6-BAED-4B26-97DB-20A1E8B7A1A4}" dt="2023-11-21T05:49:34.464" v="2"/>
+          <ac:chgData name="Talbert, Matthew" userId="877a4118-3f16-4ac9-a72c-5dd2c7b28c85" providerId="ADAL" clId="{23D766D9-1C7C-4251-B893-31D4A40AE7AD}" dt="2024-11-22T22:54:14.933" v="25" actId="1035"/>
           <ac:spMkLst>
             <pc:docMk/>
-            <pc:sldMk cId="3308175748" sldId="256"/>
-            <ac:spMk id="2" creationId="{ACEA2649-DC6B-3373-A7E6-7F0E103D8B8B}"/>
+            <pc:sldMk cId="2312486803" sldId="258"/>
+            <ac:spMk id="2" creationId="{31B75992-5098-A283-4925-2CCEBB801DC5}"/>
           </ac:spMkLst>
         </pc:spChg>
         <pc:spChg chg="mod">
-          <ac:chgData name="Gibbons, Carl" userId="d2b037bc-8fb4-4222-845c-61440543a456" providerId="ADAL" clId="{C1E6ABF6-BAED-4B26-97DB-20A1E8B7A1A4}" dt="2023-11-21T16:22:17.597" v="97" actId="20577"/>
+          <ac:chgData name="Talbert, Matthew" userId="877a4118-3f16-4ac9-a72c-5dd2c7b28c85" providerId="ADAL" clId="{23D766D9-1C7C-4251-B893-31D4A40AE7AD}" dt="2024-11-22T22:54:12.565" v="23" actId="1035"/>
           <ac:spMkLst>
             <pc:docMk/>
-            <pc:sldMk cId="3308175748" sldId="256"/>
-            <ac:spMk id="3" creationId="{EEC4D41B-E776-05F2-BE0B-89BB339485AB}"/>
-          </ac:spMkLst>
-        </pc:spChg>
-        <pc:spChg chg="mod">
-          <ac:chgData name="Gibbons, Carl" userId="d2b037bc-8fb4-4222-845c-61440543a456" providerId="ADAL" clId="{C1E6ABF6-BAED-4B26-97DB-20A1E8B7A1A4}" dt="2023-11-21T05:49:34.464" v="2"/>
-          <ac:spMkLst>
-            <pc:docMk/>
-            <pc:sldMk cId="3308175748" sldId="256"/>
-            <ac:spMk id="4" creationId="{4664ABB7-0B55-0242-2E51-B3286EE7B5EB}"/>
-          </ac:spMkLst>
-        </pc:spChg>
-      </pc:sldChg>
-      <pc:sldChg chg="modSp">
-        <pc:chgData name="Gibbons, Carl" userId="d2b037bc-8fb4-4222-845c-61440543a456" providerId="ADAL" clId="{C1E6ABF6-BAED-4B26-97DB-20A1E8B7A1A4}" dt="2023-11-21T05:49:34.464" v="2"/>
-        <pc:sldMkLst>
-          <pc:docMk/>
-          <pc:sldMk cId="2312486803" sldId="261"/>
-        </pc:sldMkLst>
-        <pc:spChg chg="mod">
-          <ac:chgData name="Gibbons, Carl" userId="d2b037bc-8fb4-4222-845c-61440543a456" providerId="ADAL" clId="{C1E6ABF6-BAED-4B26-97DB-20A1E8B7A1A4}" dt="2023-11-21T05:49:34.464" v="2"/>
-          <ac:spMkLst>
-            <pc:docMk/>
-            <pc:sldMk cId="2312486803" sldId="261"/>
-            <ac:spMk id="2" creationId="{31B75992-5098-A283-4925-2CCEBB801DC5}"/>
+            <pc:sldMk cId="2312486803" sldId="258"/>
+            <ac:spMk id="3" creationId="{B5924E0F-A977-1710-779D-EEB74261AF34}"/>
           </ac:spMkLst>
         </pc:spChg>
       </pc:sldChg>
       <pc:sldChg chg="modSp mod">
-        <pc:chgData name="Gibbons, Carl" userId="d2b037bc-8fb4-4222-845c-61440543a456" providerId="ADAL" clId="{C1E6ABF6-BAED-4B26-97DB-20A1E8B7A1A4}" dt="2023-11-21T07:48:19.790" v="77" actId="20577"/>
+        <pc:chgData name="Talbert, Matthew" userId="877a4118-3f16-4ac9-a72c-5dd2c7b28c85" providerId="ADAL" clId="{23D766D9-1C7C-4251-B893-31D4A40AE7AD}" dt="2024-11-22T22:54:04.946" v="8" actId="1036"/>
         <pc:sldMkLst>
           <pc:docMk/>
-          <pc:sldMk cId="378743348" sldId="270"/>
+          <pc:sldMk cId="378743348" sldId="259"/>
         </pc:sldMkLst>
         <pc:spChg chg="mod">
-          <ac:chgData name="Gibbons, Carl" userId="d2b037bc-8fb4-4222-845c-61440543a456" providerId="ADAL" clId="{C1E6ABF6-BAED-4B26-97DB-20A1E8B7A1A4}" dt="2023-11-21T07:48:19.790" v="77" actId="20577"/>
+          <ac:chgData name="Talbert, Matthew" userId="877a4118-3f16-4ac9-a72c-5dd2c7b28c85" providerId="ADAL" clId="{23D766D9-1C7C-4251-B893-31D4A40AE7AD}" dt="2024-11-22T22:54:04.946" v="8" actId="1036"/>
           <ac:spMkLst>
             <pc:docMk/>
-            <pc:sldMk cId="378743348" sldId="270"/>
-            <ac:spMk id="3" creationId="{80041865-9773-290D-EB35-F8AF8BFC505C}"/>
-          </ac:spMkLst>
-        </pc:spChg>
-      </pc:sldChg>
-      <pc:sldChg chg="modSp mod">
-        <pc:chgData name="Gibbons, Carl" userId="d2b037bc-8fb4-4222-845c-61440543a456" providerId="ADAL" clId="{C1E6ABF6-BAED-4B26-97DB-20A1E8B7A1A4}" dt="2023-12-06T02:23:48.337" v="274" actId="20577"/>
-        <pc:sldMkLst>
-          <pc:docMk/>
-          <pc:sldMk cId="657795359" sldId="277"/>
-        </pc:sldMkLst>
-        <pc:spChg chg="mod">
-          <ac:chgData name="Gibbons, Carl" userId="d2b037bc-8fb4-4222-845c-61440543a456" providerId="ADAL" clId="{C1E6ABF6-BAED-4B26-97DB-20A1E8B7A1A4}" dt="2023-11-21T05:49:34.464" v="2"/>
-          <ac:spMkLst>
-            <pc:docMk/>
-            <pc:sldMk cId="657795359" sldId="277"/>
-            <ac:spMk id="2" creationId="{1862E903-3C56-BB42-2361-009F2336475A}"/>
-          </ac:spMkLst>
-        </pc:spChg>
-        <pc:spChg chg="mod">
-          <ac:chgData name="Gibbons, Carl" userId="d2b037bc-8fb4-4222-845c-61440543a456" providerId="ADAL" clId="{C1E6ABF6-BAED-4B26-97DB-20A1E8B7A1A4}" dt="2023-12-06T02:23:48.337" v="274" actId="20577"/>
-          <ac:spMkLst>
-            <pc:docMk/>
-            <pc:sldMk cId="657795359" sldId="277"/>
-            <ac:spMk id="3" creationId="{90179172-96B3-95D0-A137-257770BE7642}"/>
+            <pc:sldMk cId="378743348" sldId="259"/>
+            <ac:spMk id="2" creationId="{C5822466-AC61-5579-F313-7B8A3FE65CC8}"/>
           </ac:spMkLst>
         </pc:spChg>
       </pc:sldChg>
@@ -223,7 +169,7 @@
 </file>
 
 <file path=ppt/slideLayouts/slideLayout1.xml><?xml version="1.0" encoding="utf-8"?>
-<p:sldLayout xmlns:a="http://schemas.openxmlformats.org/drawingml/2006/main" xmlns:r="http://schemas.openxmlformats.org/officeDocument/2006/relationships" xmlns:p="http://schemas.openxmlformats.org/presentationml/2006/main" type="title" preserve="1">
+<p:sldLayout xmlns:a="http://schemas.openxmlformats.org/drawingml/2006/main" xmlns:r="http://schemas.openxmlformats.org/officeDocument/2006/relationships" xmlns:p="http://schemas.openxmlformats.org/presentationml/2006/main" preserve="1" userDrawn="1">
   <p:cSld name="Title Slide">
     <p:spTree>
       <p:nvGrpSpPr>
@@ -239,200 +185,10 @@
           <a:chExt cx="0" cy="0"/>
         </a:xfrm>
       </p:grpSpPr>
-      <p:sp>
-        <p:nvSpPr>
-          <p:cNvPr id="2" name="Title 1">
-            <a:extLst>
-              <a:ext uri="{FF2B5EF4-FFF2-40B4-BE49-F238E27FC236}">
-                <a16:creationId xmlns:a16="http://schemas.microsoft.com/office/drawing/2014/main" id="{DD581941-0C9F-2373-780E-9153E7306EE0}"/>
-              </a:ext>
-            </a:extLst>
-          </p:cNvPr>
-          <p:cNvSpPr>
-            <a:spLocks noGrp="1"/>
-          </p:cNvSpPr>
-          <p:nvPr>
-            <p:ph type="ctrTitle"/>
-          </p:nvPr>
-        </p:nvSpPr>
-        <p:spPr>
-          <a:xfrm>
-            <a:off x="1524000" y="1122363"/>
-            <a:ext cx="9144000" cy="2387600"/>
-          </a:xfrm>
-        </p:spPr>
-        <p:txBody>
-          <a:bodyPr anchor="b"/>
-          <a:lstStyle>
-            <a:lvl1pPr algn="ctr">
-              <a:defRPr sz="6000"/>
-            </a:lvl1pPr>
-          </a:lstStyle>
-          <a:p>
-            <a:r>
-              <a:rPr lang="en-US"/>
-              <a:t>Click to edit Master title style</a:t>
-            </a:r>
-          </a:p>
-        </p:txBody>
-      </p:sp>
-      <p:sp>
-        <p:nvSpPr>
-          <p:cNvPr id="3" name="Subtitle 2">
-            <a:extLst>
-              <a:ext uri="{FF2B5EF4-FFF2-40B4-BE49-F238E27FC236}">
-                <a16:creationId xmlns:a16="http://schemas.microsoft.com/office/drawing/2014/main" id="{FC927A9A-3EED-7C12-0FFF-384113480AA1}"/>
-              </a:ext>
-            </a:extLst>
-          </p:cNvPr>
-          <p:cNvSpPr>
-            <a:spLocks noGrp="1"/>
-          </p:cNvSpPr>
-          <p:nvPr>
-            <p:ph type="subTitle" idx="1"/>
-          </p:nvPr>
-        </p:nvSpPr>
-        <p:spPr>
-          <a:xfrm>
-            <a:off x="1524000" y="3602038"/>
-            <a:ext cx="9144000" cy="1655762"/>
-          </a:xfrm>
-        </p:spPr>
-        <p:txBody>
-          <a:bodyPr/>
-          <a:lstStyle>
-            <a:lvl1pPr marL="0" indent="0" algn="ctr">
-              <a:buNone/>
-              <a:defRPr sz="2400"/>
-            </a:lvl1pPr>
-            <a:lvl2pPr marL="457200" indent="0" algn="ctr">
-              <a:buNone/>
-              <a:defRPr sz="2000"/>
-            </a:lvl2pPr>
-            <a:lvl3pPr marL="914400" indent="0" algn="ctr">
-              <a:buNone/>
-              <a:defRPr sz="1800"/>
-            </a:lvl3pPr>
-            <a:lvl4pPr marL="1371600" indent="0" algn="ctr">
-              <a:buNone/>
-              <a:defRPr sz="1600"/>
-            </a:lvl4pPr>
-            <a:lvl5pPr marL="1828800" indent="0" algn="ctr">
-              <a:buNone/>
-              <a:defRPr sz="1600"/>
-            </a:lvl5pPr>
-            <a:lvl6pPr marL="2286000" indent="0" algn="ctr">
-              <a:buNone/>
-              <a:defRPr sz="1600"/>
-            </a:lvl6pPr>
-            <a:lvl7pPr marL="2743200" indent="0" algn="ctr">
-              <a:buNone/>
-              <a:defRPr sz="1600"/>
-            </a:lvl7pPr>
-            <a:lvl8pPr marL="3200400" indent="0" algn="ctr">
-              <a:buNone/>
-              <a:defRPr sz="1600"/>
-            </a:lvl8pPr>
-            <a:lvl9pPr marL="3657600" indent="0" algn="ctr">
-              <a:buNone/>
-              <a:defRPr sz="1600"/>
-            </a:lvl9pPr>
-          </a:lstStyle>
-          <a:p>
-            <a:r>
-              <a:rPr lang="en-US"/>
-              <a:t>Click to edit Master subtitle style</a:t>
-            </a:r>
-          </a:p>
-        </p:txBody>
-      </p:sp>
-      <p:sp>
-        <p:nvSpPr>
-          <p:cNvPr id="4" name="Date Placeholder 3">
-            <a:extLst>
-              <a:ext uri="{FF2B5EF4-FFF2-40B4-BE49-F238E27FC236}">
-                <a16:creationId xmlns:a16="http://schemas.microsoft.com/office/drawing/2014/main" id="{E43FE0D7-D5FB-3326-9483-F15495075853}"/>
-              </a:ext>
-            </a:extLst>
-          </p:cNvPr>
-          <p:cNvSpPr>
-            <a:spLocks noGrp="1"/>
-          </p:cNvSpPr>
-          <p:nvPr>
-            <p:ph type="dt" sz="half" idx="10"/>
-          </p:nvPr>
-        </p:nvSpPr>
-        <p:spPr/>
-        <p:txBody>
-          <a:bodyPr/>
-          <a:lstStyle/>
-          <a:p>
-            <a:fld id="{421996D4-4A1C-4BBC-AA2B-FD5B7FC395A0}" type="datetime1">
-              <a:rPr lang="en-US" smtClean="0"/>
-              <a:t>9/16/2024</a:t>
-            </a:fld>
-            <a:endParaRPr lang="en-US"/>
-          </a:p>
-        </p:txBody>
-      </p:sp>
-      <p:sp>
-        <p:nvSpPr>
-          <p:cNvPr id="5" name="Footer Placeholder 4">
-            <a:extLst>
-              <a:ext uri="{FF2B5EF4-FFF2-40B4-BE49-F238E27FC236}">
-                <a16:creationId xmlns:a16="http://schemas.microsoft.com/office/drawing/2014/main" id="{AAEBCD6E-6B69-E7FF-A8EA-F8E294BDA7E7}"/>
-              </a:ext>
-            </a:extLst>
-          </p:cNvPr>
-          <p:cNvSpPr>
-            <a:spLocks noGrp="1"/>
-          </p:cNvSpPr>
-          <p:nvPr>
-            <p:ph type="ftr" sz="quarter" idx="11"/>
-          </p:nvPr>
-        </p:nvSpPr>
-        <p:spPr/>
-        <p:txBody>
-          <a:bodyPr/>
-          <a:lstStyle/>
-          <a:p>
-            <a:endParaRPr lang="en-US"/>
-          </a:p>
-        </p:txBody>
-      </p:sp>
-      <p:sp>
-        <p:nvSpPr>
-          <p:cNvPr id="6" name="Slide Number Placeholder 5">
-            <a:extLst>
-              <a:ext uri="{FF2B5EF4-FFF2-40B4-BE49-F238E27FC236}">
-                <a16:creationId xmlns:a16="http://schemas.microsoft.com/office/drawing/2014/main" id="{FF22DB5A-E75D-49DD-123C-37B6BC85E903}"/>
-              </a:ext>
-            </a:extLst>
-          </p:cNvPr>
-          <p:cNvSpPr>
-            <a:spLocks noGrp="1"/>
-          </p:cNvSpPr>
-          <p:nvPr>
-            <p:ph type="sldNum" sz="quarter" idx="12"/>
-          </p:nvPr>
-        </p:nvSpPr>
-        <p:spPr/>
-        <p:txBody>
-          <a:bodyPr/>
-          <a:lstStyle/>
-          <a:p>
-            <a:fld id="{B46E5E13-EE34-439C-B49B-F0CB75B28E1B}" type="slidenum">
-              <a:rPr lang="en-US" smtClean="0"/>
-              <a:t>‹#›</a:t>
-            </a:fld>
-            <a:endParaRPr lang="en-US"/>
-          </a:p>
-        </p:txBody>
-      </p:sp>
     </p:spTree>
     <p:extLst>
       <p:ext uri="{BB962C8B-B14F-4D97-AF65-F5344CB8AC3E}">
-        <p14:creationId xmlns:p14="http://schemas.microsoft.com/office/powerpoint/2010/main" val="4169122874"/>
+        <p14:creationId xmlns:p14="http://schemas.microsoft.com/office/powerpoint/2010/main" val="2903089904"/>
       </p:ext>
     </p:extLst>
   </p:cSld>
@@ -464,7 +220,7 @@
           <p:cNvPr id="2" name="Title 1">
             <a:extLst>
               <a:ext uri="{FF2B5EF4-FFF2-40B4-BE49-F238E27FC236}">
-                <a16:creationId xmlns:a16="http://schemas.microsoft.com/office/drawing/2014/main" id="{D6AD2E5E-D555-7E2B-7E3F-7520CC1D227E}"/>
+                <a16:creationId xmlns:a16="http://schemas.microsoft.com/office/drawing/2014/main" id="{A2992E9E-93C1-7E84-A4D5-EA127AB4BDC1}"/>
               </a:ext>
             </a:extLst>
           </p:cNvPr>
@@ -475,7 +231,15 @@
             <p:ph type="title"/>
           </p:nvPr>
         </p:nvSpPr>
-        <p:spPr/>
+        <p:spPr>
+          <a:xfrm>
+            <a:off x="602787" y="1498382"/>
+            <a:ext cx="10515600" cy="1325563"/>
+          </a:xfrm>
+          <a:prstGeom prst="rect">
+            <a:avLst/>
+          </a:prstGeom>
+        </p:spPr>
         <p:txBody>
           <a:bodyPr/>
           <a:lstStyle/>
@@ -492,7 +256,7 @@
           <p:cNvPr id="3" name="Vertical Text Placeholder 2">
             <a:extLst>
               <a:ext uri="{FF2B5EF4-FFF2-40B4-BE49-F238E27FC236}">
-                <a16:creationId xmlns:a16="http://schemas.microsoft.com/office/drawing/2014/main" id="{21BCA2AE-5C6A-0627-55FB-1213E6BA2F01}"/>
+                <a16:creationId xmlns:a16="http://schemas.microsoft.com/office/drawing/2014/main" id="{FBFF1E9B-EE9D-9A7E-EE97-87C838D9BB2F}"/>
               </a:ext>
             </a:extLst>
           </p:cNvPr>
@@ -503,7 +267,15 @@
             <p:ph type="body" orient="vert" idx="1"/>
           </p:nvPr>
         </p:nvSpPr>
-        <p:spPr/>
+        <p:spPr>
+          <a:xfrm>
+            <a:off x="838200" y="1825625"/>
+            <a:ext cx="10515600" cy="4351338"/>
+          </a:xfrm>
+          <a:prstGeom prst="rect">
+            <a:avLst/>
+          </a:prstGeom>
+        </p:spPr>
         <p:txBody>
           <a:bodyPr vert="eaVert"/>
           <a:lstStyle/>
@@ -549,7 +321,7 @@
           <p:cNvPr id="4" name="Date Placeholder 3">
             <a:extLst>
               <a:ext uri="{FF2B5EF4-FFF2-40B4-BE49-F238E27FC236}">
-                <a16:creationId xmlns:a16="http://schemas.microsoft.com/office/drawing/2014/main" id="{5107EDAF-37A2-AD0D-A11E-C6E412B7CD68}"/>
+                <a16:creationId xmlns:a16="http://schemas.microsoft.com/office/drawing/2014/main" id="{450DA212-C93A-3075-FD32-156F351E64D4}"/>
               </a:ext>
             </a:extLst>
           </p:cNvPr>
@@ -560,14 +332,22 @@
             <p:ph type="dt" sz="half" idx="10"/>
           </p:nvPr>
         </p:nvSpPr>
-        <p:spPr/>
+        <p:spPr>
+          <a:xfrm>
+            <a:off x="838200" y="6445249"/>
+            <a:ext cx="2743200" cy="365125"/>
+          </a:xfrm>
+          <a:prstGeom prst="rect">
+            <a:avLst/>
+          </a:prstGeom>
+        </p:spPr>
         <p:txBody>
           <a:bodyPr/>
           <a:lstStyle/>
           <a:p>
-            <a:fld id="{CB43818D-5554-4105-BE04-CEE32DEBDA0A}" type="datetime1">
+            <a:fld id="{71087A05-F855-4434-8DDE-39A8542098A6}" type="datetimeFigureOut">
               <a:rPr lang="en-US" smtClean="0"/>
-              <a:t>9/16/2024</a:t>
+              <a:t>11/21/2024</a:t>
             </a:fld>
             <a:endParaRPr lang="en-US"/>
           </a:p>
@@ -578,7 +358,7 @@
           <p:cNvPr id="5" name="Footer Placeholder 4">
             <a:extLst>
               <a:ext uri="{FF2B5EF4-FFF2-40B4-BE49-F238E27FC236}">
-                <a16:creationId xmlns:a16="http://schemas.microsoft.com/office/drawing/2014/main" id="{17AABE0A-6316-1BFF-88AA-1E305E3595C5}"/>
+                <a16:creationId xmlns:a16="http://schemas.microsoft.com/office/drawing/2014/main" id="{D6AA4E94-35D9-7831-A0BB-9A28BFA422BE}"/>
               </a:ext>
             </a:extLst>
           </p:cNvPr>
@@ -589,7 +369,15 @@
             <p:ph type="ftr" sz="quarter" idx="11"/>
           </p:nvPr>
         </p:nvSpPr>
-        <p:spPr/>
+        <p:spPr>
+          <a:xfrm>
+            <a:off x="4038600" y="6356350"/>
+            <a:ext cx="4114800" cy="365125"/>
+          </a:xfrm>
+          <a:prstGeom prst="rect">
+            <a:avLst/>
+          </a:prstGeom>
+        </p:spPr>
         <p:txBody>
           <a:bodyPr/>
           <a:lstStyle/>
@@ -603,7 +391,7 @@
           <p:cNvPr id="6" name="Slide Number Placeholder 5">
             <a:extLst>
               <a:ext uri="{FF2B5EF4-FFF2-40B4-BE49-F238E27FC236}">
-                <a16:creationId xmlns:a16="http://schemas.microsoft.com/office/drawing/2014/main" id="{FC568FF5-9BB0-1800-E4BA-438F3408E54B}"/>
+                <a16:creationId xmlns:a16="http://schemas.microsoft.com/office/drawing/2014/main" id="{2E0B5BE5-01BB-5041-6101-F169276B2397}"/>
               </a:ext>
             </a:extLst>
           </p:cNvPr>
@@ -614,12 +402,20 @@
             <p:ph type="sldNum" sz="quarter" idx="12"/>
           </p:nvPr>
         </p:nvSpPr>
-        <p:spPr/>
+        <p:spPr>
+          <a:xfrm>
+            <a:off x="8610600" y="6356350"/>
+            <a:ext cx="2743200" cy="365125"/>
+          </a:xfrm>
+          <a:prstGeom prst="rect">
+            <a:avLst/>
+          </a:prstGeom>
+        </p:spPr>
         <p:txBody>
           <a:bodyPr/>
           <a:lstStyle/>
           <a:p>
-            <a:fld id="{B46E5E13-EE34-439C-B49B-F0CB75B28E1B}" type="slidenum">
+            <a:fld id="{6C0014F0-3D1D-4459-A530-32E6C19AE461}" type="slidenum">
               <a:rPr lang="en-US" smtClean="0"/>
               <a:t>‹#›</a:t>
             </a:fld>
@@ -630,7 +426,7 @@
     </p:spTree>
     <p:extLst>
       <p:ext uri="{BB962C8B-B14F-4D97-AF65-F5344CB8AC3E}">
-        <p14:creationId xmlns:p14="http://schemas.microsoft.com/office/powerpoint/2010/main" val="3088053719"/>
+        <p14:creationId xmlns:p14="http://schemas.microsoft.com/office/powerpoint/2010/main" val="3058523283"/>
       </p:ext>
     </p:extLst>
   </p:cSld>
@@ -662,7 +458,7 @@
           <p:cNvPr id="2" name="Vertical Title 1">
             <a:extLst>
               <a:ext uri="{FF2B5EF4-FFF2-40B4-BE49-F238E27FC236}">
-                <a16:creationId xmlns:a16="http://schemas.microsoft.com/office/drawing/2014/main" id="{AAE8DA51-17B9-3E3B-6597-C3149EC564E7}"/>
+                <a16:creationId xmlns:a16="http://schemas.microsoft.com/office/drawing/2014/main" id="{B7D370E5-4104-4DF4-CE6F-43777E948DFD}"/>
               </a:ext>
             </a:extLst>
           </p:cNvPr>
@@ -678,6 +474,9 @@
             <a:off x="8724900" y="365125"/>
             <a:ext cx="2628900" cy="5811838"/>
           </a:xfrm>
+          <a:prstGeom prst="rect">
+            <a:avLst/>
+          </a:prstGeom>
         </p:spPr>
         <p:txBody>
           <a:bodyPr vert="eaVert"/>
@@ -695,7 +494,7 @@
           <p:cNvPr id="3" name="Vertical Text Placeholder 2">
             <a:extLst>
               <a:ext uri="{FF2B5EF4-FFF2-40B4-BE49-F238E27FC236}">
-                <a16:creationId xmlns:a16="http://schemas.microsoft.com/office/drawing/2014/main" id="{C43333B4-9DAF-48B6-30CB-E3B610BEF084}"/>
+                <a16:creationId xmlns:a16="http://schemas.microsoft.com/office/drawing/2014/main" id="{3CEA6D81-DFD1-D8AC-EC26-DC0557526EE4}"/>
               </a:ext>
             </a:extLst>
           </p:cNvPr>
@@ -711,6 +510,9 @@
             <a:off x="838200" y="365125"/>
             <a:ext cx="7734300" cy="5811838"/>
           </a:xfrm>
+          <a:prstGeom prst="rect">
+            <a:avLst/>
+          </a:prstGeom>
         </p:spPr>
         <p:txBody>
           <a:bodyPr vert="eaVert"/>
@@ -757,7 +559,7 @@
           <p:cNvPr id="4" name="Date Placeholder 3">
             <a:extLst>
               <a:ext uri="{FF2B5EF4-FFF2-40B4-BE49-F238E27FC236}">
-                <a16:creationId xmlns:a16="http://schemas.microsoft.com/office/drawing/2014/main" id="{6086BDD1-83F5-3D7A-8DD5-DF362A8AD1E7}"/>
+                <a16:creationId xmlns:a16="http://schemas.microsoft.com/office/drawing/2014/main" id="{60E27890-E421-871D-9D4F-F7E5B558B71E}"/>
               </a:ext>
             </a:extLst>
           </p:cNvPr>
@@ -768,14 +570,22 @@
             <p:ph type="dt" sz="half" idx="10"/>
           </p:nvPr>
         </p:nvSpPr>
-        <p:spPr/>
+        <p:spPr>
+          <a:xfrm>
+            <a:off x="838200" y="6445249"/>
+            <a:ext cx="2743200" cy="365125"/>
+          </a:xfrm>
+          <a:prstGeom prst="rect">
+            <a:avLst/>
+          </a:prstGeom>
+        </p:spPr>
         <p:txBody>
           <a:bodyPr/>
           <a:lstStyle/>
           <a:p>
-            <a:fld id="{AFAC11C6-1708-41BC-9474-3D7842023D96}" type="datetime1">
+            <a:fld id="{71087A05-F855-4434-8DDE-39A8542098A6}" type="datetimeFigureOut">
               <a:rPr lang="en-US" smtClean="0"/>
-              <a:t>9/16/2024</a:t>
+              <a:t>11/21/2024</a:t>
             </a:fld>
             <a:endParaRPr lang="en-US"/>
           </a:p>
@@ -786,7 +596,7 @@
           <p:cNvPr id="5" name="Footer Placeholder 4">
             <a:extLst>
               <a:ext uri="{FF2B5EF4-FFF2-40B4-BE49-F238E27FC236}">
-                <a16:creationId xmlns:a16="http://schemas.microsoft.com/office/drawing/2014/main" id="{4CD22109-0E78-0957-7BBE-F0B6D89EFBB0}"/>
+                <a16:creationId xmlns:a16="http://schemas.microsoft.com/office/drawing/2014/main" id="{B7A93CF4-905B-F31B-69BD-9BEBF9008D86}"/>
               </a:ext>
             </a:extLst>
           </p:cNvPr>
@@ -797,7 +607,15 @@
             <p:ph type="ftr" sz="quarter" idx="11"/>
           </p:nvPr>
         </p:nvSpPr>
-        <p:spPr/>
+        <p:spPr>
+          <a:xfrm>
+            <a:off x="4038600" y="6356350"/>
+            <a:ext cx="4114800" cy="365125"/>
+          </a:xfrm>
+          <a:prstGeom prst="rect">
+            <a:avLst/>
+          </a:prstGeom>
+        </p:spPr>
         <p:txBody>
           <a:bodyPr/>
           <a:lstStyle/>
@@ -811,7 +629,7 @@
           <p:cNvPr id="6" name="Slide Number Placeholder 5">
             <a:extLst>
               <a:ext uri="{FF2B5EF4-FFF2-40B4-BE49-F238E27FC236}">
-                <a16:creationId xmlns:a16="http://schemas.microsoft.com/office/drawing/2014/main" id="{292DE250-FF35-6AD5-3A95-9CDBFE6C2373}"/>
+                <a16:creationId xmlns:a16="http://schemas.microsoft.com/office/drawing/2014/main" id="{B9BD2B1C-442A-F5C9-9AEB-F9DE0158660F}"/>
               </a:ext>
             </a:extLst>
           </p:cNvPr>
@@ -822,12 +640,20 @@
             <p:ph type="sldNum" sz="quarter" idx="12"/>
           </p:nvPr>
         </p:nvSpPr>
-        <p:spPr/>
+        <p:spPr>
+          <a:xfrm>
+            <a:off x="8610600" y="6356350"/>
+            <a:ext cx="2743200" cy="365125"/>
+          </a:xfrm>
+          <a:prstGeom prst="rect">
+            <a:avLst/>
+          </a:prstGeom>
+        </p:spPr>
         <p:txBody>
           <a:bodyPr/>
           <a:lstStyle/>
           <a:p>
-            <a:fld id="{B46E5E13-EE34-439C-B49B-F0CB75B28E1B}" type="slidenum">
+            <a:fld id="{6C0014F0-3D1D-4459-A530-32E6C19AE461}" type="slidenum">
               <a:rPr lang="en-US" smtClean="0"/>
               <a:t>‹#›</a:t>
             </a:fld>
@@ -838,7 +664,7 @@
     </p:spTree>
     <p:extLst>
       <p:ext uri="{BB962C8B-B14F-4D97-AF65-F5344CB8AC3E}">
-        <p14:creationId xmlns:p14="http://schemas.microsoft.com/office/powerpoint/2010/main" val="3295637468"/>
+        <p14:creationId xmlns:p14="http://schemas.microsoft.com/office/powerpoint/2010/main" val="4080666653"/>
       </p:ext>
     </p:extLst>
   </p:cSld>
@@ -849,6 +675,226 @@
 </file>
 
 <file path=ppt/slideLayouts/slideLayout12.xml><?xml version="1.0" encoding="utf-8"?>
+<p:sldLayout xmlns:a="http://schemas.openxmlformats.org/drawingml/2006/main" xmlns:r="http://schemas.openxmlformats.org/officeDocument/2006/relationships" xmlns:p="http://schemas.openxmlformats.org/presentationml/2006/main" type="title" preserve="1">
+  <p:cSld name="Title Slide">
+    <p:spTree>
+      <p:nvGrpSpPr>
+        <p:cNvPr id="1" name=""/>
+        <p:cNvGrpSpPr/>
+        <p:nvPr/>
+      </p:nvGrpSpPr>
+      <p:grpSpPr>
+        <a:xfrm>
+          <a:off x="0" y="0"/>
+          <a:ext cx="0" cy="0"/>
+          <a:chOff x="0" y="0"/>
+          <a:chExt cx="0" cy="0"/>
+        </a:xfrm>
+      </p:grpSpPr>
+      <p:sp>
+        <p:nvSpPr>
+          <p:cNvPr id="2" name="Title 1">
+            <a:extLst>
+              <a:ext uri="{FF2B5EF4-FFF2-40B4-BE49-F238E27FC236}">
+                <a16:creationId xmlns:a16="http://schemas.microsoft.com/office/drawing/2014/main" id="{DD581941-0C9F-2373-780E-9153E7306EE0}"/>
+              </a:ext>
+            </a:extLst>
+          </p:cNvPr>
+          <p:cNvSpPr>
+            <a:spLocks noGrp="1"/>
+          </p:cNvSpPr>
+          <p:nvPr>
+            <p:ph type="ctrTitle"/>
+          </p:nvPr>
+        </p:nvSpPr>
+        <p:spPr>
+          <a:xfrm>
+            <a:off x="1524000" y="1122363"/>
+            <a:ext cx="9144000" cy="2387600"/>
+          </a:xfrm>
+        </p:spPr>
+        <p:txBody>
+          <a:bodyPr anchor="b"/>
+          <a:lstStyle>
+            <a:lvl1pPr algn="ctr">
+              <a:defRPr sz="6000"/>
+            </a:lvl1pPr>
+          </a:lstStyle>
+          <a:p>
+            <a:r>
+              <a:rPr lang="en-US"/>
+              <a:t>Click to edit Master title style</a:t>
+            </a:r>
+          </a:p>
+        </p:txBody>
+      </p:sp>
+      <p:sp>
+        <p:nvSpPr>
+          <p:cNvPr id="3" name="Subtitle 2">
+            <a:extLst>
+              <a:ext uri="{FF2B5EF4-FFF2-40B4-BE49-F238E27FC236}">
+                <a16:creationId xmlns:a16="http://schemas.microsoft.com/office/drawing/2014/main" id="{FC927A9A-3EED-7C12-0FFF-384113480AA1}"/>
+              </a:ext>
+            </a:extLst>
+          </p:cNvPr>
+          <p:cNvSpPr>
+            <a:spLocks noGrp="1"/>
+          </p:cNvSpPr>
+          <p:nvPr>
+            <p:ph type="subTitle" idx="1"/>
+          </p:nvPr>
+        </p:nvSpPr>
+        <p:spPr>
+          <a:xfrm>
+            <a:off x="1524000" y="3602038"/>
+            <a:ext cx="9144000" cy="1655762"/>
+          </a:xfrm>
+        </p:spPr>
+        <p:txBody>
+          <a:bodyPr/>
+          <a:lstStyle>
+            <a:lvl1pPr marL="0" indent="0" algn="ctr">
+              <a:buNone/>
+              <a:defRPr sz="2400"/>
+            </a:lvl1pPr>
+            <a:lvl2pPr marL="457200" indent="0" algn="ctr">
+              <a:buNone/>
+              <a:defRPr sz="2000"/>
+            </a:lvl2pPr>
+            <a:lvl3pPr marL="914400" indent="0" algn="ctr">
+              <a:buNone/>
+              <a:defRPr sz="1800"/>
+            </a:lvl3pPr>
+            <a:lvl4pPr marL="1371600" indent="0" algn="ctr">
+              <a:buNone/>
+              <a:defRPr sz="1600"/>
+            </a:lvl4pPr>
+            <a:lvl5pPr marL="1828800" indent="0" algn="ctr">
+              <a:buNone/>
+              <a:defRPr sz="1600"/>
+            </a:lvl5pPr>
+            <a:lvl6pPr marL="2286000" indent="0" algn="ctr">
+              <a:buNone/>
+              <a:defRPr sz="1600"/>
+            </a:lvl6pPr>
+            <a:lvl7pPr marL="2743200" indent="0" algn="ctr">
+              <a:buNone/>
+              <a:defRPr sz="1600"/>
+            </a:lvl7pPr>
+            <a:lvl8pPr marL="3200400" indent="0" algn="ctr">
+              <a:buNone/>
+              <a:defRPr sz="1600"/>
+            </a:lvl8pPr>
+            <a:lvl9pPr marL="3657600" indent="0" algn="ctr">
+              <a:buNone/>
+              <a:defRPr sz="1600"/>
+            </a:lvl9pPr>
+          </a:lstStyle>
+          <a:p>
+            <a:r>
+              <a:rPr lang="en-US"/>
+              <a:t>Click to edit Master subtitle style</a:t>
+            </a:r>
+          </a:p>
+        </p:txBody>
+      </p:sp>
+      <p:sp>
+        <p:nvSpPr>
+          <p:cNvPr id="4" name="Date Placeholder 3">
+            <a:extLst>
+              <a:ext uri="{FF2B5EF4-FFF2-40B4-BE49-F238E27FC236}">
+                <a16:creationId xmlns:a16="http://schemas.microsoft.com/office/drawing/2014/main" id="{E43FE0D7-D5FB-3326-9483-F15495075853}"/>
+              </a:ext>
+            </a:extLst>
+          </p:cNvPr>
+          <p:cNvSpPr>
+            <a:spLocks noGrp="1"/>
+          </p:cNvSpPr>
+          <p:nvPr>
+            <p:ph type="dt" sz="half" idx="10"/>
+          </p:nvPr>
+        </p:nvSpPr>
+        <p:spPr/>
+        <p:txBody>
+          <a:bodyPr/>
+          <a:lstStyle/>
+          <a:p>
+            <a:fld id="{421996D4-4A1C-4BBC-AA2B-FD5B7FC395A0}" type="datetime1">
+              <a:rPr lang="en-US" smtClean="0"/>
+              <a:t>11/21/2024</a:t>
+            </a:fld>
+            <a:endParaRPr lang="en-US"/>
+          </a:p>
+        </p:txBody>
+      </p:sp>
+      <p:sp>
+        <p:nvSpPr>
+          <p:cNvPr id="5" name="Footer Placeholder 4">
+            <a:extLst>
+              <a:ext uri="{FF2B5EF4-FFF2-40B4-BE49-F238E27FC236}">
+                <a16:creationId xmlns:a16="http://schemas.microsoft.com/office/drawing/2014/main" id="{AAEBCD6E-6B69-E7FF-A8EA-F8E294BDA7E7}"/>
+              </a:ext>
+            </a:extLst>
+          </p:cNvPr>
+          <p:cNvSpPr>
+            <a:spLocks noGrp="1"/>
+          </p:cNvSpPr>
+          <p:nvPr>
+            <p:ph type="ftr" sz="quarter" idx="11"/>
+          </p:nvPr>
+        </p:nvSpPr>
+        <p:spPr/>
+        <p:txBody>
+          <a:bodyPr/>
+          <a:lstStyle/>
+          <a:p>
+            <a:endParaRPr lang="en-US"/>
+          </a:p>
+        </p:txBody>
+      </p:sp>
+      <p:sp>
+        <p:nvSpPr>
+          <p:cNvPr id="6" name="Slide Number Placeholder 5">
+            <a:extLst>
+              <a:ext uri="{FF2B5EF4-FFF2-40B4-BE49-F238E27FC236}">
+                <a16:creationId xmlns:a16="http://schemas.microsoft.com/office/drawing/2014/main" id="{FF22DB5A-E75D-49DD-123C-37B6BC85E903}"/>
+              </a:ext>
+            </a:extLst>
+          </p:cNvPr>
+          <p:cNvSpPr>
+            <a:spLocks noGrp="1"/>
+          </p:cNvSpPr>
+          <p:nvPr>
+            <p:ph type="sldNum" sz="quarter" idx="12"/>
+          </p:nvPr>
+        </p:nvSpPr>
+        <p:spPr/>
+        <p:txBody>
+          <a:bodyPr/>
+          <a:lstStyle/>
+          <a:p>
+            <a:fld id="{B46E5E13-EE34-439C-B49B-F0CB75B28E1B}" type="slidenum">
+              <a:rPr lang="en-US" smtClean="0"/>
+              <a:t>‹#›</a:t>
+            </a:fld>
+            <a:endParaRPr lang="en-US"/>
+          </a:p>
+        </p:txBody>
+      </p:sp>
+    </p:spTree>
+    <p:extLst>
+      <p:ext uri="{BB962C8B-B14F-4D97-AF65-F5344CB8AC3E}">
+        <p14:creationId xmlns:p14="http://schemas.microsoft.com/office/powerpoint/2010/main" val="1581477249"/>
+      </p:ext>
+    </p:extLst>
+  </p:cSld>
+  <p:clrMapOvr>
+    <a:masterClrMapping/>
+  </p:clrMapOvr>
+</p:sldLayout>
+</file>
+
+<file path=ppt/slideLayouts/slideLayout13.xml><?xml version="1.0" encoding="utf-8"?>
 <p:sldLayout xmlns:a="http://schemas.openxmlformats.org/drawingml/2006/main" xmlns:r="http://schemas.openxmlformats.org/officeDocument/2006/relationships" xmlns:p="http://schemas.openxmlformats.org/presentationml/2006/main">
   <p:cSld name="Contents slide layout">
     <p:spTree>
@@ -919,7 +965,7 @@
     </p:spTree>
     <p:extLst>
       <p:ext uri="{BB962C8B-B14F-4D97-AF65-F5344CB8AC3E}">
-        <p14:creationId xmlns:p14="http://schemas.microsoft.com/office/powerpoint/2010/main" val="2488198393"/>
+        <p14:creationId xmlns:p14="http://schemas.microsoft.com/office/powerpoint/2010/main" val="152121681"/>
       </p:ext>
     </p:extLst>
   </p:cSld>
@@ -929,7 +975,7 @@
 </p:sldLayout>
 </file>
 
-<file path=ppt/slideLayouts/slideLayout13.xml><?xml version="1.0" encoding="utf-8"?>
+<file path=ppt/slideLayouts/slideLayout14.xml><?xml version="1.0" encoding="utf-8"?>
 <p:sldLayout xmlns:a="http://schemas.openxmlformats.org/drawingml/2006/main" xmlns:r="http://schemas.openxmlformats.org/officeDocument/2006/relationships" xmlns:p="http://schemas.openxmlformats.org/presentationml/2006/main">
   <p:cSld name="2_Contents slide layout">
     <p:spTree>
@@ -949,7 +995,7 @@
     </p:spTree>
     <p:extLst>
       <p:ext uri="{BB962C8B-B14F-4D97-AF65-F5344CB8AC3E}">
-        <p14:creationId xmlns:p14="http://schemas.microsoft.com/office/powerpoint/2010/main" val="2633931619"/>
+        <p14:creationId xmlns:p14="http://schemas.microsoft.com/office/powerpoint/2010/main" val="2136016684"/>
       </p:ext>
     </p:extLst>
   </p:cSld>
@@ -981,7 +1027,7 @@
           <p:cNvPr id="2" name="Title 1">
             <a:extLst>
               <a:ext uri="{FF2B5EF4-FFF2-40B4-BE49-F238E27FC236}">
-                <a16:creationId xmlns:a16="http://schemas.microsoft.com/office/drawing/2014/main" id="{9B53F3F8-E052-488D-90D0-D947B99C4AE2}"/>
+                <a16:creationId xmlns:a16="http://schemas.microsoft.com/office/drawing/2014/main" id="{6A54579A-6906-4E6D-591C-C727DF060739}"/>
               </a:ext>
             </a:extLst>
           </p:cNvPr>
@@ -992,7 +1038,15 @@
             <p:ph type="title"/>
           </p:nvPr>
         </p:nvSpPr>
-        <p:spPr/>
+        <p:spPr>
+          <a:xfrm>
+            <a:off x="602787" y="1498382"/>
+            <a:ext cx="10515600" cy="1325563"/>
+          </a:xfrm>
+          <a:prstGeom prst="rect">
+            <a:avLst/>
+          </a:prstGeom>
+        </p:spPr>
         <p:txBody>
           <a:bodyPr/>
           <a:lstStyle/>
@@ -1009,7 +1063,7 @@
           <p:cNvPr id="3" name="Content Placeholder 2">
             <a:extLst>
               <a:ext uri="{FF2B5EF4-FFF2-40B4-BE49-F238E27FC236}">
-                <a16:creationId xmlns:a16="http://schemas.microsoft.com/office/drawing/2014/main" id="{EDD73720-466D-068E-61C9-BDF9BF686AF3}"/>
+                <a16:creationId xmlns:a16="http://schemas.microsoft.com/office/drawing/2014/main" id="{9C426EAA-227D-5ECA-282E-3A3B3C8AE97C}"/>
               </a:ext>
             </a:extLst>
           </p:cNvPr>
@@ -1020,7 +1074,15 @@
             <p:ph idx="1"/>
           </p:nvPr>
         </p:nvSpPr>
-        <p:spPr/>
+        <p:spPr>
+          <a:xfrm>
+            <a:off x="838200" y="1825625"/>
+            <a:ext cx="10515600" cy="4351338"/>
+          </a:xfrm>
+          <a:prstGeom prst="rect">
+            <a:avLst/>
+          </a:prstGeom>
+        </p:spPr>
         <p:txBody>
           <a:bodyPr/>
           <a:lstStyle/>
@@ -1066,7 +1128,7 @@
           <p:cNvPr id="4" name="Date Placeholder 3">
             <a:extLst>
               <a:ext uri="{FF2B5EF4-FFF2-40B4-BE49-F238E27FC236}">
-                <a16:creationId xmlns:a16="http://schemas.microsoft.com/office/drawing/2014/main" id="{86D8B675-57D5-D89F-01F5-209268AB9E4B}"/>
+                <a16:creationId xmlns:a16="http://schemas.microsoft.com/office/drawing/2014/main" id="{7F651069-7D1F-49B9-3F01-D52A9F3A60B7}"/>
               </a:ext>
             </a:extLst>
           </p:cNvPr>
@@ -1077,14 +1139,22 @@
             <p:ph type="dt" sz="half" idx="10"/>
           </p:nvPr>
         </p:nvSpPr>
-        <p:spPr/>
+        <p:spPr>
+          <a:xfrm>
+            <a:off x="838200" y="6445249"/>
+            <a:ext cx="2743200" cy="365125"/>
+          </a:xfrm>
+          <a:prstGeom prst="rect">
+            <a:avLst/>
+          </a:prstGeom>
+        </p:spPr>
         <p:txBody>
           <a:bodyPr/>
           <a:lstStyle/>
           <a:p>
-            <a:fld id="{490605F8-8C86-41F5-9F5E-04EDB8C2540B}" type="datetime1">
+            <a:fld id="{71087A05-F855-4434-8DDE-39A8542098A6}" type="datetimeFigureOut">
               <a:rPr lang="en-US" smtClean="0"/>
-              <a:t>9/16/2024</a:t>
+              <a:t>11/21/2024</a:t>
             </a:fld>
             <a:endParaRPr lang="en-US"/>
           </a:p>
@@ -1095,7 +1165,7 @@
           <p:cNvPr id="5" name="Footer Placeholder 4">
             <a:extLst>
               <a:ext uri="{FF2B5EF4-FFF2-40B4-BE49-F238E27FC236}">
-                <a16:creationId xmlns:a16="http://schemas.microsoft.com/office/drawing/2014/main" id="{7053F998-E2CB-02E4-49BF-97696F865F45}"/>
+                <a16:creationId xmlns:a16="http://schemas.microsoft.com/office/drawing/2014/main" id="{5756067D-C727-84C7-612B-F665F36170EE}"/>
               </a:ext>
             </a:extLst>
           </p:cNvPr>
@@ -1106,7 +1176,15 @@
             <p:ph type="ftr" sz="quarter" idx="11"/>
           </p:nvPr>
         </p:nvSpPr>
-        <p:spPr/>
+        <p:spPr>
+          <a:xfrm>
+            <a:off x="4038600" y="6356350"/>
+            <a:ext cx="4114800" cy="365125"/>
+          </a:xfrm>
+          <a:prstGeom prst="rect">
+            <a:avLst/>
+          </a:prstGeom>
+        </p:spPr>
         <p:txBody>
           <a:bodyPr/>
           <a:lstStyle/>
@@ -1120,7 +1198,7 @@
           <p:cNvPr id="6" name="Slide Number Placeholder 5">
             <a:extLst>
               <a:ext uri="{FF2B5EF4-FFF2-40B4-BE49-F238E27FC236}">
-                <a16:creationId xmlns:a16="http://schemas.microsoft.com/office/drawing/2014/main" id="{FED59867-B8CC-A6E9-DDC7-43729DA70B76}"/>
+                <a16:creationId xmlns:a16="http://schemas.microsoft.com/office/drawing/2014/main" id="{A3C64F88-1C59-3F79-931F-4F91F22F14D3}"/>
               </a:ext>
             </a:extLst>
           </p:cNvPr>
@@ -1131,12 +1209,20 @@
             <p:ph type="sldNum" sz="quarter" idx="12"/>
           </p:nvPr>
         </p:nvSpPr>
-        <p:spPr/>
+        <p:spPr>
+          <a:xfrm>
+            <a:off x="8610600" y="6356350"/>
+            <a:ext cx="2743200" cy="365125"/>
+          </a:xfrm>
+          <a:prstGeom prst="rect">
+            <a:avLst/>
+          </a:prstGeom>
+        </p:spPr>
         <p:txBody>
           <a:bodyPr/>
           <a:lstStyle/>
           <a:p>
-            <a:fld id="{B46E5E13-EE34-439C-B49B-F0CB75B28E1B}" type="slidenum">
+            <a:fld id="{6C0014F0-3D1D-4459-A530-32E6C19AE461}" type="slidenum">
               <a:rPr lang="en-US" smtClean="0"/>
               <a:t>‹#›</a:t>
             </a:fld>
@@ -1147,7 +1233,7 @@
     </p:spTree>
     <p:extLst>
       <p:ext uri="{BB962C8B-B14F-4D97-AF65-F5344CB8AC3E}">
-        <p14:creationId xmlns:p14="http://schemas.microsoft.com/office/powerpoint/2010/main" val="810322467"/>
+        <p14:creationId xmlns:p14="http://schemas.microsoft.com/office/powerpoint/2010/main" val="3412372441"/>
       </p:ext>
     </p:extLst>
   </p:cSld>
@@ -1179,7 +1265,7 @@
           <p:cNvPr id="2" name="Title 1">
             <a:extLst>
               <a:ext uri="{FF2B5EF4-FFF2-40B4-BE49-F238E27FC236}">
-                <a16:creationId xmlns:a16="http://schemas.microsoft.com/office/drawing/2014/main" id="{24562E59-A35F-2B41-2BE7-EC4592347134}"/>
+                <a16:creationId xmlns:a16="http://schemas.microsoft.com/office/drawing/2014/main" id="{C2E67B73-4EBE-86E7-DEDC-379A7358D71A}"/>
               </a:ext>
             </a:extLst>
           </p:cNvPr>
@@ -1195,6 +1281,9 @@
             <a:off x="831850" y="1709738"/>
             <a:ext cx="10515600" cy="2852737"/>
           </a:xfrm>
+          <a:prstGeom prst="rect">
+            <a:avLst/>
+          </a:prstGeom>
         </p:spPr>
         <p:txBody>
           <a:bodyPr anchor="b"/>
@@ -1216,7 +1305,7 @@
           <p:cNvPr id="3" name="Text Placeholder 2">
             <a:extLst>
               <a:ext uri="{FF2B5EF4-FFF2-40B4-BE49-F238E27FC236}">
-                <a16:creationId xmlns:a16="http://schemas.microsoft.com/office/drawing/2014/main" id="{6CB88CFD-8D25-CDFD-1F9A-6A5BAFD86DD9}"/>
+                <a16:creationId xmlns:a16="http://schemas.microsoft.com/office/drawing/2014/main" id="{39DC486F-4B2F-BAA7-822D-AF77A301C3EF}"/>
               </a:ext>
             </a:extLst>
           </p:cNvPr>
@@ -1232,6 +1321,9 @@
             <a:off x="831850" y="4589463"/>
             <a:ext cx="10515600" cy="1500187"/>
           </a:xfrm>
+          <a:prstGeom prst="rect">
+            <a:avLst/>
+          </a:prstGeom>
         </p:spPr>
         <p:txBody>
           <a:bodyPr/>
@@ -1241,7 +1333,7 @@
               <a:defRPr sz="2400">
                 <a:solidFill>
                   <a:schemeClr val="tx1">
-                    <a:tint val="75000"/>
+                    <a:tint val="82000"/>
                   </a:schemeClr>
                 </a:solidFill>
               </a:defRPr>
@@ -1251,7 +1343,7 @@
               <a:defRPr sz="2000">
                 <a:solidFill>
                   <a:schemeClr val="tx1">
-                    <a:tint val="75000"/>
+                    <a:tint val="82000"/>
                   </a:schemeClr>
                 </a:solidFill>
               </a:defRPr>
@@ -1261,7 +1353,7 @@
               <a:defRPr sz="1800">
                 <a:solidFill>
                   <a:schemeClr val="tx1">
-                    <a:tint val="75000"/>
+                    <a:tint val="82000"/>
                   </a:schemeClr>
                 </a:solidFill>
               </a:defRPr>
@@ -1271,7 +1363,7 @@
               <a:defRPr sz="1600">
                 <a:solidFill>
                   <a:schemeClr val="tx1">
-                    <a:tint val="75000"/>
+                    <a:tint val="82000"/>
                   </a:schemeClr>
                 </a:solidFill>
               </a:defRPr>
@@ -1281,7 +1373,7 @@
               <a:defRPr sz="1600">
                 <a:solidFill>
                   <a:schemeClr val="tx1">
-                    <a:tint val="75000"/>
+                    <a:tint val="82000"/>
                   </a:schemeClr>
                 </a:solidFill>
               </a:defRPr>
@@ -1291,7 +1383,7 @@
               <a:defRPr sz="1600">
                 <a:solidFill>
                   <a:schemeClr val="tx1">
-                    <a:tint val="75000"/>
+                    <a:tint val="82000"/>
                   </a:schemeClr>
                 </a:solidFill>
               </a:defRPr>
@@ -1301,7 +1393,7 @@
               <a:defRPr sz="1600">
                 <a:solidFill>
                   <a:schemeClr val="tx1">
-                    <a:tint val="75000"/>
+                    <a:tint val="82000"/>
                   </a:schemeClr>
                 </a:solidFill>
               </a:defRPr>
@@ -1311,7 +1403,7 @@
               <a:defRPr sz="1600">
                 <a:solidFill>
                   <a:schemeClr val="tx1">
-                    <a:tint val="75000"/>
+                    <a:tint val="82000"/>
                   </a:schemeClr>
                 </a:solidFill>
               </a:defRPr>
@@ -1321,7 +1413,7 @@
               <a:defRPr sz="1600">
                 <a:solidFill>
                   <a:schemeClr val="tx1">
-                    <a:tint val="75000"/>
+                    <a:tint val="82000"/>
                   </a:schemeClr>
                 </a:solidFill>
               </a:defRPr>
@@ -1341,7 +1433,7 @@
           <p:cNvPr id="4" name="Date Placeholder 3">
             <a:extLst>
               <a:ext uri="{FF2B5EF4-FFF2-40B4-BE49-F238E27FC236}">
-                <a16:creationId xmlns:a16="http://schemas.microsoft.com/office/drawing/2014/main" id="{5DC2235C-EA94-C1E9-D4DB-83056BF4C68F}"/>
+                <a16:creationId xmlns:a16="http://schemas.microsoft.com/office/drawing/2014/main" id="{AC1AB7C3-5E85-3B9F-4177-A1AF2AB486D8}"/>
               </a:ext>
             </a:extLst>
           </p:cNvPr>
@@ -1352,14 +1444,22 @@
             <p:ph type="dt" sz="half" idx="10"/>
           </p:nvPr>
         </p:nvSpPr>
-        <p:spPr/>
+        <p:spPr>
+          <a:xfrm>
+            <a:off x="838200" y="6445249"/>
+            <a:ext cx="2743200" cy="365125"/>
+          </a:xfrm>
+          <a:prstGeom prst="rect">
+            <a:avLst/>
+          </a:prstGeom>
+        </p:spPr>
         <p:txBody>
           <a:bodyPr/>
           <a:lstStyle/>
           <a:p>
-            <a:fld id="{CA355DA2-1E89-41CC-B722-CBFC08F260AE}" type="datetime1">
+            <a:fld id="{71087A05-F855-4434-8DDE-39A8542098A6}" type="datetimeFigureOut">
               <a:rPr lang="en-US" smtClean="0"/>
-              <a:t>9/16/2024</a:t>
+              <a:t>11/21/2024</a:t>
             </a:fld>
             <a:endParaRPr lang="en-US"/>
           </a:p>
@@ -1370,7 +1470,7 @@
           <p:cNvPr id="5" name="Footer Placeholder 4">
             <a:extLst>
               <a:ext uri="{FF2B5EF4-FFF2-40B4-BE49-F238E27FC236}">
-                <a16:creationId xmlns:a16="http://schemas.microsoft.com/office/drawing/2014/main" id="{E178E07A-E8A4-2767-2911-D824C588F20D}"/>
+                <a16:creationId xmlns:a16="http://schemas.microsoft.com/office/drawing/2014/main" id="{8950E3CD-02DB-7A08-79DC-74CA926DE70F}"/>
               </a:ext>
             </a:extLst>
           </p:cNvPr>
@@ -1381,7 +1481,15 @@
             <p:ph type="ftr" sz="quarter" idx="11"/>
           </p:nvPr>
         </p:nvSpPr>
-        <p:spPr/>
+        <p:spPr>
+          <a:xfrm>
+            <a:off x="4038600" y="6356350"/>
+            <a:ext cx="4114800" cy="365125"/>
+          </a:xfrm>
+          <a:prstGeom prst="rect">
+            <a:avLst/>
+          </a:prstGeom>
+        </p:spPr>
         <p:txBody>
           <a:bodyPr/>
           <a:lstStyle/>
@@ -1395,7 +1503,7 @@
           <p:cNvPr id="6" name="Slide Number Placeholder 5">
             <a:extLst>
               <a:ext uri="{FF2B5EF4-FFF2-40B4-BE49-F238E27FC236}">
-                <a16:creationId xmlns:a16="http://schemas.microsoft.com/office/drawing/2014/main" id="{6D865987-67F3-82BA-9FFE-7A512551887E}"/>
+                <a16:creationId xmlns:a16="http://schemas.microsoft.com/office/drawing/2014/main" id="{78D6A67F-8469-E8AB-D35D-DEC64EA01BF9}"/>
               </a:ext>
             </a:extLst>
           </p:cNvPr>
@@ -1406,12 +1514,20 @@
             <p:ph type="sldNum" sz="quarter" idx="12"/>
           </p:nvPr>
         </p:nvSpPr>
-        <p:spPr/>
+        <p:spPr>
+          <a:xfrm>
+            <a:off x="8610600" y="6356350"/>
+            <a:ext cx="2743200" cy="365125"/>
+          </a:xfrm>
+          <a:prstGeom prst="rect">
+            <a:avLst/>
+          </a:prstGeom>
+        </p:spPr>
         <p:txBody>
           <a:bodyPr/>
           <a:lstStyle/>
           <a:p>
-            <a:fld id="{B46E5E13-EE34-439C-B49B-F0CB75B28E1B}" type="slidenum">
+            <a:fld id="{6C0014F0-3D1D-4459-A530-32E6C19AE461}" type="slidenum">
               <a:rPr lang="en-US" smtClean="0"/>
               <a:t>‹#›</a:t>
             </a:fld>
@@ -1422,7 +1538,7 @@
     </p:spTree>
     <p:extLst>
       <p:ext uri="{BB962C8B-B14F-4D97-AF65-F5344CB8AC3E}">
-        <p14:creationId xmlns:p14="http://schemas.microsoft.com/office/powerpoint/2010/main" val="3397068280"/>
+        <p14:creationId xmlns:p14="http://schemas.microsoft.com/office/powerpoint/2010/main" val="2389875780"/>
       </p:ext>
     </p:extLst>
   </p:cSld>
@@ -1454,7 +1570,7 @@
           <p:cNvPr id="2" name="Title 1">
             <a:extLst>
               <a:ext uri="{FF2B5EF4-FFF2-40B4-BE49-F238E27FC236}">
-                <a16:creationId xmlns:a16="http://schemas.microsoft.com/office/drawing/2014/main" id="{D7417273-9D16-5639-8844-46262C7A214A}"/>
+                <a16:creationId xmlns:a16="http://schemas.microsoft.com/office/drawing/2014/main" id="{BFB01EF5-6F0D-8686-CDD5-7DB43C9F613E}"/>
               </a:ext>
             </a:extLst>
           </p:cNvPr>
@@ -1465,7 +1581,15 @@
             <p:ph type="title"/>
           </p:nvPr>
         </p:nvSpPr>
-        <p:spPr/>
+        <p:spPr>
+          <a:xfrm>
+            <a:off x="602787" y="1498382"/>
+            <a:ext cx="10515600" cy="1325563"/>
+          </a:xfrm>
+          <a:prstGeom prst="rect">
+            <a:avLst/>
+          </a:prstGeom>
+        </p:spPr>
         <p:txBody>
           <a:bodyPr/>
           <a:lstStyle/>
@@ -1482,7 +1606,7 @@
           <p:cNvPr id="3" name="Content Placeholder 2">
             <a:extLst>
               <a:ext uri="{FF2B5EF4-FFF2-40B4-BE49-F238E27FC236}">
-                <a16:creationId xmlns:a16="http://schemas.microsoft.com/office/drawing/2014/main" id="{B0CB97D0-5920-4A0C-455B-784B34D523CD}"/>
+                <a16:creationId xmlns:a16="http://schemas.microsoft.com/office/drawing/2014/main" id="{2ED595E2-3C65-7E01-6223-574BF8FB8119}"/>
               </a:ext>
             </a:extLst>
           </p:cNvPr>
@@ -1498,6 +1622,9 @@
             <a:off x="838200" y="1825625"/>
             <a:ext cx="5181600" cy="4351338"/>
           </a:xfrm>
+          <a:prstGeom prst="rect">
+            <a:avLst/>
+          </a:prstGeom>
         </p:spPr>
         <p:txBody>
           <a:bodyPr/>
@@ -1544,7 +1671,7 @@
           <p:cNvPr id="4" name="Content Placeholder 3">
             <a:extLst>
               <a:ext uri="{FF2B5EF4-FFF2-40B4-BE49-F238E27FC236}">
-                <a16:creationId xmlns:a16="http://schemas.microsoft.com/office/drawing/2014/main" id="{49C5FDBC-D200-7F14-85E8-2B208477DAF9}"/>
+                <a16:creationId xmlns:a16="http://schemas.microsoft.com/office/drawing/2014/main" id="{DFDA5243-FD59-824D-9801-C6A7FC40AD32}"/>
               </a:ext>
             </a:extLst>
           </p:cNvPr>
@@ -1560,6 +1687,9 @@
             <a:off x="6172200" y="1825625"/>
             <a:ext cx="5181600" cy="4351338"/>
           </a:xfrm>
+          <a:prstGeom prst="rect">
+            <a:avLst/>
+          </a:prstGeom>
         </p:spPr>
         <p:txBody>
           <a:bodyPr/>
@@ -1606,7 +1736,7 @@
           <p:cNvPr id="5" name="Date Placeholder 4">
             <a:extLst>
               <a:ext uri="{FF2B5EF4-FFF2-40B4-BE49-F238E27FC236}">
-                <a16:creationId xmlns:a16="http://schemas.microsoft.com/office/drawing/2014/main" id="{9C0A7D34-EDD4-2B7C-7597-31E5AE2E8BD6}"/>
+                <a16:creationId xmlns:a16="http://schemas.microsoft.com/office/drawing/2014/main" id="{BB0B0631-5586-E8EE-C280-1DC0A64D54C9}"/>
               </a:ext>
             </a:extLst>
           </p:cNvPr>
@@ -1617,14 +1747,22 @@
             <p:ph type="dt" sz="half" idx="10"/>
           </p:nvPr>
         </p:nvSpPr>
-        <p:spPr/>
+        <p:spPr>
+          <a:xfrm>
+            <a:off x="838200" y="6445249"/>
+            <a:ext cx="2743200" cy="365125"/>
+          </a:xfrm>
+          <a:prstGeom prst="rect">
+            <a:avLst/>
+          </a:prstGeom>
+        </p:spPr>
         <p:txBody>
           <a:bodyPr/>
           <a:lstStyle/>
           <a:p>
-            <a:fld id="{7F6AFD48-C472-404E-B7B5-BA44CCF2F55D}" type="datetime1">
+            <a:fld id="{71087A05-F855-4434-8DDE-39A8542098A6}" type="datetimeFigureOut">
               <a:rPr lang="en-US" smtClean="0"/>
-              <a:t>9/16/2024</a:t>
+              <a:t>11/21/2024</a:t>
             </a:fld>
             <a:endParaRPr lang="en-US"/>
           </a:p>
@@ -1635,7 +1773,7 @@
           <p:cNvPr id="6" name="Footer Placeholder 5">
             <a:extLst>
               <a:ext uri="{FF2B5EF4-FFF2-40B4-BE49-F238E27FC236}">
-                <a16:creationId xmlns:a16="http://schemas.microsoft.com/office/drawing/2014/main" id="{001C50E6-D64B-52FC-1719-552ED73B243D}"/>
+                <a16:creationId xmlns:a16="http://schemas.microsoft.com/office/drawing/2014/main" id="{4C7022BC-4356-2E12-5FFC-95893C9539C6}"/>
               </a:ext>
             </a:extLst>
           </p:cNvPr>
@@ -1646,7 +1784,15 @@
             <p:ph type="ftr" sz="quarter" idx="11"/>
           </p:nvPr>
         </p:nvSpPr>
-        <p:spPr/>
+        <p:spPr>
+          <a:xfrm>
+            <a:off x="4038600" y="6356350"/>
+            <a:ext cx="4114800" cy="365125"/>
+          </a:xfrm>
+          <a:prstGeom prst="rect">
+            <a:avLst/>
+          </a:prstGeom>
+        </p:spPr>
         <p:txBody>
           <a:bodyPr/>
           <a:lstStyle/>
@@ -1660,7 +1806,7 @@
           <p:cNvPr id="7" name="Slide Number Placeholder 6">
             <a:extLst>
               <a:ext uri="{FF2B5EF4-FFF2-40B4-BE49-F238E27FC236}">
-                <a16:creationId xmlns:a16="http://schemas.microsoft.com/office/drawing/2014/main" id="{159CBFED-25BE-7153-12B4-D0E8588920D3}"/>
+                <a16:creationId xmlns:a16="http://schemas.microsoft.com/office/drawing/2014/main" id="{2F6F0616-5185-D339-BFDE-0E16B9960312}"/>
               </a:ext>
             </a:extLst>
           </p:cNvPr>
@@ -1671,12 +1817,20 @@
             <p:ph type="sldNum" sz="quarter" idx="12"/>
           </p:nvPr>
         </p:nvSpPr>
-        <p:spPr/>
+        <p:spPr>
+          <a:xfrm>
+            <a:off x="8610600" y="6356350"/>
+            <a:ext cx="2743200" cy="365125"/>
+          </a:xfrm>
+          <a:prstGeom prst="rect">
+            <a:avLst/>
+          </a:prstGeom>
+        </p:spPr>
         <p:txBody>
           <a:bodyPr/>
           <a:lstStyle/>
           <a:p>
-            <a:fld id="{B46E5E13-EE34-439C-B49B-F0CB75B28E1B}" type="slidenum">
+            <a:fld id="{6C0014F0-3D1D-4459-A530-32E6C19AE461}" type="slidenum">
               <a:rPr lang="en-US" smtClean="0"/>
               <a:t>‹#›</a:t>
             </a:fld>
@@ -1687,7 +1841,7 @@
     </p:spTree>
     <p:extLst>
       <p:ext uri="{BB962C8B-B14F-4D97-AF65-F5344CB8AC3E}">
-        <p14:creationId xmlns:p14="http://schemas.microsoft.com/office/powerpoint/2010/main" val="239742289"/>
+        <p14:creationId xmlns:p14="http://schemas.microsoft.com/office/powerpoint/2010/main" val="1597145891"/>
       </p:ext>
     </p:extLst>
   </p:cSld>
@@ -1719,7 +1873,7 @@
           <p:cNvPr id="2" name="Title 1">
             <a:extLst>
               <a:ext uri="{FF2B5EF4-FFF2-40B4-BE49-F238E27FC236}">
-                <a16:creationId xmlns:a16="http://schemas.microsoft.com/office/drawing/2014/main" id="{4EC51817-320C-EB58-D57C-AAA586C0053E}"/>
+                <a16:creationId xmlns:a16="http://schemas.microsoft.com/office/drawing/2014/main" id="{0AADFFED-E59B-6D4E-6B64-0F5B746DEB96}"/>
               </a:ext>
             </a:extLst>
           </p:cNvPr>
@@ -1735,6 +1889,9 @@
             <a:off x="839788" y="365125"/>
             <a:ext cx="10515600" cy="1325563"/>
           </a:xfrm>
+          <a:prstGeom prst="rect">
+            <a:avLst/>
+          </a:prstGeom>
         </p:spPr>
         <p:txBody>
           <a:bodyPr/>
@@ -1752,7 +1909,7 @@
           <p:cNvPr id="3" name="Text Placeholder 2">
             <a:extLst>
               <a:ext uri="{FF2B5EF4-FFF2-40B4-BE49-F238E27FC236}">
-                <a16:creationId xmlns:a16="http://schemas.microsoft.com/office/drawing/2014/main" id="{21FF1CDE-5ED1-45BC-1BBF-82DBA76868F4}"/>
+                <a16:creationId xmlns:a16="http://schemas.microsoft.com/office/drawing/2014/main" id="{1D25BBE6-1C38-6614-EF63-AF608E55C235}"/>
               </a:ext>
             </a:extLst>
           </p:cNvPr>
@@ -1768,6 +1925,9 @@
             <a:off x="839788" y="1681163"/>
             <a:ext cx="5157787" cy="823912"/>
           </a:xfrm>
+          <a:prstGeom prst="rect">
+            <a:avLst/>
+          </a:prstGeom>
         </p:spPr>
         <p:txBody>
           <a:bodyPr anchor="b"/>
@@ -1823,7 +1983,7 @@
           <p:cNvPr id="4" name="Content Placeholder 3">
             <a:extLst>
               <a:ext uri="{FF2B5EF4-FFF2-40B4-BE49-F238E27FC236}">
-                <a16:creationId xmlns:a16="http://schemas.microsoft.com/office/drawing/2014/main" id="{CB45744E-8CC8-1B85-F492-6648EB8A9996}"/>
+                <a16:creationId xmlns:a16="http://schemas.microsoft.com/office/drawing/2014/main" id="{D639AC2E-A378-9E93-69F7-FF92F43FC3A8}"/>
               </a:ext>
             </a:extLst>
           </p:cNvPr>
@@ -1839,6 +1999,9 @@
             <a:off x="839788" y="2505075"/>
             <a:ext cx="5157787" cy="3684588"/>
           </a:xfrm>
+          <a:prstGeom prst="rect">
+            <a:avLst/>
+          </a:prstGeom>
         </p:spPr>
         <p:txBody>
           <a:bodyPr/>
@@ -1885,7 +2048,7 @@
           <p:cNvPr id="5" name="Text Placeholder 4">
             <a:extLst>
               <a:ext uri="{FF2B5EF4-FFF2-40B4-BE49-F238E27FC236}">
-                <a16:creationId xmlns:a16="http://schemas.microsoft.com/office/drawing/2014/main" id="{E073266C-0D92-527A-30E1-7ECDD28C0F91}"/>
+                <a16:creationId xmlns:a16="http://schemas.microsoft.com/office/drawing/2014/main" id="{E57BF240-C80B-E670-B12B-8BCBA850E04F}"/>
               </a:ext>
             </a:extLst>
           </p:cNvPr>
@@ -1901,6 +2064,9 @@
             <a:off x="6172200" y="1681163"/>
             <a:ext cx="5183188" cy="823912"/>
           </a:xfrm>
+          <a:prstGeom prst="rect">
+            <a:avLst/>
+          </a:prstGeom>
         </p:spPr>
         <p:txBody>
           <a:bodyPr anchor="b"/>
@@ -1956,7 +2122,7 @@
           <p:cNvPr id="6" name="Content Placeholder 5">
             <a:extLst>
               <a:ext uri="{FF2B5EF4-FFF2-40B4-BE49-F238E27FC236}">
-                <a16:creationId xmlns:a16="http://schemas.microsoft.com/office/drawing/2014/main" id="{1E10B574-E76B-4DE3-3CFA-1190E252BA61}"/>
+                <a16:creationId xmlns:a16="http://schemas.microsoft.com/office/drawing/2014/main" id="{6AB0FB7E-A75F-AB8B-3217-710BBB592FB3}"/>
               </a:ext>
             </a:extLst>
           </p:cNvPr>
@@ -1972,6 +2138,9 @@
             <a:off x="6172200" y="2505075"/>
             <a:ext cx="5183188" cy="3684588"/>
           </a:xfrm>
+          <a:prstGeom prst="rect">
+            <a:avLst/>
+          </a:prstGeom>
         </p:spPr>
         <p:txBody>
           <a:bodyPr/>
@@ -2018,7 +2187,7 @@
           <p:cNvPr id="7" name="Date Placeholder 6">
             <a:extLst>
               <a:ext uri="{FF2B5EF4-FFF2-40B4-BE49-F238E27FC236}">
-                <a16:creationId xmlns:a16="http://schemas.microsoft.com/office/drawing/2014/main" id="{B22F13C7-15CB-D0AD-592A-4574F62CF3CA}"/>
+                <a16:creationId xmlns:a16="http://schemas.microsoft.com/office/drawing/2014/main" id="{BBAC691C-E8A1-E4A4-391E-3EA19AE5DF7A}"/>
               </a:ext>
             </a:extLst>
           </p:cNvPr>
@@ -2029,14 +2198,22 @@
             <p:ph type="dt" sz="half" idx="10"/>
           </p:nvPr>
         </p:nvSpPr>
-        <p:spPr/>
+        <p:spPr>
+          <a:xfrm>
+            <a:off x="838200" y="6445249"/>
+            <a:ext cx="2743200" cy="365125"/>
+          </a:xfrm>
+          <a:prstGeom prst="rect">
+            <a:avLst/>
+          </a:prstGeom>
+        </p:spPr>
         <p:txBody>
           <a:bodyPr/>
           <a:lstStyle/>
           <a:p>
-            <a:fld id="{B33F52E9-9255-4CAF-909C-660126F1B079}" type="datetime1">
+            <a:fld id="{71087A05-F855-4434-8DDE-39A8542098A6}" type="datetimeFigureOut">
               <a:rPr lang="en-US" smtClean="0"/>
-              <a:t>9/16/2024</a:t>
+              <a:t>11/21/2024</a:t>
             </a:fld>
             <a:endParaRPr lang="en-US"/>
           </a:p>
@@ -2047,7 +2224,7 @@
           <p:cNvPr id="8" name="Footer Placeholder 7">
             <a:extLst>
               <a:ext uri="{FF2B5EF4-FFF2-40B4-BE49-F238E27FC236}">
-                <a16:creationId xmlns:a16="http://schemas.microsoft.com/office/drawing/2014/main" id="{2F5F3798-7B61-5530-4CE3-C6CC264D0CAB}"/>
+                <a16:creationId xmlns:a16="http://schemas.microsoft.com/office/drawing/2014/main" id="{A5742DC8-1560-8BC0-2128-ACBD57240165}"/>
               </a:ext>
             </a:extLst>
           </p:cNvPr>
@@ -2058,7 +2235,15 @@
             <p:ph type="ftr" sz="quarter" idx="11"/>
           </p:nvPr>
         </p:nvSpPr>
-        <p:spPr/>
+        <p:spPr>
+          <a:xfrm>
+            <a:off x="4038600" y="6356350"/>
+            <a:ext cx="4114800" cy="365125"/>
+          </a:xfrm>
+          <a:prstGeom prst="rect">
+            <a:avLst/>
+          </a:prstGeom>
+        </p:spPr>
         <p:txBody>
           <a:bodyPr/>
           <a:lstStyle/>
@@ -2072,7 +2257,7 @@
           <p:cNvPr id="9" name="Slide Number Placeholder 8">
             <a:extLst>
               <a:ext uri="{FF2B5EF4-FFF2-40B4-BE49-F238E27FC236}">
-                <a16:creationId xmlns:a16="http://schemas.microsoft.com/office/drawing/2014/main" id="{DEA57831-0ADE-7493-7182-6249F4413808}"/>
+                <a16:creationId xmlns:a16="http://schemas.microsoft.com/office/drawing/2014/main" id="{589CBA34-0EA5-98FC-EEAA-0C1A44BA1CB5}"/>
               </a:ext>
             </a:extLst>
           </p:cNvPr>
@@ -2083,12 +2268,20 @@
             <p:ph type="sldNum" sz="quarter" idx="12"/>
           </p:nvPr>
         </p:nvSpPr>
-        <p:spPr/>
+        <p:spPr>
+          <a:xfrm>
+            <a:off x="8610600" y="6356350"/>
+            <a:ext cx="2743200" cy="365125"/>
+          </a:xfrm>
+          <a:prstGeom prst="rect">
+            <a:avLst/>
+          </a:prstGeom>
+        </p:spPr>
         <p:txBody>
           <a:bodyPr/>
           <a:lstStyle/>
           <a:p>
-            <a:fld id="{B46E5E13-EE34-439C-B49B-F0CB75B28E1B}" type="slidenum">
+            <a:fld id="{6C0014F0-3D1D-4459-A530-32E6C19AE461}" type="slidenum">
               <a:rPr lang="en-US" smtClean="0"/>
               <a:t>‹#›</a:t>
             </a:fld>
@@ -2099,7 +2292,7 @@
     </p:spTree>
     <p:extLst>
       <p:ext uri="{BB962C8B-B14F-4D97-AF65-F5344CB8AC3E}">
-        <p14:creationId xmlns:p14="http://schemas.microsoft.com/office/powerpoint/2010/main" val="847567891"/>
+        <p14:creationId xmlns:p14="http://schemas.microsoft.com/office/powerpoint/2010/main" val="205957926"/>
       </p:ext>
     </p:extLst>
   </p:cSld>
@@ -2131,7 +2324,7 @@
           <p:cNvPr id="2" name="Title 1">
             <a:extLst>
               <a:ext uri="{FF2B5EF4-FFF2-40B4-BE49-F238E27FC236}">
-                <a16:creationId xmlns:a16="http://schemas.microsoft.com/office/drawing/2014/main" id="{C51D6B86-2F64-08CA-8DAC-2D6D1CA3880D}"/>
+                <a16:creationId xmlns:a16="http://schemas.microsoft.com/office/drawing/2014/main" id="{DB1F5818-3C7C-015C-2483-1875C395B0BF}"/>
               </a:ext>
             </a:extLst>
           </p:cNvPr>
@@ -2142,7 +2335,15 @@
             <p:ph type="title"/>
           </p:nvPr>
         </p:nvSpPr>
-        <p:spPr/>
+        <p:spPr>
+          <a:xfrm>
+            <a:off x="602787" y="1498382"/>
+            <a:ext cx="10515600" cy="1325563"/>
+          </a:xfrm>
+          <a:prstGeom prst="rect">
+            <a:avLst/>
+          </a:prstGeom>
+        </p:spPr>
         <p:txBody>
           <a:bodyPr/>
           <a:lstStyle/>
@@ -2159,7 +2360,7 @@
           <p:cNvPr id="3" name="Date Placeholder 2">
             <a:extLst>
               <a:ext uri="{FF2B5EF4-FFF2-40B4-BE49-F238E27FC236}">
-                <a16:creationId xmlns:a16="http://schemas.microsoft.com/office/drawing/2014/main" id="{03C4A398-4A9D-A2A3-6474-1E420261434B}"/>
+                <a16:creationId xmlns:a16="http://schemas.microsoft.com/office/drawing/2014/main" id="{F223477C-97F9-76B1-065E-300F62DDCF99}"/>
               </a:ext>
             </a:extLst>
           </p:cNvPr>
@@ -2170,14 +2371,22 @@
             <p:ph type="dt" sz="half" idx="10"/>
           </p:nvPr>
         </p:nvSpPr>
-        <p:spPr/>
+        <p:spPr>
+          <a:xfrm>
+            <a:off x="838200" y="6445249"/>
+            <a:ext cx="2743200" cy="365125"/>
+          </a:xfrm>
+          <a:prstGeom prst="rect">
+            <a:avLst/>
+          </a:prstGeom>
+        </p:spPr>
         <p:txBody>
           <a:bodyPr/>
           <a:lstStyle/>
           <a:p>
-            <a:fld id="{67F9F019-D13C-4797-8A9F-7B02D5B8121E}" type="datetime1">
+            <a:fld id="{71087A05-F855-4434-8DDE-39A8542098A6}" type="datetimeFigureOut">
               <a:rPr lang="en-US" smtClean="0"/>
-              <a:t>9/16/2024</a:t>
+              <a:t>11/21/2024</a:t>
             </a:fld>
             <a:endParaRPr lang="en-US"/>
           </a:p>
@@ -2188,7 +2397,7 @@
           <p:cNvPr id="4" name="Footer Placeholder 3">
             <a:extLst>
               <a:ext uri="{FF2B5EF4-FFF2-40B4-BE49-F238E27FC236}">
-                <a16:creationId xmlns:a16="http://schemas.microsoft.com/office/drawing/2014/main" id="{1B329954-395E-06FF-D638-EC31477B4B60}"/>
+                <a16:creationId xmlns:a16="http://schemas.microsoft.com/office/drawing/2014/main" id="{725CCAE4-3361-9867-C2CA-9F8A178ED41C}"/>
               </a:ext>
             </a:extLst>
           </p:cNvPr>
@@ -2199,7 +2408,15 @@
             <p:ph type="ftr" sz="quarter" idx="11"/>
           </p:nvPr>
         </p:nvSpPr>
-        <p:spPr/>
+        <p:spPr>
+          <a:xfrm>
+            <a:off x="4038600" y="6356350"/>
+            <a:ext cx="4114800" cy="365125"/>
+          </a:xfrm>
+          <a:prstGeom prst="rect">
+            <a:avLst/>
+          </a:prstGeom>
+        </p:spPr>
         <p:txBody>
           <a:bodyPr/>
           <a:lstStyle/>
@@ -2213,7 +2430,7 @@
           <p:cNvPr id="5" name="Slide Number Placeholder 4">
             <a:extLst>
               <a:ext uri="{FF2B5EF4-FFF2-40B4-BE49-F238E27FC236}">
-                <a16:creationId xmlns:a16="http://schemas.microsoft.com/office/drawing/2014/main" id="{26A16BE0-3CF4-0FFF-42E9-C2ABCD5E1AB3}"/>
+                <a16:creationId xmlns:a16="http://schemas.microsoft.com/office/drawing/2014/main" id="{E42ECABF-B7A6-37FC-1091-0A6AE97D6725}"/>
               </a:ext>
             </a:extLst>
           </p:cNvPr>
@@ -2224,12 +2441,20 @@
             <p:ph type="sldNum" sz="quarter" idx="12"/>
           </p:nvPr>
         </p:nvSpPr>
-        <p:spPr/>
+        <p:spPr>
+          <a:xfrm>
+            <a:off x="8610600" y="6356350"/>
+            <a:ext cx="2743200" cy="365125"/>
+          </a:xfrm>
+          <a:prstGeom prst="rect">
+            <a:avLst/>
+          </a:prstGeom>
+        </p:spPr>
         <p:txBody>
           <a:bodyPr/>
           <a:lstStyle/>
           <a:p>
-            <a:fld id="{B46E5E13-EE34-439C-B49B-F0CB75B28E1B}" type="slidenum">
+            <a:fld id="{6C0014F0-3D1D-4459-A530-32E6C19AE461}" type="slidenum">
               <a:rPr lang="en-US" smtClean="0"/>
               <a:t>‹#›</a:t>
             </a:fld>
@@ -2240,7 +2465,7 @@
     </p:spTree>
     <p:extLst>
       <p:ext uri="{BB962C8B-B14F-4D97-AF65-F5344CB8AC3E}">
-        <p14:creationId xmlns:p14="http://schemas.microsoft.com/office/powerpoint/2010/main" val="2594811457"/>
+        <p14:creationId xmlns:p14="http://schemas.microsoft.com/office/powerpoint/2010/main" val="2477561557"/>
       </p:ext>
     </p:extLst>
   </p:cSld>
@@ -2272,7 +2497,7 @@
           <p:cNvPr id="2" name="Date Placeholder 1">
             <a:extLst>
               <a:ext uri="{FF2B5EF4-FFF2-40B4-BE49-F238E27FC236}">
-                <a16:creationId xmlns:a16="http://schemas.microsoft.com/office/drawing/2014/main" id="{AA5B9B0A-FA71-5C03-A207-2398589F58E9}"/>
+                <a16:creationId xmlns:a16="http://schemas.microsoft.com/office/drawing/2014/main" id="{E2C2A218-2D68-399E-5303-823F32D18A0A}"/>
               </a:ext>
             </a:extLst>
           </p:cNvPr>
@@ -2283,14 +2508,22 @@
             <p:ph type="dt" sz="half" idx="10"/>
           </p:nvPr>
         </p:nvSpPr>
-        <p:spPr/>
+        <p:spPr>
+          <a:xfrm>
+            <a:off x="838200" y="6445249"/>
+            <a:ext cx="2743200" cy="365125"/>
+          </a:xfrm>
+          <a:prstGeom prst="rect">
+            <a:avLst/>
+          </a:prstGeom>
+        </p:spPr>
         <p:txBody>
           <a:bodyPr/>
           <a:lstStyle/>
           <a:p>
-            <a:fld id="{FDA143B9-A6C4-436D-945A-FF5B3EA2EF39}" type="datetime1">
+            <a:fld id="{71087A05-F855-4434-8DDE-39A8542098A6}" type="datetimeFigureOut">
               <a:rPr lang="en-US" smtClean="0"/>
-              <a:t>9/16/2024</a:t>
+              <a:t>11/21/2024</a:t>
             </a:fld>
             <a:endParaRPr lang="en-US"/>
           </a:p>
@@ -2301,7 +2534,7 @@
           <p:cNvPr id="3" name="Footer Placeholder 2">
             <a:extLst>
               <a:ext uri="{FF2B5EF4-FFF2-40B4-BE49-F238E27FC236}">
-                <a16:creationId xmlns:a16="http://schemas.microsoft.com/office/drawing/2014/main" id="{5EEC7B99-A534-1835-A5BF-8993DDBD237D}"/>
+                <a16:creationId xmlns:a16="http://schemas.microsoft.com/office/drawing/2014/main" id="{41BB3505-96AE-D8F2-469A-F36E9DD155D5}"/>
               </a:ext>
             </a:extLst>
           </p:cNvPr>
@@ -2312,7 +2545,15 @@
             <p:ph type="ftr" sz="quarter" idx="11"/>
           </p:nvPr>
         </p:nvSpPr>
-        <p:spPr/>
+        <p:spPr>
+          <a:xfrm>
+            <a:off x="4038600" y="6356350"/>
+            <a:ext cx="4114800" cy="365125"/>
+          </a:xfrm>
+          <a:prstGeom prst="rect">
+            <a:avLst/>
+          </a:prstGeom>
+        </p:spPr>
         <p:txBody>
           <a:bodyPr/>
           <a:lstStyle/>
@@ -2326,7 +2567,7 @@
           <p:cNvPr id="4" name="Slide Number Placeholder 3">
             <a:extLst>
               <a:ext uri="{FF2B5EF4-FFF2-40B4-BE49-F238E27FC236}">
-                <a16:creationId xmlns:a16="http://schemas.microsoft.com/office/drawing/2014/main" id="{6E001977-30BB-D5A2-E565-94C0467FE0FD}"/>
+                <a16:creationId xmlns:a16="http://schemas.microsoft.com/office/drawing/2014/main" id="{47BA2558-EB65-5F2B-4DEB-5E332CDDC572}"/>
               </a:ext>
             </a:extLst>
           </p:cNvPr>
@@ -2337,12 +2578,20 @@
             <p:ph type="sldNum" sz="quarter" idx="12"/>
           </p:nvPr>
         </p:nvSpPr>
-        <p:spPr/>
+        <p:spPr>
+          <a:xfrm>
+            <a:off x="8610600" y="6356350"/>
+            <a:ext cx="2743200" cy="365125"/>
+          </a:xfrm>
+          <a:prstGeom prst="rect">
+            <a:avLst/>
+          </a:prstGeom>
+        </p:spPr>
         <p:txBody>
           <a:bodyPr/>
           <a:lstStyle/>
           <a:p>
-            <a:fld id="{B46E5E13-EE34-439C-B49B-F0CB75B28E1B}" type="slidenum">
+            <a:fld id="{6C0014F0-3D1D-4459-A530-32E6C19AE461}" type="slidenum">
               <a:rPr lang="en-US" smtClean="0"/>
               <a:t>‹#›</a:t>
             </a:fld>
@@ -2353,7 +2602,7 @@
     </p:spTree>
     <p:extLst>
       <p:ext uri="{BB962C8B-B14F-4D97-AF65-F5344CB8AC3E}">
-        <p14:creationId xmlns:p14="http://schemas.microsoft.com/office/powerpoint/2010/main" val="3457119493"/>
+        <p14:creationId xmlns:p14="http://schemas.microsoft.com/office/powerpoint/2010/main" val="632191323"/>
       </p:ext>
     </p:extLst>
   </p:cSld>
@@ -2385,7 +2634,7 @@
           <p:cNvPr id="2" name="Title 1">
             <a:extLst>
               <a:ext uri="{FF2B5EF4-FFF2-40B4-BE49-F238E27FC236}">
-                <a16:creationId xmlns:a16="http://schemas.microsoft.com/office/drawing/2014/main" id="{AC38A989-6857-707E-A17F-8A83A6144698}"/>
+                <a16:creationId xmlns:a16="http://schemas.microsoft.com/office/drawing/2014/main" id="{E731290A-4FEE-1487-F6FC-152481239225}"/>
               </a:ext>
             </a:extLst>
           </p:cNvPr>
@@ -2401,6 +2650,9 @@
             <a:off x="839788" y="457200"/>
             <a:ext cx="3932237" cy="1600200"/>
           </a:xfrm>
+          <a:prstGeom prst="rect">
+            <a:avLst/>
+          </a:prstGeom>
         </p:spPr>
         <p:txBody>
           <a:bodyPr anchor="b"/>
@@ -2422,7 +2674,7 @@
           <p:cNvPr id="3" name="Content Placeholder 2">
             <a:extLst>
               <a:ext uri="{FF2B5EF4-FFF2-40B4-BE49-F238E27FC236}">
-                <a16:creationId xmlns:a16="http://schemas.microsoft.com/office/drawing/2014/main" id="{D3A3E0C8-FA9B-6F55-E988-D7B8ADBC9C21}"/>
+                <a16:creationId xmlns:a16="http://schemas.microsoft.com/office/drawing/2014/main" id="{3FD49862-968E-6027-1E22-A84213937FC4}"/>
               </a:ext>
             </a:extLst>
           </p:cNvPr>
@@ -2438,6 +2690,9 @@
             <a:off x="5183188" y="987425"/>
             <a:ext cx="6172200" cy="4873625"/>
           </a:xfrm>
+          <a:prstGeom prst="rect">
+            <a:avLst/>
+          </a:prstGeom>
         </p:spPr>
         <p:txBody>
           <a:bodyPr/>
@@ -2512,7 +2767,7 @@
           <p:cNvPr id="4" name="Text Placeholder 3">
             <a:extLst>
               <a:ext uri="{FF2B5EF4-FFF2-40B4-BE49-F238E27FC236}">
-                <a16:creationId xmlns:a16="http://schemas.microsoft.com/office/drawing/2014/main" id="{FC649A31-16E4-3C58-CFAF-870BE9A231C8}"/>
+                <a16:creationId xmlns:a16="http://schemas.microsoft.com/office/drawing/2014/main" id="{DDD75452-B3CD-E4D7-2EEB-4D8E7A55BA47}"/>
               </a:ext>
             </a:extLst>
           </p:cNvPr>
@@ -2528,6 +2783,9 @@
             <a:off x="839788" y="2057400"/>
             <a:ext cx="3932237" cy="3811588"/>
           </a:xfrm>
+          <a:prstGeom prst="rect">
+            <a:avLst/>
+          </a:prstGeom>
         </p:spPr>
         <p:txBody>
           <a:bodyPr/>
@@ -2583,7 +2841,7 @@
           <p:cNvPr id="5" name="Date Placeholder 4">
             <a:extLst>
               <a:ext uri="{FF2B5EF4-FFF2-40B4-BE49-F238E27FC236}">
-                <a16:creationId xmlns:a16="http://schemas.microsoft.com/office/drawing/2014/main" id="{5999608F-F9E6-C047-FAFD-5BD962E36788}"/>
+                <a16:creationId xmlns:a16="http://schemas.microsoft.com/office/drawing/2014/main" id="{E910F3D6-85F4-16D5-02EC-B52A50D1363C}"/>
               </a:ext>
             </a:extLst>
           </p:cNvPr>
@@ -2594,14 +2852,22 @@
             <p:ph type="dt" sz="half" idx="10"/>
           </p:nvPr>
         </p:nvSpPr>
-        <p:spPr/>
+        <p:spPr>
+          <a:xfrm>
+            <a:off x="838200" y="6445249"/>
+            <a:ext cx="2743200" cy="365125"/>
+          </a:xfrm>
+          <a:prstGeom prst="rect">
+            <a:avLst/>
+          </a:prstGeom>
+        </p:spPr>
         <p:txBody>
           <a:bodyPr/>
           <a:lstStyle/>
           <a:p>
-            <a:fld id="{457E18FE-B6F9-4F6A-835B-8251F04458A0}" type="datetime1">
+            <a:fld id="{71087A05-F855-4434-8DDE-39A8542098A6}" type="datetimeFigureOut">
               <a:rPr lang="en-US" smtClean="0"/>
-              <a:t>9/16/2024</a:t>
+              <a:t>11/21/2024</a:t>
             </a:fld>
             <a:endParaRPr lang="en-US"/>
           </a:p>
@@ -2612,7 +2878,7 @@
           <p:cNvPr id="6" name="Footer Placeholder 5">
             <a:extLst>
               <a:ext uri="{FF2B5EF4-FFF2-40B4-BE49-F238E27FC236}">
-                <a16:creationId xmlns:a16="http://schemas.microsoft.com/office/drawing/2014/main" id="{E1D5DC43-2068-E43E-0C96-6105FF141340}"/>
+                <a16:creationId xmlns:a16="http://schemas.microsoft.com/office/drawing/2014/main" id="{FA7DC6C8-71E8-B7D5-9A82-0FA963F35B00}"/>
               </a:ext>
             </a:extLst>
           </p:cNvPr>
@@ -2623,7 +2889,15 @@
             <p:ph type="ftr" sz="quarter" idx="11"/>
           </p:nvPr>
         </p:nvSpPr>
-        <p:spPr/>
+        <p:spPr>
+          <a:xfrm>
+            <a:off x="4038600" y="6356350"/>
+            <a:ext cx="4114800" cy="365125"/>
+          </a:xfrm>
+          <a:prstGeom prst="rect">
+            <a:avLst/>
+          </a:prstGeom>
+        </p:spPr>
         <p:txBody>
           <a:bodyPr/>
           <a:lstStyle/>
@@ -2637,7 +2911,7 @@
           <p:cNvPr id="7" name="Slide Number Placeholder 6">
             <a:extLst>
               <a:ext uri="{FF2B5EF4-FFF2-40B4-BE49-F238E27FC236}">
-                <a16:creationId xmlns:a16="http://schemas.microsoft.com/office/drawing/2014/main" id="{07714F4E-989B-09B5-9809-BA4CDB940F1A}"/>
+                <a16:creationId xmlns:a16="http://schemas.microsoft.com/office/drawing/2014/main" id="{33AEBF5B-81ED-5FC8-76EE-E85F459B2D2B}"/>
               </a:ext>
             </a:extLst>
           </p:cNvPr>
@@ -2648,12 +2922,20 @@
             <p:ph type="sldNum" sz="quarter" idx="12"/>
           </p:nvPr>
         </p:nvSpPr>
-        <p:spPr/>
+        <p:spPr>
+          <a:xfrm>
+            <a:off x="8610600" y="6356350"/>
+            <a:ext cx="2743200" cy="365125"/>
+          </a:xfrm>
+          <a:prstGeom prst="rect">
+            <a:avLst/>
+          </a:prstGeom>
+        </p:spPr>
         <p:txBody>
           <a:bodyPr/>
           <a:lstStyle/>
           <a:p>
-            <a:fld id="{B46E5E13-EE34-439C-B49B-F0CB75B28E1B}" type="slidenum">
+            <a:fld id="{6C0014F0-3D1D-4459-A530-32E6C19AE461}" type="slidenum">
               <a:rPr lang="en-US" smtClean="0"/>
               <a:t>‹#›</a:t>
             </a:fld>
@@ -2664,7 +2946,7 @@
     </p:spTree>
     <p:extLst>
       <p:ext uri="{BB962C8B-B14F-4D97-AF65-F5344CB8AC3E}">
-        <p14:creationId xmlns:p14="http://schemas.microsoft.com/office/powerpoint/2010/main" val="3331387570"/>
+        <p14:creationId xmlns:p14="http://schemas.microsoft.com/office/powerpoint/2010/main" val="740176455"/>
       </p:ext>
     </p:extLst>
   </p:cSld>
@@ -2696,7 +2978,7 @@
           <p:cNvPr id="2" name="Title 1">
             <a:extLst>
               <a:ext uri="{FF2B5EF4-FFF2-40B4-BE49-F238E27FC236}">
-                <a16:creationId xmlns:a16="http://schemas.microsoft.com/office/drawing/2014/main" id="{3355A176-7BDB-BCDB-D1C0-7943D50F9B44}"/>
+                <a16:creationId xmlns:a16="http://schemas.microsoft.com/office/drawing/2014/main" id="{640090C6-958A-8F1E-AAA5-6F70ABB1D9F3}"/>
               </a:ext>
             </a:extLst>
           </p:cNvPr>
@@ -2712,6 +2994,9 @@
             <a:off x="839788" y="457200"/>
             <a:ext cx="3932237" cy="1600200"/>
           </a:xfrm>
+          <a:prstGeom prst="rect">
+            <a:avLst/>
+          </a:prstGeom>
         </p:spPr>
         <p:txBody>
           <a:bodyPr anchor="b"/>
@@ -2733,7 +3018,7 @@
           <p:cNvPr id="3" name="Picture Placeholder 2">
             <a:extLst>
               <a:ext uri="{FF2B5EF4-FFF2-40B4-BE49-F238E27FC236}">
-                <a16:creationId xmlns:a16="http://schemas.microsoft.com/office/drawing/2014/main" id="{B68408D7-61D1-185C-72B8-001F411FC6F7}"/>
+                <a16:creationId xmlns:a16="http://schemas.microsoft.com/office/drawing/2014/main" id="{3302DF14-CA9B-4C85-16D1-AE914D7EB7E7}"/>
               </a:ext>
             </a:extLst>
           </p:cNvPr>
@@ -2749,6 +3034,9 @@
             <a:off x="5183188" y="987425"/>
             <a:ext cx="6172200" cy="4873625"/>
           </a:xfrm>
+          <a:prstGeom prst="rect">
+            <a:avLst/>
+          </a:prstGeom>
         </p:spPr>
         <p:txBody>
           <a:bodyPr/>
@@ -2791,7 +3079,10 @@
             </a:lvl9pPr>
           </a:lstStyle>
           <a:p>
-            <a:endParaRPr lang="en-US"/>
+            <a:r>
+              <a:rPr lang="en-US"/>
+              <a:t>Click icon to add picture</a:t>
+            </a:r>
           </a:p>
         </p:txBody>
       </p:sp>
@@ -2800,7 +3091,7 @@
           <p:cNvPr id="4" name="Text Placeholder 3">
             <a:extLst>
               <a:ext uri="{FF2B5EF4-FFF2-40B4-BE49-F238E27FC236}">
-                <a16:creationId xmlns:a16="http://schemas.microsoft.com/office/drawing/2014/main" id="{390B86E7-BC7A-324F-5231-BB8844695F10}"/>
+                <a16:creationId xmlns:a16="http://schemas.microsoft.com/office/drawing/2014/main" id="{449386B6-C485-3496-A8CD-9C25B60A4255}"/>
               </a:ext>
             </a:extLst>
           </p:cNvPr>
@@ -2816,6 +3107,9 @@
             <a:off x="839788" y="2057400"/>
             <a:ext cx="3932237" cy="3811588"/>
           </a:xfrm>
+          <a:prstGeom prst="rect">
+            <a:avLst/>
+          </a:prstGeom>
         </p:spPr>
         <p:txBody>
           <a:bodyPr/>
@@ -2871,7 +3165,7 @@
           <p:cNvPr id="5" name="Date Placeholder 4">
             <a:extLst>
               <a:ext uri="{FF2B5EF4-FFF2-40B4-BE49-F238E27FC236}">
-                <a16:creationId xmlns:a16="http://schemas.microsoft.com/office/drawing/2014/main" id="{CA9F4411-F5FF-7DD9-8280-4EAE80811D9F}"/>
+                <a16:creationId xmlns:a16="http://schemas.microsoft.com/office/drawing/2014/main" id="{DBD5F565-8080-7E82-246E-1EDDAAC2C236}"/>
               </a:ext>
             </a:extLst>
           </p:cNvPr>
@@ -2882,14 +3176,22 @@
             <p:ph type="dt" sz="half" idx="10"/>
           </p:nvPr>
         </p:nvSpPr>
-        <p:spPr/>
+        <p:spPr>
+          <a:xfrm>
+            <a:off x="838200" y="6445249"/>
+            <a:ext cx="2743200" cy="365125"/>
+          </a:xfrm>
+          <a:prstGeom prst="rect">
+            <a:avLst/>
+          </a:prstGeom>
+        </p:spPr>
         <p:txBody>
           <a:bodyPr/>
           <a:lstStyle/>
           <a:p>
-            <a:fld id="{5F2690CE-112A-455B-AD5F-E26CEA6A5331}" type="datetime1">
+            <a:fld id="{71087A05-F855-4434-8DDE-39A8542098A6}" type="datetimeFigureOut">
               <a:rPr lang="en-US" smtClean="0"/>
-              <a:t>9/16/2024</a:t>
+              <a:t>11/21/2024</a:t>
             </a:fld>
             <a:endParaRPr lang="en-US"/>
           </a:p>
@@ -2900,7 +3202,7 @@
           <p:cNvPr id="6" name="Footer Placeholder 5">
             <a:extLst>
               <a:ext uri="{FF2B5EF4-FFF2-40B4-BE49-F238E27FC236}">
-                <a16:creationId xmlns:a16="http://schemas.microsoft.com/office/drawing/2014/main" id="{BD00158C-2DC0-C40D-E476-8D815E2210E6}"/>
+                <a16:creationId xmlns:a16="http://schemas.microsoft.com/office/drawing/2014/main" id="{C9E12A3F-827C-0539-3AFC-062DDE283567}"/>
               </a:ext>
             </a:extLst>
           </p:cNvPr>
@@ -2911,7 +3213,15 @@
             <p:ph type="ftr" sz="quarter" idx="11"/>
           </p:nvPr>
         </p:nvSpPr>
-        <p:spPr/>
+        <p:spPr>
+          <a:xfrm>
+            <a:off x="4038600" y="6356350"/>
+            <a:ext cx="4114800" cy="365125"/>
+          </a:xfrm>
+          <a:prstGeom prst="rect">
+            <a:avLst/>
+          </a:prstGeom>
+        </p:spPr>
         <p:txBody>
           <a:bodyPr/>
           <a:lstStyle/>
@@ -2925,7 +3235,7 @@
           <p:cNvPr id="7" name="Slide Number Placeholder 6">
             <a:extLst>
               <a:ext uri="{FF2B5EF4-FFF2-40B4-BE49-F238E27FC236}">
-                <a16:creationId xmlns:a16="http://schemas.microsoft.com/office/drawing/2014/main" id="{E47CEA17-958B-3F11-0DD0-F3DB57410690}"/>
+                <a16:creationId xmlns:a16="http://schemas.microsoft.com/office/drawing/2014/main" id="{516B4C84-F522-0893-1790-EF8E720A114E}"/>
               </a:ext>
             </a:extLst>
           </p:cNvPr>
@@ -2936,12 +3246,20 @@
             <p:ph type="sldNum" sz="quarter" idx="12"/>
           </p:nvPr>
         </p:nvSpPr>
-        <p:spPr/>
+        <p:spPr>
+          <a:xfrm>
+            <a:off x="8610600" y="6356350"/>
+            <a:ext cx="2743200" cy="365125"/>
+          </a:xfrm>
+          <a:prstGeom prst="rect">
+            <a:avLst/>
+          </a:prstGeom>
+        </p:spPr>
         <p:txBody>
           <a:bodyPr/>
           <a:lstStyle/>
           <a:p>
-            <a:fld id="{B46E5E13-EE34-439C-B49B-F0CB75B28E1B}" type="slidenum">
+            <a:fld id="{6C0014F0-3D1D-4459-A530-32E6C19AE461}" type="slidenum">
               <a:rPr lang="en-US" smtClean="0"/>
               <a:t>‹#›</a:t>
             </a:fld>
@@ -2952,7 +3270,7 @@
     </p:spTree>
     <p:extLst>
       <p:ext uri="{BB962C8B-B14F-4D97-AF65-F5344CB8AC3E}">
-        <p14:creationId xmlns:p14="http://schemas.microsoft.com/office/powerpoint/2010/main" val="1744603036"/>
+        <p14:creationId xmlns:p14="http://schemas.microsoft.com/office/powerpoint/2010/main" val="2266235175"/>
       </p:ext>
     </p:extLst>
   </p:cSld>
@@ -2984,244 +3302,131 @@
           <a:chExt cx="0" cy="0"/>
         </a:xfrm>
       </p:grpSpPr>
-      <p:sp>
-        <p:nvSpPr>
-          <p:cNvPr id="2" name="Title Placeholder 1">
-            <a:extLst>
-              <a:ext uri="{FF2B5EF4-FFF2-40B4-BE49-F238E27FC236}">
-                <a16:creationId xmlns:a16="http://schemas.microsoft.com/office/drawing/2014/main" id="{DADBBF7B-0A87-603A-6F96-ED995D2876BC}"/>
-              </a:ext>
-            </a:extLst>
-          </p:cNvPr>
-          <p:cNvSpPr>
-            <a:spLocks noGrp="1"/>
-          </p:cNvSpPr>
-          <p:nvPr>
-            <p:ph type="title"/>
-          </p:nvPr>
-        </p:nvSpPr>
-        <p:spPr>
-          <a:xfrm>
-            <a:off x="838200" y="365125"/>
-            <a:ext cx="10515600" cy="1325563"/>
-          </a:xfrm>
-          <a:prstGeom prst="rect">
-            <a:avLst/>
-          </a:prstGeom>
-        </p:spPr>
-        <p:txBody>
-          <a:bodyPr vert="horz" lIns="91440" tIns="45720" rIns="91440" bIns="45720" rtlCol="0" anchor="ctr">
-            <a:normAutofit/>
-          </a:bodyPr>
-          <a:lstStyle/>
-          <a:p>
-            <a:r>
-              <a:rPr lang="en-US"/>
-              <a:t>Click to edit Master title style</a:t>
-            </a:r>
-          </a:p>
-        </p:txBody>
-      </p:sp>
-      <p:sp>
-        <p:nvSpPr>
-          <p:cNvPr id="3" name="Text Placeholder 2">
-            <a:extLst>
-              <a:ext uri="{FF2B5EF4-FFF2-40B4-BE49-F238E27FC236}">
-                <a16:creationId xmlns:a16="http://schemas.microsoft.com/office/drawing/2014/main" id="{1EBB9990-0CBB-2977-C631-37F97EB6D7A7}"/>
-              </a:ext>
-            </a:extLst>
-          </p:cNvPr>
-          <p:cNvSpPr>
-            <a:spLocks noGrp="1"/>
-          </p:cNvSpPr>
-          <p:nvPr>
-            <p:ph type="body" idx="1"/>
-          </p:nvPr>
-        </p:nvSpPr>
-        <p:spPr>
-          <a:xfrm>
-            <a:off x="838200" y="1825625"/>
-            <a:ext cx="10515600" cy="4351338"/>
-          </a:xfrm>
-          <a:prstGeom prst="rect">
-            <a:avLst/>
-          </a:prstGeom>
-        </p:spPr>
-        <p:txBody>
-          <a:bodyPr vert="horz" lIns="91440" tIns="45720" rIns="91440" bIns="45720" rtlCol="0">
-            <a:normAutofit/>
-          </a:bodyPr>
-          <a:lstStyle/>
-          <a:p>
-            <a:pPr lvl="0"/>
-            <a:r>
-              <a:rPr lang="en-US"/>
-              <a:t>Click to edit Master text styles</a:t>
-            </a:r>
-          </a:p>
-          <a:p>
-            <a:pPr lvl="1"/>
-            <a:r>
-              <a:rPr lang="en-US"/>
-              <a:t>Second level</a:t>
-            </a:r>
-          </a:p>
-          <a:p>
-            <a:pPr lvl="2"/>
-            <a:r>
-              <a:rPr lang="en-US"/>
-              <a:t>Third level</a:t>
-            </a:r>
-          </a:p>
-          <a:p>
-            <a:pPr lvl="3"/>
-            <a:r>
-              <a:rPr lang="en-US"/>
-              <a:t>Fourth level</a:t>
-            </a:r>
-          </a:p>
-          <a:p>
-            <a:pPr lvl="4"/>
-            <a:r>
-              <a:rPr lang="en-US"/>
-              <a:t>Fifth level</a:t>
-            </a:r>
-          </a:p>
-        </p:txBody>
-      </p:sp>
-      <p:sp>
-        <p:nvSpPr>
-          <p:cNvPr id="4" name="Date Placeholder 3">
-            <a:extLst>
-              <a:ext uri="{FF2B5EF4-FFF2-40B4-BE49-F238E27FC236}">
-                <a16:creationId xmlns:a16="http://schemas.microsoft.com/office/drawing/2014/main" id="{F336638E-F817-1BC9-ECB7-18071DC44D12}"/>
-              </a:ext>
-            </a:extLst>
-          </p:cNvPr>
-          <p:cNvSpPr>
-            <a:spLocks noGrp="1"/>
-          </p:cNvSpPr>
-          <p:nvPr>
-            <p:ph type="dt" sz="half" idx="2"/>
-          </p:nvPr>
-        </p:nvSpPr>
-        <p:spPr>
-          <a:xfrm>
-            <a:off x="838200" y="6356350"/>
-            <a:ext cx="2743200" cy="365125"/>
-          </a:xfrm>
-          <a:prstGeom prst="rect">
-            <a:avLst/>
-          </a:prstGeom>
-        </p:spPr>
-        <p:txBody>
-          <a:bodyPr vert="horz" lIns="91440" tIns="45720" rIns="91440" bIns="45720" rtlCol="0" anchor="ctr"/>
-          <a:lstStyle>
-            <a:lvl1pPr algn="l">
-              <a:defRPr sz="1200">
-                <a:solidFill>
-                  <a:schemeClr val="tx1">
-                    <a:tint val="75000"/>
-                  </a:schemeClr>
-                </a:solidFill>
-              </a:defRPr>
-            </a:lvl1pPr>
-          </a:lstStyle>
-          <a:p>
-            <a:fld id="{9C4E342D-98AB-407C-88D4-A20ED0F70E1C}" type="datetime1">
-              <a:rPr lang="en-US" smtClean="0"/>
-              <a:t>9/16/2024</a:t>
-            </a:fld>
-            <a:endParaRPr lang="en-US"/>
-          </a:p>
-        </p:txBody>
-      </p:sp>
-      <p:sp>
-        <p:nvSpPr>
-          <p:cNvPr id="5" name="Footer Placeholder 4">
-            <a:extLst>
-              <a:ext uri="{FF2B5EF4-FFF2-40B4-BE49-F238E27FC236}">
-                <a16:creationId xmlns:a16="http://schemas.microsoft.com/office/drawing/2014/main" id="{60C57151-F515-08FA-FD9F-F59EDF1B6581}"/>
-              </a:ext>
-            </a:extLst>
-          </p:cNvPr>
-          <p:cNvSpPr>
-            <a:spLocks noGrp="1"/>
-          </p:cNvSpPr>
-          <p:nvPr>
-            <p:ph type="ftr" sz="quarter" idx="3"/>
-          </p:nvPr>
-        </p:nvSpPr>
-        <p:spPr>
-          <a:xfrm>
-            <a:off x="4038600" y="6356350"/>
-            <a:ext cx="4114800" cy="365125"/>
-          </a:xfrm>
-          <a:prstGeom prst="rect">
-            <a:avLst/>
-          </a:prstGeom>
-        </p:spPr>
-        <p:txBody>
-          <a:bodyPr vert="horz" lIns="91440" tIns="45720" rIns="91440" bIns="45720" rtlCol="0" anchor="ctr"/>
-          <a:lstStyle>
-            <a:lvl1pPr algn="ctr">
-              <a:defRPr sz="1200">
-                <a:solidFill>
-                  <a:schemeClr val="tx1">
-                    <a:tint val="75000"/>
-                  </a:schemeClr>
-                </a:solidFill>
-              </a:defRPr>
-            </a:lvl1pPr>
-          </a:lstStyle>
-          <a:p>
-            <a:endParaRPr lang="en-US"/>
-          </a:p>
-        </p:txBody>
-      </p:sp>
-      <p:sp>
-        <p:nvSpPr>
-          <p:cNvPr id="6" name="Slide Number Placeholder 5">
-            <a:extLst>
-              <a:ext uri="{FF2B5EF4-FFF2-40B4-BE49-F238E27FC236}">
-                <a16:creationId xmlns:a16="http://schemas.microsoft.com/office/drawing/2014/main" id="{F7D361D9-183D-9DF9-C01C-5B530B1CB880}"/>
-              </a:ext>
-            </a:extLst>
-          </p:cNvPr>
-          <p:cNvSpPr>
-            <a:spLocks noGrp="1"/>
-          </p:cNvSpPr>
-          <p:nvPr>
-            <p:ph type="sldNum" sz="quarter" idx="4"/>
-          </p:nvPr>
-        </p:nvSpPr>
-        <p:spPr>
-          <a:xfrm>
-            <a:off x="8610600" y="6356350"/>
-            <a:ext cx="2743200" cy="365125"/>
-          </a:xfrm>
-          <a:prstGeom prst="rect">
-            <a:avLst/>
-          </a:prstGeom>
-        </p:spPr>
-        <p:txBody>
-          <a:bodyPr vert="horz" lIns="91440" tIns="45720" rIns="91440" bIns="45720" rtlCol="0" anchor="ctr"/>
-          <a:lstStyle>
-            <a:lvl1pPr algn="r">
-              <a:defRPr sz="1200">
-                <a:solidFill>
-                  <a:schemeClr val="tx1">
-                    <a:tint val="75000"/>
-                  </a:schemeClr>
-                </a:solidFill>
-              </a:defRPr>
-            </a:lvl1pPr>
-          </a:lstStyle>
-          <a:p>
-            <a:fld id="{B46E5E13-EE34-439C-B49B-F0CB75B28E1B}" type="slidenum">
-              <a:rPr lang="en-US" smtClean="0"/>
-              <a:t>‹#›</a:t>
-            </a:fld>
+      <p:pic>
+        <p:nvPicPr>
+          <p:cNvPr id="7" name="Picture 6">
+            <a:extLst>
+              <a:ext uri="{FF2B5EF4-FFF2-40B4-BE49-F238E27FC236}">
+                <a16:creationId xmlns:a16="http://schemas.microsoft.com/office/drawing/2014/main" id="{AEB2CF3C-8982-A5D5-05DB-5BF3F09E24AE}"/>
+              </a:ext>
+              <a:ext uri="{C183D7F6-B498-43B3-948B-1728B52AA6E4}">
+                <adec:decorative xmlns:adec="http://schemas.microsoft.com/office/drawing/2017/decorative" val="1"/>
+              </a:ext>
+            </a:extLst>
+          </p:cNvPr>
+          <p:cNvPicPr>
+            <a:picLocks noChangeAspect="1"/>
+          </p:cNvPicPr>
+          <p:nvPr userDrawn="1"/>
+        </p:nvPicPr>
+        <p:blipFill>
+          <a:blip r:embed="rId16">
+            <a:extLst>
+              <a:ext uri="{28A0092B-C50C-407E-A947-70E740481C1C}">
+                <a14:useLocalDpi xmlns:a14="http://schemas.microsoft.com/office/drawing/2010/main" val="0"/>
+              </a:ext>
+            </a:extLst>
+          </a:blip>
+          <a:stretch>
+            <a:fillRect/>
+          </a:stretch>
+        </p:blipFill>
+        <p:spPr>
+          <a:xfrm>
+            <a:off x="212436" y="236453"/>
+            <a:ext cx="11767127" cy="787737"/>
+          </a:xfrm>
+          <a:prstGeom prst="rect">
+            <a:avLst/>
+          </a:prstGeom>
+        </p:spPr>
+      </p:pic>
+      <p:cxnSp>
+        <p:nvCxnSpPr>
+          <p:cNvPr id="9" name="Straight Connector 8">
+            <a:extLst>
+              <a:ext uri="{FF2B5EF4-FFF2-40B4-BE49-F238E27FC236}">
+                <a16:creationId xmlns:a16="http://schemas.microsoft.com/office/drawing/2014/main" id="{DE7FEFD9-5638-352F-A6ED-06F1FDE322D4}"/>
+              </a:ext>
+            </a:extLst>
+          </p:cNvPr>
+          <p:cNvCxnSpPr>
+            <a:cxnSpLocks/>
+          </p:cNvCxnSpPr>
+          <p:nvPr userDrawn="1"/>
+        </p:nvCxnSpPr>
+        <p:spPr>
+          <a:xfrm>
+            <a:off x="175490" y="1099127"/>
+            <a:ext cx="11841020" cy="0"/>
+          </a:xfrm>
+          <a:prstGeom prst="line">
+            <a:avLst/>
+          </a:prstGeom>
+          <a:ln w="38100">
+            <a:solidFill>
+              <a:srgbClr val="A13C39"/>
+            </a:solidFill>
+          </a:ln>
+        </p:spPr>
+        <p:style>
+          <a:lnRef idx="2">
+            <a:schemeClr val="accent1"/>
+          </a:lnRef>
+          <a:fillRef idx="0">
+            <a:schemeClr val="accent1"/>
+          </a:fillRef>
+          <a:effectRef idx="1">
+            <a:schemeClr val="accent1"/>
+          </a:effectRef>
+          <a:fontRef idx="minor">
+            <a:schemeClr val="tx1"/>
+          </a:fontRef>
+        </p:style>
+      </p:cxnSp>
+      <p:sp>
+        <p:nvSpPr>
+          <p:cNvPr id="11" name="Rectangle 10">
+            <a:extLst>
+              <a:ext uri="{FF2B5EF4-FFF2-40B4-BE49-F238E27FC236}">
+                <a16:creationId xmlns:a16="http://schemas.microsoft.com/office/drawing/2014/main" id="{910C5C32-408D-8072-82C8-297384424B54}"/>
+              </a:ext>
+            </a:extLst>
+          </p:cNvPr>
+          <p:cNvSpPr/>
+          <p:nvPr userDrawn="1"/>
+        </p:nvSpPr>
+        <p:spPr>
+          <a:xfrm>
+            <a:off x="175492" y="184727"/>
+            <a:ext cx="11841018" cy="6493164"/>
+          </a:xfrm>
+          <a:prstGeom prst="rect">
+            <a:avLst/>
+          </a:prstGeom>
+          <a:noFill/>
+        </p:spPr>
+        <p:style>
+          <a:lnRef idx="2">
+            <a:schemeClr val="accent1">
+              <a:shade val="15000"/>
+            </a:schemeClr>
+          </a:lnRef>
+          <a:fillRef idx="1">
+            <a:schemeClr val="accent1"/>
+          </a:fillRef>
+          <a:effectRef idx="0">
+            <a:schemeClr val="accent1"/>
+          </a:effectRef>
+          <a:fontRef idx="minor">
+            <a:schemeClr val="lt1"/>
+          </a:fontRef>
+        </p:style>
+        <p:txBody>
+          <a:bodyPr rtlCol="0" anchor="ctr"/>
+          <a:lstStyle/>
+          <a:p>
+            <a:pPr algn="ctr"/>
             <a:endParaRPr lang="en-US"/>
           </a:p>
         </p:txBody>
@@ -3229,30 +3434,30 @@
     </p:spTree>
     <p:extLst>
       <p:ext uri="{BB962C8B-B14F-4D97-AF65-F5344CB8AC3E}">
-        <p14:creationId xmlns:p14="http://schemas.microsoft.com/office/powerpoint/2010/main" val="3616380004"/>
+        <p14:creationId xmlns:p14="http://schemas.microsoft.com/office/powerpoint/2010/main" val="466850387"/>
       </p:ext>
     </p:extLst>
   </p:cSld>
   <p:clrMap bg1="lt1" tx1="dk1" bg2="lt2" tx2="dk2" accent1="accent1" accent2="accent2" accent3="accent3" accent4="accent4" accent5="accent5" accent6="accent6" hlink="hlink" folHlink="folHlink"/>
   <p:sldLayoutIdLst>
-    <p:sldLayoutId id="2147483713" r:id="rId1"/>
-    <p:sldLayoutId id="2147483714" r:id="rId2"/>
-    <p:sldLayoutId id="2147483715" r:id="rId3"/>
-    <p:sldLayoutId id="2147483716" r:id="rId4"/>
-    <p:sldLayoutId id="2147483717" r:id="rId5"/>
-    <p:sldLayoutId id="2147483718" r:id="rId6"/>
-    <p:sldLayoutId id="2147483719" r:id="rId7"/>
-    <p:sldLayoutId id="2147483720" r:id="rId8"/>
-    <p:sldLayoutId id="2147483721" r:id="rId9"/>
-    <p:sldLayoutId id="2147483722" r:id="rId10"/>
-    <p:sldLayoutId id="2147483723" r:id="rId11"/>
-    <p:sldLayoutId id="2147483724" r:id="rId12"/>
-    <p:sldLayoutId id="2147483725" r:id="rId13"/>
+    <p:sldLayoutId id="2147483649" r:id="rId1"/>
+    <p:sldLayoutId id="2147483650" r:id="rId2"/>
+    <p:sldLayoutId id="2147483651" r:id="rId3"/>
+    <p:sldLayoutId id="2147483652" r:id="rId4"/>
+    <p:sldLayoutId id="2147483653" r:id="rId5"/>
+    <p:sldLayoutId id="2147483654" r:id="rId6"/>
+    <p:sldLayoutId id="2147483655" r:id="rId7"/>
+    <p:sldLayoutId id="2147483656" r:id="rId8"/>
+    <p:sldLayoutId id="2147483657" r:id="rId9"/>
+    <p:sldLayoutId id="2147483658" r:id="rId10"/>
+    <p:sldLayoutId id="2147483659" r:id="rId11"/>
+    <p:sldLayoutId id="2147483660" r:id="rId12"/>
+    <p:sldLayoutId id="2147483661" r:id="rId13"/>
+    <p:sldLayoutId id="2147483662" r:id="rId14"/>
   </p:sldLayoutIdLst>
-  <p:hf hdr="0" ftr="0" dt="0"/>
   <p:txStyles>
     <p:titleStyle>
-      <a:lvl1pPr algn="l" defTabSz="914400" rtl="0" eaLnBrk="1" latinLnBrk="0" hangingPunct="1">
+      <a:lvl1pPr algn="ctr" defTabSz="914400" rtl="0" eaLnBrk="1" latinLnBrk="0" hangingPunct="1">
         <a:lnSpc>
           <a:spcPct val="90000"/>
         </a:lnSpc>
@@ -3692,7 +3897,12 @@
             <p:ph type="body" sz="quarter" idx="10"/>
           </p:nvPr>
         </p:nvSpPr>
-        <p:spPr/>
+        <p:spPr>
+          <a:xfrm>
+            <a:off x="309400" y="1139609"/>
+            <a:ext cx="11573197" cy="724247"/>
+          </a:xfrm>
+        </p:spPr>
         <p:txBody>
           <a:bodyPr>
             <a:normAutofit/>
@@ -3720,8 +3930,8 @@
         </p:nvSpPr>
         <p:spPr>
           <a:xfrm>
-            <a:off x="1268392" y="1054728"/>
-            <a:ext cx="9655207" cy="4801314"/>
+            <a:off x="1143784" y="1701931"/>
+            <a:ext cx="9904428" cy="5016758"/>
           </a:xfrm>
           <a:prstGeom prst="rect">
             <a:avLst/>
@@ -3905,7 +4115,7 @@
         </p:nvSpPr>
         <p:spPr>
           <a:xfrm>
-            <a:off x="3203643" y="346842"/>
+            <a:off x="3203636" y="1204092"/>
             <a:ext cx="5784725" cy="707886"/>
           </a:xfrm>
           <a:prstGeom prst="rect">
@@ -3944,7 +4154,7 @@
         </p:nvSpPr>
         <p:spPr>
           <a:xfrm>
-            <a:off x="1268392" y="1054728"/>
+            <a:off x="1268396" y="1959603"/>
             <a:ext cx="9655207" cy="4708981"/>
           </a:xfrm>
           <a:prstGeom prst="rect">
@@ -4253,7 +4463,7 @@
         </p:nvSpPr>
         <p:spPr>
           <a:xfrm>
-            <a:off x="1268401" y="346842"/>
+            <a:off x="1268395" y="1140457"/>
             <a:ext cx="9655207" cy="707886"/>
           </a:xfrm>
           <a:prstGeom prst="rect">
@@ -4292,8 +4502,8 @@
         </p:nvSpPr>
         <p:spPr>
           <a:xfrm>
-            <a:off x="1268392" y="1054728"/>
-            <a:ext cx="9655207" cy="5016758"/>
+            <a:off x="981859" y="1713475"/>
+            <a:ext cx="10228278" cy="5016758"/>
           </a:xfrm>
           <a:prstGeom prst="rect">
             <a:avLst/>
@@ -4467,10 +4677,15 @@
             <p:ph type="body" sz="quarter" idx="10"/>
           </p:nvPr>
         </p:nvSpPr>
-        <p:spPr/>
+        <p:spPr>
+          <a:xfrm>
+            <a:off x="323527" y="1273456"/>
+            <a:ext cx="11573197" cy="724247"/>
+          </a:xfrm>
+        </p:spPr>
         <p:txBody>
           <a:bodyPr>
-            <a:normAutofit fontScale="92500" lnSpcReduction="10000"/>
+            <a:normAutofit fontScale="92500" lnSpcReduction="20000"/>
           </a:bodyPr>
           <a:lstStyle/>
           <a:p>
@@ -4495,7 +4710,7 @@
         </p:nvSpPr>
         <p:spPr>
           <a:xfrm>
-            <a:off x="1268392" y="1054728"/>
+            <a:off x="1282523" y="1997703"/>
             <a:ext cx="9655207" cy="4708981"/>
           </a:xfrm>
           <a:prstGeom prst="rect">
@@ -4656,39 +4871,39 @@
         <a:sysClr val="window" lastClr="FFFFFF"/>
       </a:lt1>
       <a:dk2>
-        <a:srgbClr val="44546A"/>
+        <a:srgbClr val="0E2841"/>
       </a:dk2>
       <a:lt2>
-        <a:srgbClr val="E7E6E6"/>
+        <a:srgbClr val="E8E8E8"/>
       </a:lt2>
       <a:accent1>
-        <a:srgbClr val="4472C4"/>
+        <a:srgbClr val="156082"/>
       </a:accent1>
       <a:accent2>
-        <a:srgbClr val="ED7D31"/>
+        <a:srgbClr val="E97132"/>
       </a:accent2>
       <a:accent3>
-        <a:srgbClr val="A5A5A5"/>
+        <a:srgbClr val="196B24"/>
       </a:accent3>
       <a:accent4>
-        <a:srgbClr val="FFC000"/>
+        <a:srgbClr val="0F9ED5"/>
       </a:accent4>
       <a:accent5>
-        <a:srgbClr val="5B9BD5"/>
+        <a:srgbClr val="A02B93"/>
       </a:accent5>
       <a:accent6>
-        <a:srgbClr val="70AD47"/>
+        <a:srgbClr val="4EA72E"/>
       </a:accent6>
       <a:hlink>
-        <a:srgbClr val="0563C1"/>
+        <a:srgbClr val="467886"/>
       </a:hlink>
       <a:folHlink>
-        <a:srgbClr val="954F72"/>
+        <a:srgbClr val="96607D"/>
       </a:folHlink>
     </a:clrScheme>
     <a:fontScheme name="Office">
       <a:majorFont>
-        <a:latin typeface="Calibri Light" panose="020F0302020204030204"/>
+        <a:latin typeface="Aptos Display" panose="02110004020202020204"/>
         <a:ea typeface=""/>
         <a:cs typeface=""/>
         <a:font script="Jpan" typeface="游ゴシック Light"/>
@@ -4740,7 +4955,7 @@
         <a:font script="Tfng" typeface="Ebrima"/>
       </a:majorFont>
       <a:minorFont>
-        <a:latin typeface="Calibri" panose="020F0502020204030204"/>
+        <a:latin typeface="Aptos" panose="02110004020202020204"/>
         <a:ea typeface=""/>
         <a:cs typeface=""/>
         <a:font script="Jpan" typeface="游ゴシック"/>
@@ -4851,13 +5066,6 @@
         </a:gradFill>
       </a:fillStyleLst>
       <a:lnStyleLst>
-        <a:ln w="6350" cap="flat" cmpd="sng" algn="ctr">
-          <a:solidFill>
-            <a:schemeClr val="phClr"/>
-          </a:solidFill>
-          <a:prstDash val="solid"/>
-          <a:miter lim="800000"/>
-        </a:ln>
         <a:ln w="12700" cap="flat" cmpd="sng" algn="ctr">
           <a:solidFill>
             <a:schemeClr val="phClr"/>
@@ -4866,6 +5074,13 @@
           <a:miter lim="800000"/>
         </a:ln>
         <a:ln w="19050" cap="flat" cmpd="sng" algn="ctr">
+          <a:solidFill>
+            <a:schemeClr val="phClr"/>
+          </a:solidFill>
+          <a:prstDash val="solid"/>
+          <a:miter lim="800000"/>
+        </a:ln>
+        <a:ln w="25400" cap="flat" cmpd="sng" algn="ctr">
           <a:solidFill>
             <a:schemeClr val="phClr"/>
           </a:solidFill>
@@ -4930,11 +5145,31 @@
       </a:bgFillStyleLst>
     </a:fmtScheme>
   </a:themeElements>
-  <a:objectDefaults/>
+  <a:objectDefaults>
+    <a:lnDef>
+      <a:spPr/>
+      <a:bodyPr/>
+      <a:lstStyle/>
+      <a:style>
+        <a:lnRef idx="2">
+          <a:schemeClr val="accent1"/>
+        </a:lnRef>
+        <a:fillRef idx="0">
+          <a:schemeClr val="accent1"/>
+        </a:fillRef>
+        <a:effectRef idx="1">
+          <a:schemeClr val="accent1"/>
+        </a:effectRef>
+        <a:fontRef idx="minor">
+          <a:schemeClr val="tx1"/>
+        </a:fontRef>
+      </a:style>
+    </a:lnDef>
+  </a:objectDefaults>
   <a:extraClrSchemeLst/>
   <a:extLst>
     <a:ext uri="{05A4C25C-085E-4340-85A3-A5531E510DB2}">
-      <thm15:themeFamily xmlns:thm15="http://schemas.microsoft.com/office/thememl/2012/main" name="Office Theme" id="{62F939B6-93AF-4DB8-9C6B-D6C7DFDC589F}" vid="{4A3C46E8-61CC-4603-A589-7422A47A8E4A}"/>
+      <thm15:themeFamily xmlns:thm15="http://schemas.microsoft.com/office/thememl/2012/main" name="Presentation1" id="{DAD0D162-FE0C-45E1-B287-70A400F0FB2D}" vid="{0F85589E-3A92-4CE5-8C4F-6CD4A008415E}"/>
     </a:ext>
   </a:extLst>
 </a:theme>

</xml_diff>

<commit_message>
Ch 1 video recording updates
</commit_message>
<xml_diff>
--- a/CYBER360-1.1-1.2-Intro-Toolsets.pptx
+++ b/CYBER360-1.1-1.2-Intro-Toolsets.pptx
@@ -7,9 +7,12 @@
   <p:sldIdLst>
     <p:sldId id="257" r:id="rId2"/>
     <p:sldId id="258" r:id="rId3"/>
-    <p:sldId id="259" r:id="rId4"/>
-    <p:sldId id="260" r:id="rId5"/>
-    <p:sldId id="261" r:id="rId6"/>
+    <p:sldId id="265" r:id="rId4"/>
+    <p:sldId id="259" r:id="rId5"/>
+    <p:sldId id="260" r:id="rId6"/>
+    <p:sldId id="264" r:id="rId7"/>
+    <p:sldId id="261" r:id="rId8"/>
+    <p:sldId id="262" r:id="rId9"/>
   </p:sldIdLst>
   <p:sldSz cx="12192000" cy="6858000"/>
   <p:notesSz cx="6858000" cy="9144000"/>
@@ -347,7 +350,7 @@
           <a:p>
             <a:fld id="{71087A05-F855-4434-8DDE-39A8542098A6}" type="datetimeFigureOut">
               <a:rPr lang="en-US" smtClean="0"/>
-              <a:t>11/21/2024</a:t>
+              <a:t>2/8/2025</a:t>
             </a:fld>
             <a:endParaRPr lang="en-US"/>
           </a:p>
@@ -585,7 +588,7 @@
           <a:p>
             <a:fld id="{71087A05-F855-4434-8DDE-39A8542098A6}" type="datetimeFigureOut">
               <a:rPr lang="en-US" smtClean="0"/>
-              <a:t>11/21/2024</a:t>
+              <a:t>2/8/2025</a:t>
             </a:fld>
             <a:endParaRPr lang="en-US"/>
           </a:p>
@@ -821,7 +824,7 @@
           <a:p>
             <a:fld id="{421996D4-4A1C-4BBC-AA2B-FD5B7FC395A0}" type="datetime1">
               <a:rPr lang="en-US" smtClean="0"/>
-              <a:t>11/21/2024</a:t>
+              <a:t>2/8/2025</a:t>
             </a:fld>
             <a:endParaRPr lang="en-US"/>
           </a:p>
@@ -1154,7 +1157,7 @@
           <a:p>
             <a:fld id="{71087A05-F855-4434-8DDE-39A8542098A6}" type="datetimeFigureOut">
               <a:rPr lang="en-US" smtClean="0"/>
-              <a:t>11/21/2024</a:t>
+              <a:t>2/8/2025</a:t>
             </a:fld>
             <a:endParaRPr lang="en-US"/>
           </a:p>
@@ -1459,7 +1462,7 @@
           <a:p>
             <a:fld id="{71087A05-F855-4434-8DDE-39A8542098A6}" type="datetimeFigureOut">
               <a:rPr lang="en-US" smtClean="0"/>
-              <a:t>11/21/2024</a:t>
+              <a:t>2/8/2025</a:t>
             </a:fld>
             <a:endParaRPr lang="en-US"/>
           </a:p>
@@ -1762,7 +1765,7 @@
           <a:p>
             <a:fld id="{71087A05-F855-4434-8DDE-39A8542098A6}" type="datetimeFigureOut">
               <a:rPr lang="en-US" smtClean="0"/>
-              <a:t>11/21/2024</a:t>
+              <a:t>2/8/2025</a:t>
             </a:fld>
             <a:endParaRPr lang="en-US"/>
           </a:p>
@@ -2213,7 +2216,7 @@
           <a:p>
             <a:fld id="{71087A05-F855-4434-8DDE-39A8542098A6}" type="datetimeFigureOut">
               <a:rPr lang="en-US" smtClean="0"/>
-              <a:t>11/21/2024</a:t>
+              <a:t>2/8/2025</a:t>
             </a:fld>
             <a:endParaRPr lang="en-US"/>
           </a:p>
@@ -2386,7 +2389,7 @@
           <a:p>
             <a:fld id="{71087A05-F855-4434-8DDE-39A8542098A6}" type="datetimeFigureOut">
               <a:rPr lang="en-US" smtClean="0"/>
-              <a:t>11/21/2024</a:t>
+              <a:t>2/8/2025</a:t>
             </a:fld>
             <a:endParaRPr lang="en-US"/>
           </a:p>
@@ -2523,7 +2526,7 @@
           <a:p>
             <a:fld id="{71087A05-F855-4434-8DDE-39A8542098A6}" type="datetimeFigureOut">
               <a:rPr lang="en-US" smtClean="0"/>
-              <a:t>11/21/2024</a:t>
+              <a:t>2/8/2025</a:t>
             </a:fld>
             <a:endParaRPr lang="en-US"/>
           </a:p>
@@ -2867,7 +2870,7 @@
           <a:p>
             <a:fld id="{71087A05-F855-4434-8DDE-39A8542098A6}" type="datetimeFigureOut">
               <a:rPr lang="en-US" smtClean="0"/>
-              <a:t>11/21/2024</a:t>
+              <a:t>2/8/2025</a:t>
             </a:fld>
             <a:endParaRPr lang="en-US"/>
           </a:p>
@@ -3191,7 +3194,7 @@
           <a:p>
             <a:fld id="{71087A05-F855-4434-8DDE-39A8542098A6}" type="datetimeFigureOut">
               <a:rPr lang="en-US" smtClean="0"/>
-              <a:t>11/21/2024</a:t>
+              <a:t>2/8/2025</a:t>
             </a:fld>
             <a:endParaRPr lang="en-US"/>
           </a:p>
@@ -3778,7 +3781,14 @@
           <a:p>
             <a:r>
               <a:rPr lang="en-US" dirty="0"/>
-              <a:t>CIT 361/CYBER 360: Advanced Scripting</a:t>
+              <a:t>CYBER 360 </a:t>
+            </a:r>
+            <a:br>
+              <a:rPr lang="en-US" dirty="0"/>
+            </a:br>
+            <a:r>
+              <a:rPr lang="en-US" dirty="0"/>
+              <a:t>Advanced Scripting</a:t>
             </a:r>
           </a:p>
         </p:txBody>
@@ -3930,8 +3940,8 @@
         </p:nvSpPr>
         <p:spPr>
           <a:xfrm>
-            <a:off x="1143784" y="1701931"/>
-            <a:ext cx="9904428" cy="5016758"/>
+            <a:off x="1143784" y="2296291"/>
+            <a:ext cx="9904428" cy="3170099"/>
           </a:xfrm>
           <a:prstGeom prst="rect">
             <a:avLst/>
@@ -3994,80 +4004,6 @@
           </a:p>
           <a:p>
             <a:endParaRPr lang="en-US" sz="2000" dirty="0"/>
-          </a:p>
-          <a:p>
-            <a:r>
-              <a:rPr lang="en-US" sz="2000" dirty="0"/>
-              <a:t>Almost all our work will use </a:t>
-            </a:r>
-            <a:r>
-              <a:rPr lang="en-US" sz="2000" b="1" dirty="0"/>
-              <a:t>Microsoft PowerShell</a:t>
-            </a:r>
-            <a:r>
-              <a:rPr lang="en-US" sz="2000" dirty="0"/>
-              <a:t> as our main scripting technology.</a:t>
-            </a:r>
-          </a:p>
-          <a:p>
-            <a:pPr marL="342900" indent="-342900">
-              <a:buFont typeface="Arial" panose="020B0604020202020204" pitchFamily="34" charset="0"/>
-              <a:buChar char="•"/>
-            </a:pPr>
-            <a:r>
-              <a:rPr lang="en-US" sz="2000" dirty="0"/>
-              <a:t>Expect to see occasional examples and exercises that use other scripting languages. You should have already been introduced to </a:t>
-            </a:r>
-            <a:r>
-              <a:rPr lang="en-US" sz="2000" b="1" dirty="0"/>
-              <a:t>Bash</a:t>
-            </a:r>
-            <a:r>
-              <a:rPr lang="en-US" sz="2000" dirty="0"/>
-              <a:t> and </a:t>
-            </a:r>
-            <a:r>
-              <a:rPr lang="en-US" sz="2000" b="1" dirty="0"/>
-              <a:t>Python</a:t>
-            </a:r>
-            <a:r>
-              <a:rPr lang="en-US" sz="2000" dirty="0"/>
-              <a:t> in previous coursework, but proficiency in either </a:t>
-            </a:r>
-            <a:r>
-              <a:rPr lang="en-US" sz="2000" i="1" u="sng" dirty="0"/>
-              <a:t>isn’t</a:t>
-            </a:r>
-            <a:r>
-              <a:rPr lang="en-US" sz="2000" dirty="0"/>
-              <a:t> required to succeed in this course.</a:t>
-            </a:r>
-          </a:p>
-          <a:p>
-            <a:pPr marL="342900" indent="-342900">
-              <a:buFont typeface="Arial" panose="020B0604020202020204" pitchFamily="34" charset="0"/>
-              <a:buChar char="•"/>
-            </a:pPr>
-            <a:r>
-              <a:rPr lang="en-US" sz="2000" dirty="0"/>
-              <a:t>You will also see a couple of examples of compiled language (</a:t>
-            </a:r>
-            <a:r>
-              <a:rPr lang="en-US" sz="2000" i="1" dirty="0"/>
-              <a:t>C#</a:t>
-            </a:r>
-            <a:r>
-              <a:rPr lang="en-US" sz="2000" dirty="0"/>
-              <a:t>) code; however, prior experience with a compiler is </a:t>
-            </a:r>
-            <a:r>
-              <a:rPr lang="en-US" sz="2000" i="1" u="sng" dirty="0"/>
-              <a:t>not</a:t>
-            </a:r>
-            <a:r>
-              <a:rPr lang="en-US" sz="2000" dirty="0"/>
-              <a:t> expected.</a:t>
-            </a:r>
           </a:p>
         </p:txBody>
       </p:sp>
@@ -4089,7 +4025,13 @@
   <p:cSld>
     <p:spTree>
       <p:nvGrpSpPr>
-        <p:cNvPr id="1" name=""/>
+        <p:cNvPr id="1" name="">
+          <a:extLst>
+            <a:ext uri="{FF2B5EF4-FFF2-40B4-BE49-F238E27FC236}">
+              <a16:creationId xmlns:a16="http://schemas.microsoft.com/office/drawing/2014/main" id="{D7CB451F-692F-87C6-634E-41AD24D9B396}"/>
+            </a:ext>
+          </a:extLst>
+        </p:cNvPr>
         <p:cNvGrpSpPr/>
         <p:nvPr/>
       </p:nvGrpSpPr>
@@ -4103,10 +4045,61 @@
       </p:grpSpPr>
       <p:sp>
         <p:nvSpPr>
-          <p:cNvPr id="2" name="TextBox 1">
-            <a:extLst>
-              <a:ext uri="{FF2B5EF4-FFF2-40B4-BE49-F238E27FC236}">
-                <a16:creationId xmlns:a16="http://schemas.microsoft.com/office/drawing/2014/main" id="{C5822466-AC61-5579-F313-7B8A3FE65CC8}"/>
+          <p:cNvPr id="2" name="Text Placeholder 1">
+            <a:extLst>
+              <a:ext uri="{FF2B5EF4-FFF2-40B4-BE49-F238E27FC236}">
+                <a16:creationId xmlns:a16="http://schemas.microsoft.com/office/drawing/2014/main" id="{A35517E3-330E-B665-1207-291BF4E7D4D5}"/>
+              </a:ext>
+            </a:extLst>
+          </p:cNvPr>
+          <p:cNvSpPr>
+            <a:spLocks noGrp="1"/>
+          </p:cNvSpPr>
+          <p:nvPr>
+            <p:ph type="body" sz="quarter" idx="10"/>
+          </p:nvPr>
+        </p:nvSpPr>
+        <p:spPr>
+          <a:xfrm>
+            <a:off x="309400" y="1139609"/>
+            <a:ext cx="11573197" cy="724247"/>
+          </a:xfrm>
+        </p:spPr>
+        <p:txBody>
+          <a:bodyPr>
+            <a:normAutofit/>
+          </a:bodyPr>
+          <a:lstStyle/>
+          <a:p>
+            <a:r>
+              <a:rPr lang="en-US" sz="4000" dirty="0"/>
+              <a:t>Scripting  </a:t>
+            </a:r>
+            <a:r>
+              <a:rPr lang="en-US" sz="4000" i="1" dirty="0"/>
+              <a:t>vs.</a:t>
+            </a:r>
+            <a:r>
+              <a:rPr lang="en-US" sz="4000" dirty="0"/>
+              <a:t>  Interpreters  </a:t>
+            </a:r>
+            <a:r>
+              <a:rPr lang="en-US" sz="4000" i="1" dirty="0"/>
+              <a:t>vs.</a:t>
+            </a:r>
+            <a:r>
+              <a:rPr lang="en-US" sz="4000" dirty="0"/>
+              <a:t>  Compilers</a:t>
+            </a:r>
+          </a:p>
+        </p:txBody>
+      </p:sp>
+      <p:sp>
+        <p:nvSpPr>
+          <p:cNvPr id="3" name="TextBox 2">
+            <a:extLst>
+              <a:ext uri="{FF2B5EF4-FFF2-40B4-BE49-F238E27FC236}">
+                <a16:creationId xmlns:a16="http://schemas.microsoft.com/office/drawing/2014/main" id="{0BB69353-3F93-6FE5-C8C6-1BFB0725CBC6}"/>
               </a:ext>
             </a:extLst>
           </p:cNvPr>
@@ -4115,47 +4108,8 @@
         </p:nvSpPr>
         <p:spPr>
           <a:xfrm>
-            <a:off x="3203636" y="1204092"/>
-            <a:ext cx="5784725" cy="707886"/>
-          </a:xfrm>
-          <a:prstGeom prst="rect">
-            <a:avLst/>
-          </a:prstGeom>
-          <a:noFill/>
-        </p:spPr>
-        <p:txBody>
-          <a:bodyPr wrap="none" rtlCol="0">
-            <a:spAutoFit/>
-          </a:bodyPr>
-          <a:lstStyle/>
-          <a:p>
-            <a:pPr algn="ctr"/>
-            <a:r>
-              <a:rPr lang="en-US" sz="4000" dirty="0">
-                <a:latin typeface="+mj-lt"/>
-              </a:rPr>
-              <a:t>Required course materials:</a:t>
-            </a:r>
-            <a:endParaRPr lang="en-US" dirty="0"/>
-          </a:p>
-        </p:txBody>
-      </p:sp>
-      <p:sp>
-        <p:nvSpPr>
-          <p:cNvPr id="3" name="TextBox 2">
-            <a:extLst>
-              <a:ext uri="{FF2B5EF4-FFF2-40B4-BE49-F238E27FC236}">
-                <a16:creationId xmlns:a16="http://schemas.microsoft.com/office/drawing/2014/main" id="{80041865-9773-290D-EB35-F8AF8BFC505C}"/>
-              </a:ext>
-            </a:extLst>
-          </p:cNvPr>
-          <p:cNvSpPr txBox="1"/>
-          <p:nvPr/>
-        </p:nvSpPr>
-        <p:spPr>
-          <a:xfrm>
-            <a:off x="1268396" y="1959603"/>
-            <a:ext cx="9655207" cy="4708981"/>
+            <a:off x="1143784" y="1701931"/>
+            <a:ext cx="9904428" cy="2554545"/>
           </a:xfrm>
           <a:prstGeom prst="rect">
             <a:avLst/>
@@ -4168,253 +4122,83 @@
           </a:bodyPr>
           <a:lstStyle/>
           <a:p>
+            <a:endParaRPr lang="en-US" sz="2000" dirty="0"/>
+          </a:p>
+          <a:p>
+            <a:r>
+              <a:rPr lang="en-US" sz="2000" dirty="0"/>
+              <a:t>Almost all our work will use </a:t>
+            </a:r>
             <a:r>
               <a:rPr lang="en-US" sz="2000" b="1" dirty="0"/>
-              <a:t>Textbook</a:t>
-            </a:r>
-            <a:r>
-              <a:rPr lang="en-US" sz="2000" dirty="0"/>
-              <a:t>: </a:t>
-            </a:r>
-            <a:r>
-              <a:rPr lang="en-US" sz="2000" dirty="0">
-                <a:hlinkClick r:id="rId2"/>
-              </a:rPr>
-              <a:t>https://learning.oreilly.com/library/view/powershell-automation-and/9781800566378/</a:t>
-            </a:r>
+              <a:t>Microsoft PowerShell</a:t>
+            </a:r>
+            <a:r>
+              <a:rPr lang="en-US" sz="2000" dirty="0"/>
+              <a:t> as our main scripting technology.</a:t>
+            </a:r>
+          </a:p>
+          <a:p>
             <a:endParaRPr lang="en-US" sz="2000" dirty="0"/>
           </a:p>
           <a:p>
-            <a:r>
-              <a:rPr lang="en-US" sz="2000" dirty="0"/>
-              <a:t>A </a:t>
+            <a:pPr marL="342900" indent="-342900">
+              <a:buFont typeface="Arial" panose="020B0604020202020204" pitchFamily="34" charset="0"/>
+              <a:buChar char="•"/>
+            </a:pPr>
+            <a:r>
+              <a:rPr lang="en-US" sz="2000" dirty="0"/>
+              <a:t>Expect to see occasional examples and exercises that use other scripting languages. You should have already been introduced to </a:t>
             </a:r>
             <a:r>
               <a:rPr lang="en-US" sz="2000" b="1" dirty="0"/>
-              <a:t>laptop</a:t>
-            </a:r>
-            <a:r>
-              <a:rPr lang="en-US" sz="2000" dirty="0"/>
-              <a:t> computer that satisfies BYU-I CSE department’s laptop specifications.</a:t>
-            </a:r>
-          </a:p>
-          <a:p>
-            <a:r>
-              <a:rPr lang="en-US" sz="2000" dirty="0"/>
-              <a:t>Access to </a:t>
+              <a:t>Bash</a:t>
+            </a:r>
+            <a:r>
+              <a:rPr lang="en-US" sz="2000" dirty="0"/>
+              <a:t> and </a:t>
             </a:r>
             <a:r>
               <a:rPr lang="en-US" sz="2000" b="1" dirty="0"/>
-              <a:t>I-Learn Canvas</a:t>
-            </a:r>
-            <a:r>
-              <a:rPr lang="en-US" sz="2000" dirty="0"/>
-              <a:t> learning management system: </a:t>
-            </a:r>
-            <a:r>
-              <a:rPr lang="en-US" sz="2000" dirty="0">
-                <a:hlinkClick r:id="rId3"/>
-              </a:rPr>
-              <a:t>https://byui.instructure.com/</a:t>
-            </a:r>
-            <a:endParaRPr lang="en-US" sz="2000" dirty="0"/>
-          </a:p>
-          <a:p>
-            <a:r>
-              <a:rPr lang="en-US" sz="2000" dirty="0"/>
-              <a:t>Competence and comfort using various Internet </a:t>
-            </a:r>
-            <a:r>
-              <a:rPr lang="en-US" sz="2000" b="1" dirty="0"/>
-              <a:t>search engines</a:t>
-            </a:r>
-            <a:r>
-              <a:rPr lang="en-US" sz="2000" dirty="0"/>
-              <a:t>, such as:</a:t>
-            </a:r>
-          </a:p>
-          <a:p>
-            <a:pPr marL="800100" lvl="1" indent="-342900">
-              <a:buFont typeface="Wingdings" panose="05000000000000000000" pitchFamily="2" charset="2"/>
-              <a:buChar char="ü"/>
+              <a:t>Python</a:t>
+            </a:r>
+            <a:r>
+              <a:rPr lang="en-US" sz="2000" dirty="0"/>
+              <a:t> in previous coursework, but proficiency in either </a:t>
+            </a:r>
+            <a:r>
+              <a:rPr lang="en-US" sz="2000" i="1" u="sng" dirty="0"/>
+              <a:t>isn’t</a:t>
+            </a:r>
+            <a:r>
+              <a:rPr lang="en-US" sz="2000" dirty="0"/>
+              <a:t> required to succeed in this course.</a:t>
+            </a:r>
+          </a:p>
+          <a:p>
+            <a:pPr marL="342900" indent="-342900">
+              <a:buFont typeface="Arial" panose="020B0604020202020204" pitchFamily="34" charset="0"/>
+              <a:buChar char="•"/>
             </a:pPr>
             <a:r>
               <a:rPr lang="en-US" sz="2000" dirty="0"/>
-              <a:t>DuckDuckGo Private Search: </a:t>
-            </a:r>
-            <a:r>
-              <a:rPr lang="en-US" sz="2000" dirty="0">
-                <a:hlinkClick r:id="rId4"/>
-              </a:rPr>
-              <a:t>https://duckduckgo.com/</a:t>
-            </a:r>
-            <a:endParaRPr lang="en-US" sz="2000" dirty="0"/>
-          </a:p>
-          <a:p>
-            <a:pPr marL="800100" lvl="1" indent="-342900">
-              <a:buFont typeface="Wingdings" panose="05000000000000000000" pitchFamily="2" charset="2"/>
-              <a:buChar char="ü"/>
-            </a:pPr>
-            <a:r>
-              <a:rPr lang="en-US" sz="2000" dirty="0"/>
-              <a:t>Google Advanced Search: </a:t>
-            </a:r>
-            <a:r>
-              <a:rPr lang="en-US" sz="2000" dirty="0">
-                <a:hlinkClick r:id="rId5"/>
-              </a:rPr>
-              <a:t>https://www.google.com/advanced_search</a:t>
-            </a:r>
-            <a:endParaRPr lang="en-US" sz="2000" dirty="0"/>
-          </a:p>
-          <a:p>
-            <a:pPr marL="800100" lvl="1" indent="-342900">
-              <a:buFont typeface="Wingdings" panose="05000000000000000000" pitchFamily="2" charset="2"/>
-              <a:buChar char="ü"/>
-            </a:pPr>
-            <a:r>
-              <a:rPr lang="en-US" sz="2000" dirty="0"/>
-              <a:t>Microsoft Bing: </a:t>
-            </a:r>
-            <a:r>
-              <a:rPr lang="en-US" sz="2000" dirty="0">
-                <a:hlinkClick r:id="rId6"/>
-              </a:rPr>
-              <a:t>https://www.bing.com/</a:t>
-            </a:r>
-            <a:endParaRPr lang="en-US" sz="2000" dirty="0"/>
-          </a:p>
-          <a:p>
-            <a:r>
-              <a:rPr lang="en-US" sz="2000" dirty="0"/>
-              <a:t>Access to a </a:t>
-            </a:r>
-            <a:r>
-              <a:rPr lang="en-US" sz="2000" b="1" dirty="0"/>
-              <a:t>large language model (LLM)</a:t>
-            </a:r>
-            <a:r>
-              <a:rPr lang="en-US" sz="2000" dirty="0"/>
-              <a:t> online </a:t>
-            </a:r>
-            <a:r>
-              <a:rPr lang="en-US" sz="2000" b="1" dirty="0"/>
-              <a:t>chatbot</a:t>
-            </a:r>
-            <a:r>
-              <a:rPr lang="en-US" sz="2000" dirty="0"/>
-              <a:t>:</a:t>
-            </a:r>
-          </a:p>
-          <a:p>
-            <a:pPr marL="800100" lvl="1" indent="-342900">
-              <a:buFont typeface="Wingdings" panose="05000000000000000000" pitchFamily="2" charset="2"/>
-              <a:buChar char="ü"/>
-            </a:pPr>
-            <a:r>
-              <a:rPr lang="en-US" sz="2000" dirty="0"/>
-              <a:t>OpenAI </a:t>
-            </a:r>
-            <a:r>
-              <a:rPr lang="en-US" sz="2000" b="1" dirty="0"/>
-              <a:t>ChatGPT</a:t>
-            </a:r>
-            <a:r>
-              <a:rPr lang="en-US" sz="2000" dirty="0"/>
-              <a:t>: </a:t>
-            </a:r>
-            <a:r>
-              <a:rPr lang="en-US" sz="2000" dirty="0">
-                <a:hlinkClick r:id="rId7"/>
-              </a:rPr>
-              <a:t>https://chat.openai.com/</a:t>
-            </a:r>
-            <a:endParaRPr lang="en-US" sz="2000" dirty="0"/>
-          </a:p>
-          <a:p>
-            <a:pPr marL="800100" lvl="1" indent="-342900">
-              <a:buFont typeface="Wingdings" panose="05000000000000000000" pitchFamily="2" charset="2"/>
-              <a:buChar char="ü"/>
-            </a:pPr>
-            <a:r>
-              <a:rPr lang="en-US" sz="2000" dirty="0"/>
-              <a:t>Google </a:t>
-            </a:r>
-            <a:r>
-              <a:rPr lang="en-US" sz="2000" b="1" dirty="0"/>
-              <a:t>Gemini</a:t>
-            </a:r>
-            <a:r>
-              <a:rPr lang="en-US" sz="2000" dirty="0"/>
-              <a:t>: </a:t>
-            </a:r>
-            <a:r>
-              <a:rPr lang="en-US" sz="2000" dirty="0">
-                <a:hlinkClick r:id="rId8"/>
-              </a:rPr>
-              <a:t>https://gemini.google.com/</a:t>
-            </a:r>
-            <a:r>
-              <a:rPr lang="en-US" sz="2000" dirty="0"/>
-              <a:t> </a:t>
-            </a:r>
-          </a:p>
-          <a:p>
-            <a:pPr marL="800100" lvl="1" indent="-342900">
-              <a:buFont typeface="Wingdings" panose="05000000000000000000" pitchFamily="2" charset="2"/>
-              <a:buChar char="ü"/>
-            </a:pPr>
-            <a:r>
-              <a:rPr lang="en-US" sz="2000" dirty="0"/>
-              <a:t>Anthropic </a:t>
-            </a:r>
-            <a:r>
-              <a:rPr lang="en-US" sz="2000" b="1" dirty="0"/>
-              <a:t>Claude</a:t>
-            </a:r>
-            <a:r>
-              <a:rPr lang="en-US" sz="2000" dirty="0"/>
-              <a:t>: </a:t>
-            </a:r>
-            <a:r>
-              <a:rPr lang="en-US" sz="2000" dirty="0">
-                <a:hlinkClick r:id="rId9"/>
-              </a:rPr>
-              <a:t>https://claude.ai/</a:t>
-            </a:r>
-            <a:endParaRPr lang="en-US" sz="2000" dirty="0"/>
-          </a:p>
-          <a:p>
-            <a:pPr marL="800100" lvl="1" indent="-342900">
-              <a:buFont typeface="Wingdings" panose="05000000000000000000" pitchFamily="2" charset="2"/>
-              <a:buChar char="ü"/>
-            </a:pPr>
-            <a:r>
-              <a:rPr lang="en-US" sz="2000" b="1" dirty="0"/>
-              <a:t>Perplexity</a:t>
-            </a:r>
-            <a:r>
-              <a:rPr lang="en-US" sz="2000" dirty="0"/>
-              <a:t>: </a:t>
-            </a:r>
-            <a:r>
-              <a:rPr lang="en-US" sz="2000" dirty="0">
-                <a:hlinkClick r:id="rId10"/>
-              </a:rPr>
-              <a:t>https://perplexity.ai/</a:t>
-            </a:r>
-            <a:r>
-              <a:rPr lang="en-US" sz="2000" dirty="0"/>
-              <a:t> </a:t>
-            </a:r>
-          </a:p>
-          <a:p>
-            <a:endParaRPr lang="en-US" sz="2000" dirty="0"/>
-          </a:p>
-          <a:p>
-            <a:r>
-              <a:rPr lang="en-US" sz="2000" dirty="0"/>
-              <a:t>There are also several required software installations…</a:t>
+              <a:t>You will also see a couple of examples of compiled language (</a:t>
+            </a:r>
+            <a:r>
+              <a:rPr lang="en-US" sz="2000" i="1" dirty="0"/>
+              <a:t>C#</a:t>
+            </a:r>
+            <a:r>
+              <a:rPr lang="en-US" sz="2000" dirty="0"/>
+              <a:t>) code; however, prior experience with a compiler is </a:t>
+            </a:r>
+            <a:r>
+              <a:rPr lang="en-US" sz="2000" i="1" u="sng" dirty="0"/>
+              <a:t>not</a:t>
+            </a:r>
+            <a:r>
+              <a:rPr lang="en-US" sz="2000" dirty="0"/>
+              <a:t> expected.</a:t>
             </a:r>
           </a:p>
         </p:txBody>
@@ -4422,7 +4206,7 @@
     </p:spTree>
     <p:extLst>
       <p:ext uri="{BB962C8B-B14F-4D97-AF65-F5344CB8AC3E}">
-        <p14:creationId xmlns:p14="http://schemas.microsoft.com/office/powerpoint/2010/main" val="378743348"/>
+        <p14:creationId xmlns:p14="http://schemas.microsoft.com/office/powerpoint/2010/main" val="3725206217"/>
       </p:ext>
     </p:extLst>
   </p:cSld>
@@ -4454,7 +4238,7 @@
           <p:cNvPr id="2" name="TextBox 1">
             <a:extLst>
               <a:ext uri="{FF2B5EF4-FFF2-40B4-BE49-F238E27FC236}">
-                <a16:creationId xmlns:a16="http://schemas.microsoft.com/office/drawing/2014/main" id="{E8E7C5B6-3D55-D6F8-C2DE-9B6E32C23A9C}"/>
+                <a16:creationId xmlns:a16="http://schemas.microsoft.com/office/drawing/2014/main" id="{C5822466-AC61-5579-F313-7B8A3FE65CC8}"/>
               </a:ext>
             </a:extLst>
           </p:cNvPr>
@@ -4463,8 +4247,8 @@
         </p:nvSpPr>
         <p:spPr>
           <a:xfrm>
-            <a:off x="1268395" y="1140457"/>
-            <a:ext cx="9655207" cy="707886"/>
+            <a:off x="3203636" y="1204092"/>
+            <a:ext cx="5784725" cy="707886"/>
           </a:xfrm>
           <a:prstGeom prst="rect">
             <a:avLst/>
@@ -4482,7 +4266,7 @@
               <a:rPr lang="en-US" sz="4000" dirty="0">
                 <a:latin typeface="+mj-lt"/>
               </a:rPr>
-              <a:t>Software toolsets required for this course:</a:t>
+              <a:t>Required course materials:</a:t>
             </a:r>
             <a:endParaRPr lang="en-US" dirty="0"/>
           </a:p>
@@ -4493,7 +4277,7 @@
           <p:cNvPr id="3" name="TextBox 2">
             <a:extLst>
               <a:ext uri="{FF2B5EF4-FFF2-40B4-BE49-F238E27FC236}">
-                <a16:creationId xmlns:a16="http://schemas.microsoft.com/office/drawing/2014/main" id="{17D02A72-79B4-B4A1-5F2B-4922B2F25909}"/>
+                <a16:creationId xmlns:a16="http://schemas.microsoft.com/office/drawing/2014/main" id="{80041865-9773-290D-EB35-F8AF8BFC505C}"/>
               </a:ext>
             </a:extLst>
           </p:cNvPr>
@@ -4502,8 +4286,8 @@
         </p:nvSpPr>
         <p:spPr>
           <a:xfrm>
-            <a:off x="981859" y="1713475"/>
-            <a:ext cx="10228278" cy="5016758"/>
+            <a:off x="1268396" y="1959603"/>
+            <a:ext cx="9655207" cy="4708981"/>
           </a:xfrm>
           <a:prstGeom prst="rect">
             <a:avLst/>
@@ -4517,116 +4301,252 @@
           <a:lstStyle/>
           <a:p>
             <a:r>
-              <a:rPr lang="en-US" sz="2000" dirty="0"/>
-              <a:t>A current version of Microsoft’s </a:t>
-            </a:r>
-            <a:r>
               <a:rPr lang="en-US" sz="2000" b="1" dirty="0"/>
-              <a:t>Windows</a:t>
-            </a:r>
-            <a:r>
-              <a:rPr lang="en-US" sz="2000" dirty="0"/>
-              <a:t> operating system, and a current Linux (or macOS) operating system capable of running </a:t>
-            </a:r>
-            <a:r>
-              <a:rPr lang="en-US" sz="2000" b="1" dirty="0"/>
-              <a:t>PowerShell Core</a:t>
-            </a:r>
-            <a:r>
-              <a:rPr lang="en-US" sz="2000" dirty="0"/>
-              <a:t>. </a:t>
-            </a:r>
-          </a:p>
-          <a:p>
-            <a:endParaRPr lang="en-US" sz="2000" dirty="0"/>
-          </a:p>
-          <a:p>
-            <a:pPr marL="342900" indent="-342900">
-              <a:buFont typeface="Arial" panose="020B0604020202020204" pitchFamily="34" charset="0"/>
-              <a:buChar char="•"/>
-            </a:pPr>
-            <a:r>
-              <a:rPr lang="en-US" sz="2000" dirty="0"/>
-              <a:t>If your computer runs Linux or macOS: check </a:t>
+              <a:t>Textbook</a:t>
+            </a:r>
+            <a:r>
+              <a:rPr lang="en-US" sz="2000" dirty="0"/>
+              <a:t>: </a:t>
             </a:r>
             <a:r>
               <a:rPr lang="en-US" sz="2000" dirty="0">
                 <a:hlinkClick r:id="rId2"/>
               </a:rPr>
-              <a:t>https://github.com/PowerShell/PowerShell</a:t>
-            </a:r>
-            <a:r>
-              <a:rPr lang="en-US" sz="2000" dirty="0"/>
-              <a:t> to ensure that it is one of the supported platforms. You will also need working virtual machine hypervisor software (such as a VMware Player or Oracle VirtualBox product), with a Windows guest virtual machine that runs on that hypervisor.</a:t>
-            </a:r>
-          </a:p>
-          <a:p>
-            <a:pPr marL="342900" indent="-342900">
-              <a:buFont typeface="Arial" panose="020B0604020202020204" pitchFamily="34" charset="0"/>
-              <a:buChar char="•"/>
-            </a:pPr>
+              <a:t>https://learning.oreilly.com/library/view/powershell-automation-and/9781800566378/</a:t>
+            </a:r>
             <a:endParaRPr lang="en-US" sz="2000" dirty="0"/>
           </a:p>
           <a:p>
-            <a:pPr marL="342900" indent="-342900">
-              <a:buFont typeface="Arial" panose="020B0604020202020204" pitchFamily="34" charset="0"/>
-              <a:buChar char="•"/>
-            </a:pPr>
-            <a:r>
-              <a:rPr lang="en-US" sz="2000" dirty="0"/>
-              <a:t>If your computer runs Windows 10 or Windows 11: enable </a:t>
+            <a:r>
+              <a:rPr lang="en-US" sz="2000" dirty="0"/>
+              <a:t>A </a:t>
             </a:r>
             <a:r>
               <a:rPr lang="en-US" sz="2000" b="1" dirty="0"/>
-              <a:t>Windows Subsystem for Linux (WSL)</a:t>
-            </a:r>
-            <a:r>
-              <a:rPr lang="en-US" sz="2000" dirty="0"/>
-              <a:t>, then use it to install a supported Linux distribution. </a:t>
-            </a:r>
-            <a:r>
-              <a:rPr lang="en-US" sz="2000" i="1" dirty="0"/>
-              <a:t>(If you cannot get WSL to work, a supported Linux VM running on VMware Player or Oracle VirtualBox should suffice.)</a:t>
-            </a:r>
-          </a:p>
-          <a:p>
-            <a:endParaRPr lang="en-US" sz="2000" dirty="0"/>
-          </a:p>
-          <a:p>
+              <a:t>laptop</a:t>
+            </a:r>
+            <a:r>
+              <a:rPr lang="en-US" sz="2000" dirty="0"/>
+              <a:t> computer that satisfies BYU-I CSE department’s laptop specifications.</a:t>
+            </a:r>
+          </a:p>
+          <a:p>
+            <a:r>
+              <a:rPr lang="en-US" sz="2000" dirty="0"/>
+              <a:t>Access to </a:t>
+            </a:r>
             <a:r>
               <a:rPr lang="en-US" sz="2000" b="1" dirty="0"/>
-              <a:t>Visual Studio Code</a:t>
-            </a:r>
-            <a:r>
-              <a:rPr lang="en-US" sz="2000" dirty="0"/>
-              <a:t>. (Available at </a:t>
+              <a:t>I-Learn Canvas</a:t>
+            </a:r>
+            <a:r>
+              <a:rPr lang="en-US" sz="2000" dirty="0"/>
+              <a:t> learning management system: </a:t>
             </a:r>
             <a:r>
               <a:rPr lang="en-US" sz="2000" dirty="0">
                 <a:hlinkClick r:id="rId3"/>
               </a:rPr>
-              <a:t>https://code.visualstudio.com/</a:t>
-            </a:r>
-            <a:r>
-              <a:rPr lang="en-US" sz="2000" dirty="0"/>
-              <a:t> for all platforms.)</a:t>
-            </a:r>
-          </a:p>
-          <a:p>
-            <a:pPr marL="342900" indent="-342900">
-              <a:buFont typeface="Arial" panose="020B0604020202020204" pitchFamily="34" charset="0"/>
-              <a:buChar char="•"/>
+              <a:t>https://byui.instructure.com/</a:t>
+            </a:r>
+            <a:endParaRPr lang="en-US" sz="2000" dirty="0"/>
+          </a:p>
+          <a:p>
+            <a:r>
+              <a:rPr lang="en-US" sz="2000" dirty="0"/>
+              <a:t>Competence and comfort using various Internet </a:t>
+            </a:r>
+            <a:r>
+              <a:rPr lang="en-US" sz="2000" b="1" dirty="0"/>
+              <a:t>search engines</a:t>
+            </a:r>
+            <a:r>
+              <a:rPr lang="en-US" sz="2000" dirty="0"/>
+              <a:t>, such as:</a:t>
+            </a:r>
+          </a:p>
+          <a:p>
+            <a:pPr marL="800100" lvl="1" indent="-342900">
+              <a:buFont typeface="Wingdings" panose="05000000000000000000" pitchFamily="2" charset="2"/>
+              <a:buChar char="ü"/>
             </a:pPr>
+            <a:r>
+              <a:rPr lang="en-US" sz="2000" dirty="0"/>
+              <a:t>DuckDuckGo Private Search: </a:t>
+            </a:r>
+            <a:r>
+              <a:rPr lang="en-US" sz="2000" dirty="0">
+                <a:hlinkClick r:id="rId4"/>
+              </a:rPr>
+              <a:t>https://duckduckgo.com/</a:t>
+            </a:r>
             <a:endParaRPr lang="en-US" sz="2000" dirty="0"/>
           </a:p>
           <a:p>
+            <a:pPr marL="800100" lvl="1" indent="-342900">
+              <a:buFont typeface="Wingdings" panose="05000000000000000000" pitchFamily="2" charset="2"/>
+              <a:buChar char="ü"/>
+            </a:pPr>
+            <a:r>
+              <a:rPr lang="en-US" sz="2000" dirty="0"/>
+              <a:t>Google Advanced Search: </a:t>
+            </a:r>
+            <a:r>
+              <a:rPr lang="en-US" sz="2000" dirty="0">
+                <a:hlinkClick r:id="rId5"/>
+              </a:rPr>
+              <a:t>https://www.google.com/advanced_search</a:t>
+            </a:r>
+            <a:endParaRPr lang="en-US" sz="2000" dirty="0"/>
+          </a:p>
+          <a:p>
+            <a:pPr marL="800100" lvl="1" indent="-342900">
+              <a:buFont typeface="Wingdings" panose="05000000000000000000" pitchFamily="2" charset="2"/>
+              <a:buChar char="ü"/>
+            </a:pPr>
+            <a:r>
+              <a:rPr lang="en-US" sz="2000" dirty="0"/>
+              <a:t>Microsoft Bing: </a:t>
+            </a:r>
+            <a:r>
+              <a:rPr lang="en-US" sz="2000" dirty="0">
+                <a:hlinkClick r:id="rId6"/>
+              </a:rPr>
+              <a:t>https://www.bing.com/</a:t>
+            </a:r>
+            <a:endParaRPr lang="en-US" sz="2000" dirty="0"/>
+          </a:p>
+          <a:p>
+            <a:r>
+              <a:rPr lang="en-US" sz="2000" dirty="0"/>
+              <a:t>Access to a </a:t>
+            </a:r>
             <a:r>
               <a:rPr lang="en-US" sz="2000" b="1" dirty="0"/>
-              <a:t>Microsoft Teams</a:t>
-            </a:r>
-            <a:r>
-              <a:rPr lang="en-US" sz="2000" dirty="0"/>
-              <a:t>. (Expect an invitation to a Team shortly after the semester begins.)</a:t>
+              <a:t>large language model (LLM)</a:t>
+            </a:r>
+            <a:r>
+              <a:rPr lang="en-US" sz="2000" dirty="0"/>
+              <a:t> online </a:t>
+            </a:r>
+            <a:r>
+              <a:rPr lang="en-US" sz="2000" b="1" dirty="0"/>
+              <a:t>chatbot</a:t>
+            </a:r>
+            <a:r>
+              <a:rPr lang="en-US" sz="2000" dirty="0"/>
+              <a:t>:</a:t>
+            </a:r>
+          </a:p>
+          <a:p>
+            <a:pPr marL="800100" lvl="1" indent="-342900">
+              <a:buFont typeface="Wingdings" panose="05000000000000000000" pitchFamily="2" charset="2"/>
+              <a:buChar char="ü"/>
+            </a:pPr>
+            <a:r>
+              <a:rPr lang="en-US" sz="2000" dirty="0"/>
+              <a:t>OpenAI </a:t>
+            </a:r>
+            <a:r>
+              <a:rPr lang="en-US" sz="2000" b="1" dirty="0"/>
+              <a:t>ChatGPT</a:t>
+            </a:r>
+            <a:r>
+              <a:rPr lang="en-US" sz="2000" dirty="0"/>
+              <a:t>: </a:t>
+            </a:r>
+            <a:r>
+              <a:rPr lang="en-US" sz="2000" dirty="0">
+                <a:hlinkClick r:id="rId7"/>
+              </a:rPr>
+              <a:t>https://chat.openai.com/</a:t>
+            </a:r>
+            <a:endParaRPr lang="en-US" sz="2000" dirty="0"/>
+          </a:p>
+          <a:p>
+            <a:pPr marL="800100" lvl="1" indent="-342900">
+              <a:buFont typeface="Wingdings" panose="05000000000000000000" pitchFamily="2" charset="2"/>
+              <a:buChar char="ü"/>
+            </a:pPr>
+            <a:r>
+              <a:rPr lang="en-US" sz="2000" dirty="0"/>
+              <a:t>Google </a:t>
+            </a:r>
+            <a:r>
+              <a:rPr lang="en-US" sz="2000" b="1" dirty="0"/>
+              <a:t>Gemini</a:t>
+            </a:r>
+            <a:r>
+              <a:rPr lang="en-US" sz="2000" dirty="0"/>
+              <a:t>: </a:t>
+            </a:r>
+            <a:r>
+              <a:rPr lang="en-US" sz="2000" dirty="0">
+                <a:hlinkClick r:id="rId8"/>
+              </a:rPr>
+              <a:t>https://gemini.google.com/</a:t>
+            </a:r>
+            <a:r>
+              <a:rPr lang="en-US" sz="2000" dirty="0"/>
+              <a:t> </a:t>
+            </a:r>
+          </a:p>
+          <a:p>
+            <a:pPr marL="800100" lvl="1" indent="-342900">
+              <a:buFont typeface="Wingdings" panose="05000000000000000000" pitchFamily="2" charset="2"/>
+              <a:buChar char="ü"/>
+            </a:pPr>
+            <a:r>
+              <a:rPr lang="en-US" sz="2000" dirty="0"/>
+              <a:t>Anthropic </a:t>
+            </a:r>
+            <a:r>
+              <a:rPr lang="en-US" sz="2000" b="1" dirty="0"/>
+              <a:t>Claude</a:t>
+            </a:r>
+            <a:r>
+              <a:rPr lang="en-US" sz="2000" dirty="0"/>
+              <a:t>: </a:t>
+            </a:r>
+            <a:r>
+              <a:rPr lang="en-US" sz="2000" dirty="0">
+                <a:hlinkClick r:id="rId9"/>
+              </a:rPr>
+              <a:t>https://claude.ai/</a:t>
+            </a:r>
+            <a:endParaRPr lang="en-US" sz="2000" dirty="0"/>
+          </a:p>
+          <a:p>
+            <a:pPr marL="800100" lvl="1" indent="-342900">
+              <a:buFont typeface="Wingdings" panose="05000000000000000000" pitchFamily="2" charset="2"/>
+              <a:buChar char="ü"/>
+            </a:pPr>
+            <a:r>
+              <a:rPr lang="en-US" sz="2000" b="1" dirty="0"/>
+              <a:t>Perplexity</a:t>
+            </a:r>
+            <a:r>
+              <a:rPr lang="en-US" sz="2000" dirty="0"/>
+              <a:t>: </a:t>
+            </a:r>
+            <a:r>
+              <a:rPr lang="en-US" sz="2000" dirty="0">
+                <a:hlinkClick r:id="rId10"/>
+              </a:rPr>
+              <a:t>https://perplexity.ai/</a:t>
+            </a:r>
+            <a:r>
+              <a:rPr lang="en-US" sz="2000" dirty="0"/>
+              <a:t> </a:t>
+            </a:r>
+          </a:p>
+          <a:p>
+            <a:endParaRPr lang="en-US" sz="2000" dirty="0"/>
+          </a:p>
+          <a:p>
+            <a:r>
+              <a:rPr lang="en-US" sz="2000" dirty="0"/>
+              <a:t>There are also several required software installations…</a:t>
             </a:r>
           </a:p>
         </p:txBody>
@@ -4634,7 +4554,7 @@
     </p:spTree>
     <p:extLst>
       <p:ext uri="{BB962C8B-B14F-4D97-AF65-F5344CB8AC3E}">
-        <p14:creationId xmlns:p14="http://schemas.microsoft.com/office/powerpoint/2010/main" val="519357719"/>
+        <p14:creationId xmlns:p14="http://schemas.microsoft.com/office/powerpoint/2010/main" val="378743348"/>
       </p:ext>
     </p:extLst>
   </p:cSld>
@@ -4663,45 +4583,10 @@
       </p:grpSpPr>
       <p:sp>
         <p:nvSpPr>
-          <p:cNvPr id="2" name="Text Placeholder 1">
-            <a:extLst>
-              <a:ext uri="{FF2B5EF4-FFF2-40B4-BE49-F238E27FC236}">
-                <a16:creationId xmlns:a16="http://schemas.microsoft.com/office/drawing/2014/main" id="{1862E903-3C56-BB42-2361-009F2336475A}"/>
-              </a:ext>
-            </a:extLst>
-          </p:cNvPr>
-          <p:cNvSpPr>
-            <a:spLocks noGrp="1"/>
-          </p:cNvSpPr>
-          <p:nvPr>
-            <p:ph type="body" sz="quarter" idx="10"/>
-          </p:nvPr>
-        </p:nvSpPr>
-        <p:spPr>
-          <a:xfrm>
-            <a:off x="323527" y="1273456"/>
-            <a:ext cx="11573197" cy="724247"/>
-          </a:xfrm>
-        </p:spPr>
-        <p:txBody>
-          <a:bodyPr>
-            <a:normAutofit fontScale="92500" lnSpcReduction="20000"/>
-          </a:bodyPr>
-          <a:lstStyle/>
-          <a:p>
-            <a:r>
-              <a:rPr lang="en-US" dirty="0"/>
-              <a:t>Collect and Ready your Tools!</a:t>
-            </a:r>
-          </a:p>
-        </p:txBody>
-      </p:sp>
-      <p:sp>
-        <p:nvSpPr>
-          <p:cNvPr id="3" name="TextBox 2">
-            <a:extLst>
-              <a:ext uri="{FF2B5EF4-FFF2-40B4-BE49-F238E27FC236}">
-                <a16:creationId xmlns:a16="http://schemas.microsoft.com/office/drawing/2014/main" id="{90179172-96B3-95D0-A137-257770BE7642}"/>
+          <p:cNvPr id="2" name="TextBox 1">
+            <a:extLst>
+              <a:ext uri="{FF2B5EF4-FFF2-40B4-BE49-F238E27FC236}">
+                <a16:creationId xmlns:a16="http://schemas.microsoft.com/office/drawing/2014/main" id="{E8E7C5B6-3D55-D6F8-C2DE-9B6E32C23A9C}"/>
               </a:ext>
             </a:extLst>
           </p:cNvPr>
@@ -4710,8 +4595,47 @@
         </p:nvSpPr>
         <p:spPr>
           <a:xfrm>
-            <a:off x="1282523" y="1997703"/>
-            <a:ext cx="9655207" cy="4708981"/>
+            <a:off x="1354508" y="1140457"/>
+            <a:ext cx="9482982" cy="707886"/>
+          </a:xfrm>
+          <a:prstGeom prst="rect">
+            <a:avLst/>
+          </a:prstGeom>
+          <a:noFill/>
+        </p:spPr>
+        <p:txBody>
+          <a:bodyPr wrap="none" rtlCol="0">
+            <a:spAutoFit/>
+          </a:bodyPr>
+          <a:lstStyle/>
+          <a:p>
+            <a:pPr algn="ctr"/>
+            <a:r>
+              <a:rPr lang="en-US" sz="4000" dirty="0">
+                <a:latin typeface="+mj-lt"/>
+              </a:rPr>
+              <a:t>Software toolsets required for this course: (1)</a:t>
+            </a:r>
+            <a:endParaRPr lang="en-US" dirty="0"/>
+          </a:p>
+        </p:txBody>
+      </p:sp>
+      <p:sp>
+        <p:nvSpPr>
+          <p:cNvPr id="3" name="TextBox 2">
+            <a:extLst>
+              <a:ext uri="{FF2B5EF4-FFF2-40B4-BE49-F238E27FC236}">
+                <a16:creationId xmlns:a16="http://schemas.microsoft.com/office/drawing/2014/main" id="{17D02A72-79B4-B4A1-5F2B-4922B2F25909}"/>
+              </a:ext>
+            </a:extLst>
+          </p:cNvPr>
+          <p:cNvSpPr txBox="1"/>
+          <p:nvPr/>
+        </p:nvSpPr>
+        <p:spPr>
+          <a:xfrm>
+            <a:off x="981860" y="1931891"/>
+            <a:ext cx="10228278" cy="3785652"/>
           </a:xfrm>
           <a:prstGeom prst="rect">
             <a:avLst/>
@@ -4723,6 +4647,31 @@
             <a:spAutoFit/>
           </a:bodyPr>
           <a:lstStyle/>
+          <a:p>
+            <a:r>
+              <a:rPr lang="en-US" sz="2000" dirty="0"/>
+              <a:t>A current version of Microsoft’s </a:t>
+            </a:r>
+            <a:r>
+              <a:rPr lang="en-US" sz="2000" b="1" dirty="0"/>
+              <a:t>Windows</a:t>
+            </a:r>
+            <a:r>
+              <a:rPr lang="en-US" sz="2000" dirty="0"/>
+              <a:t> operating system, and a current Linux (or macOS) operating system capable of running </a:t>
+            </a:r>
+            <a:r>
+              <a:rPr lang="en-US" sz="2000" b="1" dirty="0"/>
+              <a:t>PowerShell Core</a:t>
+            </a:r>
+            <a:r>
+              <a:rPr lang="en-US" sz="2000" dirty="0"/>
+              <a:t>. </a:t>
+            </a:r>
+          </a:p>
+          <a:p>
+            <a:endParaRPr lang="en-US" sz="2000" dirty="0"/>
+          </a:p>
           <a:p>
             <a:pPr marL="342900" indent="-342900">
               <a:buFont typeface="Arial" panose="020B0604020202020204" pitchFamily="34" charset="0"/>
@@ -4730,7 +4679,17 @@
             </a:pPr>
             <a:r>
               <a:rPr lang="en-US" sz="2000" dirty="0"/>
-              <a:t>Your first exercise is a short syllabus review, to verify that you understand this course’s expectations and opportunities, and to begin to use Microsoft Teams to communicate with your instructor and classmates.</a:t>
+              <a:t>If your computer runs Linux or macOS: check </a:t>
+            </a:r>
+            <a:r>
+              <a:rPr lang="en-US" sz="2000" dirty="0">
+                <a:hlinkClick r:id="rId2"/>
+              </a:rPr>
+              <a:t>https://github.com/PowerShell/PowerShell</a:t>
+            </a:r>
+            <a:r>
+              <a:rPr lang="en-US" sz="2000" dirty="0"/>
+              <a:t> to ensure that it is one of the supported platforms. You will also need working virtual machine hypervisor software (such as a VMware Player or Oracle VirtualBox product), with a Windows guest virtual machine that runs on that hypervisor.</a:t>
             </a:r>
           </a:p>
           <a:p>
@@ -4747,7 +4706,149 @@
             </a:pPr>
             <a:r>
               <a:rPr lang="en-US" sz="2000" dirty="0"/>
-              <a:t>For your second exercise, you will install the necessary tools on the computer that you will bring to every class session:</a:t>
+              <a:t>If your computer runs Windows 10 or Windows 11: enable </a:t>
+            </a:r>
+            <a:r>
+              <a:rPr lang="en-US" sz="2000" b="1" dirty="0"/>
+              <a:t>Windows Subsystem for Linux (WSL)</a:t>
+            </a:r>
+            <a:r>
+              <a:rPr lang="en-US" sz="2000" dirty="0"/>
+              <a:t>, then use it to install a supported Linux distribution. </a:t>
+            </a:r>
+            <a:r>
+              <a:rPr lang="en-US" sz="2000" i="1" dirty="0"/>
+              <a:t>(If you cannot get WSL to work, a supported Linux VM running on VMware Player or Oracle VirtualBox should suffice.)</a:t>
+            </a:r>
+          </a:p>
+        </p:txBody>
+      </p:sp>
+    </p:spTree>
+    <p:extLst>
+      <p:ext uri="{BB962C8B-B14F-4D97-AF65-F5344CB8AC3E}">
+        <p14:creationId xmlns:p14="http://schemas.microsoft.com/office/powerpoint/2010/main" val="519357719"/>
+      </p:ext>
+    </p:extLst>
+  </p:cSld>
+  <p:clrMapOvr>
+    <a:masterClrMapping/>
+  </p:clrMapOvr>
+</p:sld>
+</file>
+
+<file path=ppt/slides/slide6.xml><?xml version="1.0" encoding="utf-8"?>
+<p:sld xmlns:a="http://schemas.openxmlformats.org/drawingml/2006/main" xmlns:r="http://schemas.openxmlformats.org/officeDocument/2006/relationships" xmlns:p="http://schemas.openxmlformats.org/presentationml/2006/main">
+  <p:cSld>
+    <p:spTree>
+      <p:nvGrpSpPr>
+        <p:cNvPr id="1" name="">
+          <a:extLst>
+            <a:ext uri="{FF2B5EF4-FFF2-40B4-BE49-F238E27FC236}">
+              <a16:creationId xmlns:a16="http://schemas.microsoft.com/office/drawing/2014/main" id="{F01428A0-5FD9-8B34-2F95-852682E53114}"/>
+            </a:ext>
+          </a:extLst>
+        </p:cNvPr>
+        <p:cNvGrpSpPr/>
+        <p:nvPr/>
+      </p:nvGrpSpPr>
+      <p:grpSpPr>
+        <a:xfrm>
+          <a:off x="0" y="0"/>
+          <a:ext cx="0" cy="0"/>
+          <a:chOff x="0" y="0"/>
+          <a:chExt cx="0" cy="0"/>
+        </a:xfrm>
+      </p:grpSpPr>
+      <p:sp>
+        <p:nvSpPr>
+          <p:cNvPr id="2" name="TextBox 1">
+            <a:extLst>
+              <a:ext uri="{FF2B5EF4-FFF2-40B4-BE49-F238E27FC236}">
+                <a16:creationId xmlns:a16="http://schemas.microsoft.com/office/drawing/2014/main" id="{86724031-661D-6B33-0720-55B5CBD68141}"/>
+              </a:ext>
+            </a:extLst>
+          </p:cNvPr>
+          <p:cNvSpPr txBox="1"/>
+          <p:nvPr/>
+        </p:nvSpPr>
+        <p:spPr>
+          <a:xfrm>
+            <a:off x="1354508" y="1140457"/>
+            <a:ext cx="9482982" cy="707886"/>
+          </a:xfrm>
+          <a:prstGeom prst="rect">
+            <a:avLst/>
+          </a:prstGeom>
+          <a:noFill/>
+        </p:spPr>
+        <p:txBody>
+          <a:bodyPr wrap="none" rtlCol="0">
+            <a:spAutoFit/>
+          </a:bodyPr>
+          <a:lstStyle/>
+          <a:p>
+            <a:pPr algn="ctr"/>
+            <a:r>
+              <a:rPr lang="en-US" sz="4000" dirty="0">
+                <a:latin typeface="+mj-lt"/>
+              </a:rPr>
+              <a:t>Software toolsets required for this course: (2)</a:t>
+            </a:r>
+            <a:endParaRPr lang="en-US" dirty="0"/>
+          </a:p>
+        </p:txBody>
+      </p:sp>
+      <p:sp>
+        <p:nvSpPr>
+          <p:cNvPr id="3" name="TextBox 2">
+            <a:extLst>
+              <a:ext uri="{FF2B5EF4-FFF2-40B4-BE49-F238E27FC236}">
+                <a16:creationId xmlns:a16="http://schemas.microsoft.com/office/drawing/2014/main" id="{89292DD9-A7BB-A558-CA03-A8BCF950A7C1}"/>
+              </a:ext>
+            </a:extLst>
+          </p:cNvPr>
+          <p:cNvSpPr txBox="1"/>
+          <p:nvPr/>
+        </p:nvSpPr>
+        <p:spPr>
+          <a:xfrm>
+            <a:off x="981859" y="1713475"/>
+            <a:ext cx="10228278" cy="1631216"/>
+          </a:xfrm>
+          <a:prstGeom prst="rect">
+            <a:avLst/>
+          </a:prstGeom>
+          <a:noFill/>
+        </p:spPr>
+        <p:txBody>
+          <a:bodyPr wrap="square" rtlCol="0">
+            <a:spAutoFit/>
+          </a:bodyPr>
+          <a:lstStyle/>
+          <a:p>
+            <a:endParaRPr lang="en-US" sz="2000" dirty="0"/>
+          </a:p>
+          <a:p>
+            <a:endParaRPr lang="en-US" sz="2000" dirty="0"/>
+          </a:p>
+          <a:p>
+            <a:r>
+              <a:rPr lang="en-US" sz="2000" b="1" dirty="0"/>
+              <a:t>Visual Studio Code</a:t>
+            </a:r>
+            <a:r>
+              <a:rPr lang="en-US" sz="2000" dirty="0"/>
+              <a:t>. (Available at </a:t>
+            </a:r>
+            <a:r>
+              <a:rPr lang="en-US" sz="2000" dirty="0">
+                <a:hlinkClick r:id="rId2"/>
+              </a:rPr>
+              <a:t>https://code.visualstudio.com/</a:t>
+            </a:r>
+            <a:r>
+              <a:rPr lang="en-US" sz="2000" dirty="0"/>
+              <a:t> for all platforms.)</a:t>
             </a:r>
           </a:p>
           <a:p>
@@ -4758,6 +4859,250 @@
             <a:endParaRPr lang="en-US" sz="2000" dirty="0"/>
           </a:p>
           <a:p>
+            <a:r>
+              <a:rPr lang="en-US" sz="2000" b="1" dirty="0"/>
+              <a:t>Microsoft Teams</a:t>
+            </a:r>
+            <a:r>
+              <a:rPr lang="en-US" sz="2000" dirty="0"/>
+              <a:t>. (Expect an invitation to a Team shortly after the semester begins.)</a:t>
+            </a:r>
+          </a:p>
+        </p:txBody>
+      </p:sp>
+    </p:spTree>
+    <p:extLst>
+      <p:ext uri="{BB962C8B-B14F-4D97-AF65-F5344CB8AC3E}">
+        <p14:creationId xmlns:p14="http://schemas.microsoft.com/office/powerpoint/2010/main" val="3901206331"/>
+      </p:ext>
+    </p:extLst>
+  </p:cSld>
+  <p:clrMapOvr>
+    <a:masterClrMapping/>
+  </p:clrMapOvr>
+</p:sld>
+</file>
+
+<file path=ppt/slides/slide7.xml><?xml version="1.0" encoding="utf-8"?>
+<p:sld xmlns:a="http://schemas.openxmlformats.org/drawingml/2006/main" xmlns:r="http://schemas.openxmlformats.org/officeDocument/2006/relationships" xmlns:p="http://schemas.openxmlformats.org/presentationml/2006/main">
+  <p:cSld>
+    <p:spTree>
+      <p:nvGrpSpPr>
+        <p:cNvPr id="1" name=""/>
+        <p:cNvGrpSpPr/>
+        <p:nvPr/>
+      </p:nvGrpSpPr>
+      <p:grpSpPr>
+        <a:xfrm>
+          <a:off x="0" y="0"/>
+          <a:ext cx="0" cy="0"/>
+          <a:chOff x="0" y="0"/>
+          <a:chExt cx="0" cy="0"/>
+        </a:xfrm>
+      </p:grpSpPr>
+      <p:sp>
+        <p:nvSpPr>
+          <p:cNvPr id="2" name="Text Placeholder 1">
+            <a:extLst>
+              <a:ext uri="{FF2B5EF4-FFF2-40B4-BE49-F238E27FC236}">
+                <a16:creationId xmlns:a16="http://schemas.microsoft.com/office/drawing/2014/main" id="{1862E903-3C56-BB42-2361-009F2336475A}"/>
+              </a:ext>
+            </a:extLst>
+          </p:cNvPr>
+          <p:cNvSpPr>
+            <a:spLocks noGrp="1"/>
+          </p:cNvSpPr>
+          <p:nvPr>
+            <p:ph type="body" sz="quarter" idx="10"/>
+          </p:nvPr>
+        </p:nvSpPr>
+        <p:spPr>
+          <a:xfrm>
+            <a:off x="323527" y="1273456"/>
+            <a:ext cx="11573197" cy="724247"/>
+          </a:xfrm>
+        </p:spPr>
+        <p:txBody>
+          <a:bodyPr>
+            <a:normAutofit fontScale="92500" lnSpcReduction="20000"/>
+          </a:bodyPr>
+          <a:lstStyle/>
+          <a:p>
+            <a:r>
+              <a:rPr lang="en-US" dirty="0"/>
+              <a:t>Collect and Ready your Tools! (1.1)</a:t>
+            </a:r>
+          </a:p>
+        </p:txBody>
+      </p:sp>
+      <p:sp>
+        <p:nvSpPr>
+          <p:cNvPr id="3" name="TextBox 2">
+            <a:extLst>
+              <a:ext uri="{FF2B5EF4-FFF2-40B4-BE49-F238E27FC236}">
+                <a16:creationId xmlns:a16="http://schemas.microsoft.com/office/drawing/2014/main" id="{90179172-96B3-95D0-A137-257770BE7642}"/>
+              </a:ext>
+            </a:extLst>
+          </p:cNvPr>
+          <p:cNvSpPr txBox="1"/>
+          <p:nvPr/>
+        </p:nvSpPr>
+        <p:spPr>
+          <a:xfrm>
+            <a:off x="1282523" y="1997703"/>
+            <a:ext cx="9655207" cy="1631216"/>
+          </a:xfrm>
+          <a:prstGeom prst="rect">
+            <a:avLst/>
+          </a:prstGeom>
+          <a:noFill/>
+        </p:spPr>
+        <p:txBody>
+          <a:bodyPr wrap="square" rtlCol="0">
+            <a:spAutoFit/>
+          </a:bodyPr>
+          <a:lstStyle/>
+          <a:p>
+            <a:pPr marL="342900" indent="-342900">
+              <a:buFont typeface="Arial" panose="020B0604020202020204" pitchFamily="34" charset="0"/>
+              <a:buChar char="•"/>
+            </a:pPr>
+            <a:endParaRPr lang="en-US" sz="2000" dirty="0"/>
+          </a:p>
+          <a:p>
+            <a:r>
+              <a:rPr lang="en-US" sz="2000" dirty="0"/>
+              <a:t>Your first exercise is a short syllabus review, to verify that you understand this course’s expectations and opportunities, and to begin to use Microsoft Teams to communicate with your instructor and classmates.</a:t>
+            </a:r>
+          </a:p>
+          <a:p>
+            <a:pPr marL="342900" indent="-342900">
+              <a:buFont typeface="Arial" panose="020B0604020202020204" pitchFamily="34" charset="0"/>
+              <a:buChar char="•"/>
+            </a:pPr>
+            <a:endParaRPr lang="en-US" sz="2000" dirty="0"/>
+          </a:p>
+        </p:txBody>
+      </p:sp>
+    </p:spTree>
+    <p:extLst>
+      <p:ext uri="{BB962C8B-B14F-4D97-AF65-F5344CB8AC3E}">
+        <p14:creationId xmlns:p14="http://schemas.microsoft.com/office/powerpoint/2010/main" val="657795359"/>
+      </p:ext>
+    </p:extLst>
+  </p:cSld>
+  <p:clrMapOvr>
+    <a:masterClrMapping/>
+  </p:clrMapOvr>
+</p:sld>
+</file>
+
+<file path=ppt/slides/slide8.xml><?xml version="1.0" encoding="utf-8"?>
+<p:sld xmlns:a="http://schemas.openxmlformats.org/drawingml/2006/main" xmlns:r="http://schemas.openxmlformats.org/officeDocument/2006/relationships" xmlns:p="http://schemas.openxmlformats.org/presentationml/2006/main">
+  <p:cSld>
+    <p:spTree>
+      <p:nvGrpSpPr>
+        <p:cNvPr id="1" name="">
+          <a:extLst>
+            <a:ext uri="{FF2B5EF4-FFF2-40B4-BE49-F238E27FC236}">
+              <a16:creationId xmlns:a16="http://schemas.microsoft.com/office/drawing/2014/main" id="{482F29CE-EA34-1AED-F55E-F9BAB358DC7B}"/>
+            </a:ext>
+          </a:extLst>
+        </p:cNvPr>
+        <p:cNvGrpSpPr/>
+        <p:nvPr/>
+      </p:nvGrpSpPr>
+      <p:grpSpPr>
+        <a:xfrm>
+          <a:off x="0" y="0"/>
+          <a:ext cx="0" cy="0"/>
+          <a:chOff x="0" y="0"/>
+          <a:chExt cx="0" cy="0"/>
+        </a:xfrm>
+      </p:grpSpPr>
+      <p:sp>
+        <p:nvSpPr>
+          <p:cNvPr id="2" name="Text Placeholder 1">
+            <a:extLst>
+              <a:ext uri="{FF2B5EF4-FFF2-40B4-BE49-F238E27FC236}">
+                <a16:creationId xmlns:a16="http://schemas.microsoft.com/office/drawing/2014/main" id="{4DEFDA27-E0DE-4E08-04BE-D4FF5E2940D3}"/>
+              </a:ext>
+            </a:extLst>
+          </p:cNvPr>
+          <p:cNvSpPr>
+            <a:spLocks noGrp="1"/>
+          </p:cNvSpPr>
+          <p:nvPr>
+            <p:ph type="body" sz="quarter" idx="10"/>
+          </p:nvPr>
+        </p:nvSpPr>
+        <p:spPr>
+          <a:xfrm>
+            <a:off x="323527" y="1273456"/>
+            <a:ext cx="11573197" cy="724247"/>
+          </a:xfrm>
+        </p:spPr>
+        <p:txBody>
+          <a:bodyPr>
+            <a:normAutofit fontScale="92500" lnSpcReduction="20000"/>
+          </a:bodyPr>
+          <a:lstStyle/>
+          <a:p>
+            <a:r>
+              <a:rPr lang="en-US" dirty="0"/>
+              <a:t>Collect and Ready your Tools! (1.2)</a:t>
+            </a:r>
+          </a:p>
+        </p:txBody>
+      </p:sp>
+      <p:sp>
+        <p:nvSpPr>
+          <p:cNvPr id="3" name="TextBox 2">
+            <a:extLst>
+              <a:ext uri="{FF2B5EF4-FFF2-40B4-BE49-F238E27FC236}">
+                <a16:creationId xmlns:a16="http://schemas.microsoft.com/office/drawing/2014/main" id="{ABB92A59-B2E4-47D1-0828-52B853BDE4BD}"/>
+              </a:ext>
+            </a:extLst>
+          </p:cNvPr>
+          <p:cNvSpPr txBox="1"/>
+          <p:nvPr/>
+        </p:nvSpPr>
+        <p:spPr>
+          <a:xfrm>
+            <a:off x="1282523" y="1997703"/>
+            <a:ext cx="9655207" cy="3785652"/>
+          </a:xfrm>
+          <a:prstGeom prst="rect">
+            <a:avLst/>
+          </a:prstGeom>
+          <a:noFill/>
+        </p:spPr>
+        <p:txBody>
+          <a:bodyPr wrap="square" rtlCol="0">
+            <a:spAutoFit/>
+          </a:bodyPr>
+          <a:lstStyle/>
+          <a:p>
+            <a:pPr marL="342900" indent="-342900">
+              <a:buFont typeface="Arial" panose="020B0604020202020204" pitchFamily="34" charset="0"/>
+              <a:buChar char="•"/>
+            </a:pPr>
+            <a:endParaRPr lang="en-US" sz="2000" dirty="0"/>
+          </a:p>
+          <a:p>
+            <a:r>
+              <a:rPr lang="en-US" sz="2000" dirty="0"/>
+              <a:t>For your second exercise, you will install the necessary tools on the computer that you will use in this class:</a:t>
+            </a:r>
+          </a:p>
+          <a:p>
+            <a:pPr marL="342900" indent="-342900">
+              <a:buFont typeface="Arial" panose="020B0604020202020204" pitchFamily="34" charset="0"/>
+              <a:buChar char="•"/>
+            </a:pPr>
+            <a:endParaRPr lang="en-US" sz="2000" dirty="0"/>
+          </a:p>
+          <a:p>
             <a:pPr marL="800100" lvl="1" indent="-342900">
               <a:buFont typeface="Arial" panose="020B0604020202020204" pitchFamily="34" charset="0"/>
               <a:buChar char="•"/>
@@ -4850,7 +5195,7 @@
     </p:spTree>
     <p:extLst>
       <p:ext uri="{BB962C8B-B14F-4D97-AF65-F5344CB8AC3E}">
-        <p14:creationId xmlns:p14="http://schemas.microsoft.com/office/powerpoint/2010/main" val="657795359"/>
+        <p14:creationId xmlns:p14="http://schemas.microsoft.com/office/powerpoint/2010/main" val="477328932"/>
       </p:ext>
     </p:extLst>
   </p:cSld>

</xml_diff>